<commit_message>
added a data binding example
</commit_message>
<xml_diff>
--- a/JUG - EMF.pptx
+++ b/JUG - EMF.pptx
@@ -5,10 +5,10 @@
     <p:sldMasterId id="2147483648" r:id="rId4"/>
   </p:sldMasterIdLst>
   <p:notesMasterIdLst>
-    <p:notesMasterId r:id="rId17"/>
+    <p:notesMasterId r:id="rId18"/>
   </p:notesMasterIdLst>
   <p:handoutMasterIdLst>
-    <p:handoutMasterId r:id="rId18"/>
+    <p:handoutMasterId r:id="rId19"/>
   </p:handoutMasterIdLst>
   <p:sldIdLst>
     <p:sldId id="280" r:id="rId5"/>
@@ -23,6 +23,7 @@
     <p:sldId id="288" r:id="rId14"/>
     <p:sldId id="289" r:id="rId15"/>
     <p:sldId id="290" r:id="rId16"/>
+    <p:sldId id="291" r:id="rId17"/>
   </p:sldIdLst>
   <p:sldSz cx="12192000" cy="6858000"/>
   <p:notesSz cx="6858000" cy="9144000"/>
@@ -6876,7 +6877,7 @@
             </a:r>
             <a:r>
               <a:rPr lang="pl-PL" dirty="0" smtClean="0"/>
-              <a:t>validation</a:t>
+              <a:t>data binding &amp; validation</a:t>
             </a:r>
             <a:endParaRPr lang="pl-PL" dirty="0"/>
           </a:p>
@@ -6897,7 +6898,60 @@
           <a:bodyPr/>
           <a:lstStyle/>
           <a:p>
-            <a:endParaRPr lang="pl-PL"/>
+            <a:r>
+              <a:rPr lang="pl-PL" dirty="0" smtClean="0"/>
+              <a:t>Binding a model to UI </a:t>
+            </a:r>
+            <a:r>
+              <a:rPr lang="pl-PL" dirty="0" smtClean="0"/>
+              <a:t>controls</a:t>
+            </a:r>
+          </a:p>
+          <a:p>
+            <a:pPr lvl="1"/>
+            <a:r>
+              <a:rPr lang="pl-PL" dirty="0"/>
+              <a:t>DataBindingContext</a:t>
+            </a:r>
+            <a:endParaRPr lang="pl-PL" dirty="0" smtClean="0"/>
+          </a:p>
+          <a:p>
+            <a:pPr lvl="1"/>
+            <a:r>
+              <a:rPr lang="pl-PL" dirty="0" smtClean="0"/>
+              <a:t>IObservableValue</a:t>
+            </a:r>
+            <a:endParaRPr lang="pl-PL" dirty="0" smtClean="0"/>
+          </a:p>
+          <a:p>
+            <a:pPr lvl="1"/>
+            <a:r>
+              <a:rPr lang="pl-PL" dirty="0" smtClean="0"/>
+              <a:t>UpdateValueStrategy</a:t>
+            </a:r>
+            <a:endParaRPr lang="pl-PL" dirty="0" smtClean="0"/>
+          </a:p>
+          <a:p>
+            <a:r>
+              <a:rPr lang="pl-PL" dirty="0" smtClean="0"/>
+              <a:t>Validating inputs:</a:t>
+            </a:r>
+          </a:p>
+          <a:p>
+            <a:pPr lvl="1"/>
+            <a:r>
+              <a:rPr lang="pl-PL" dirty="0"/>
+              <a:t>Object Constraint Language (OCL)</a:t>
+            </a:r>
+            <a:endParaRPr lang="pl-PL" dirty="0" smtClean="0"/>
+          </a:p>
+          <a:p>
+            <a:pPr lvl="1"/>
+            <a:r>
+              <a:rPr lang="pl-PL" dirty="0" smtClean="0"/>
+              <a:t>Java</a:t>
+            </a:r>
+            <a:endParaRPr lang="pl-PL" dirty="0"/>
           </a:p>
         </p:txBody>
       </p:sp>
@@ -6977,6 +7031,47 @@
           </a:p>
         </p:txBody>
       </p:sp>
+      <p:pic>
+        <p:nvPicPr>
+          <p:cNvPr id="7" name="Picture 2" descr="https://eclipse.org/modeling/emf/images/emf_logo.png"/>
+          <p:cNvPicPr>
+            <a:picLocks noChangeAspect="1" noChangeArrowheads="1"/>
+          </p:cNvPicPr>
+          <p:nvPr/>
+        </p:nvPicPr>
+        <p:blipFill>
+          <a:blip r:embed="rId2">
+            <a:extLst>
+              <a:ext uri="{28A0092B-C50C-407E-A947-70E740481C1C}">
+                <a14:useLocalDpi xmlns:a14="http://schemas.microsoft.com/office/drawing/2010/main" val="0"/>
+              </a:ext>
+            </a:extLst>
+          </a:blip>
+          <a:srcRect/>
+          <a:stretch>
+            <a:fillRect/>
+          </a:stretch>
+        </p:blipFill>
+        <p:spPr bwMode="auto">
+          <a:xfrm>
+            <a:off x="5082346" y="3951975"/>
+            <a:ext cx="2771775" cy="1238250"/>
+          </a:xfrm>
+          <a:prstGeom prst="rect">
+            <a:avLst/>
+          </a:prstGeom>
+          <a:noFill/>
+          <a:extLst>
+            <a:ext uri="{909E8E84-426E-40DD-AFC4-6F175D3DCCD1}">
+              <a14:hiddenFill xmlns:a14="http://schemas.microsoft.com/office/drawing/2010/main">
+                <a:solidFill>
+                  <a:srgbClr val="FFFFFF"/>
+                </a:solidFill>
+              </a14:hiddenFill>
+            </a:ext>
+          </a:extLst>
+        </p:spPr>
+      </p:pic>
     </p:spTree>
     <p:extLst>
       <p:ext uri="{BB962C8B-B14F-4D97-AF65-F5344CB8AC3E}">
@@ -7059,7 +7154,7 @@
           <a:bodyPr/>
           <a:lstStyle/>
           <a:p>
-            <a:endParaRPr lang="pl-PL"/>
+            <a:endParaRPr lang="pl-PL" dirty="0"/>
           </a:p>
         </p:txBody>
       </p:sp>
@@ -7139,10 +7234,240 @@
           </a:p>
         </p:txBody>
       </p:sp>
+      <p:pic>
+        <p:nvPicPr>
+          <p:cNvPr id="8" name="Picture 2" descr="https://eclipse.org/modeling/emf/images/emf_logo.png"/>
+          <p:cNvPicPr>
+            <a:picLocks noChangeAspect="1" noChangeArrowheads="1"/>
+          </p:cNvPicPr>
+          <p:nvPr/>
+        </p:nvPicPr>
+        <p:blipFill>
+          <a:blip r:embed="rId2">
+            <a:extLst>
+              <a:ext uri="{28A0092B-C50C-407E-A947-70E740481C1C}">
+                <a14:useLocalDpi xmlns:a14="http://schemas.microsoft.com/office/drawing/2010/main" val="0"/>
+              </a:ext>
+            </a:extLst>
+          </a:blip>
+          <a:srcRect/>
+          <a:stretch>
+            <a:fillRect/>
+          </a:stretch>
+        </p:blipFill>
+        <p:spPr bwMode="auto">
+          <a:xfrm>
+            <a:off x="5082346" y="3951975"/>
+            <a:ext cx="2771775" cy="1238250"/>
+          </a:xfrm>
+          <a:prstGeom prst="rect">
+            <a:avLst/>
+          </a:prstGeom>
+          <a:noFill/>
+          <a:extLst>
+            <a:ext uri="{909E8E84-426E-40DD-AFC4-6F175D3DCCD1}">
+              <a14:hiddenFill xmlns:a14="http://schemas.microsoft.com/office/drawing/2010/main">
+                <a:solidFill>
+                  <a:srgbClr val="FFFFFF"/>
+                </a:solidFill>
+              </a14:hiddenFill>
+            </a:ext>
+          </a:extLst>
+        </p:spPr>
+      </p:pic>
     </p:spTree>
     <p:extLst>
       <p:ext uri="{BB962C8B-B14F-4D97-AF65-F5344CB8AC3E}">
         <p14:creationId xmlns:p14="http://schemas.microsoft.com/office/powerpoint/2010/main" val="1569897419"/>
+      </p:ext>
+    </p:extLst>
+  </p:cSld>
+  <p:clrMapOvr>
+    <a:masterClrMapping/>
+  </p:clrMapOvr>
+  <p:timing>
+    <p:tnLst>
+      <p:par>
+        <p:cTn id="1" dur="indefinite" restart="never" nodeType="tmRoot"/>
+      </p:par>
+    </p:tnLst>
+  </p:timing>
+</p:sld>
+</file>
+
+<file path=ppt/slides/slide13.xml><?xml version="1.0" encoding="utf-8"?>
+<p:sld xmlns:a="http://schemas.openxmlformats.org/drawingml/2006/main" xmlns:r="http://schemas.openxmlformats.org/officeDocument/2006/relationships" xmlns:p="http://schemas.openxmlformats.org/presentationml/2006/main">
+  <p:cSld>
+    <p:spTree>
+      <p:nvGrpSpPr>
+        <p:cNvPr id="1" name=""/>
+        <p:cNvGrpSpPr/>
+        <p:nvPr/>
+      </p:nvGrpSpPr>
+      <p:grpSpPr>
+        <a:xfrm>
+          <a:off x="0" y="0"/>
+          <a:ext cx="0" cy="0"/>
+          <a:chOff x="0" y="0"/>
+          <a:chExt cx="0" cy="0"/>
+        </a:xfrm>
+      </p:grpSpPr>
+      <p:sp>
+        <p:nvSpPr>
+          <p:cNvPr id="2" name="Title 1"/>
+          <p:cNvSpPr>
+            <a:spLocks noGrp="1"/>
+          </p:cNvSpPr>
+          <p:nvPr>
+            <p:ph type="title"/>
+          </p:nvPr>
+        </p:nvSpPr>
+        <p:spPr/>
+        <p:txBody>
+          <a:bodyPr/>
+          <a:lstStyle/>
+          <a:p>
+            <a:r>
+              <a:rPr lang="pl-PL" dirty="0" smtClean="0"/>
+              <a:t>Thanks!</a:t>
+            </a:r>
+            <a:endParaRPr lang="pl-PL" dirty="0"/>
+          </a:p>
+        </p:txBody>
+      </p:sp>
+      <p:sp>
+        <p:nvSpPr>
+          <p:cNvPr id="3" name="Text Placeholder 2"/>
+          <p:cNvSpPr>
+            <a:spLocks noGrp="1"/>
+          </p:cNvSpPr>
+          <p:nvPr>
+            <p:ph type="body" sz="quarter" idx="13"/>
+          </p:nvPr>
+        </p:nvSpPr>
+        <p:spPr/>
+        <p:txBody>
+          <a:bodyPr/>
+          <a:lstStyle/>
+          <a:p>
+            <a:r>
+              <a:rPr lang="pl-PL" dirty="0">
+                <a:hlinkClick r:id="rId2"/>
+              </a:rPr>
+              <a:t>https://eclipse.org/modeling/emf</a:t>
+            </a:r>
+            <a:r>
+              <a:rPr lang="pl-PL" dirty="0" smtClean="0">
+                <a:hlinkClick r:id="rId2"/>
+              </a:rPr>
+              <a:t>/</a:t>
+            </a:r>
+            <a:r>
+              <a:rPr lang="pl-PL" dirty="0" smtClean="0"/>
+              <a:t> </a:t>
+            </a:r>
+          </a:p>
+          <a:p>
+            <a:r>
+              <a:rPr lang="pl-PL" dirty="0">
+                <a:hlinkClick r:id="rId3"/>
+              </a:rPr>
+              <a:t>http://www.eclipse.org/modeling/emf/docs</a:t>
+            </a:r>
+            <a:r>
+              <a:rPr lang="pl-PL" dirty="0" smtClean="0">
+                <a:hlinkClick r:id="rId3"/>
+              </a:rPr>
+              <a:t>/</a:t>
+            </a:r>
+            <a:r>
+              <a:rPr lang="pl-PL" dirty="0" smtClean="0"/>
+              <a:t> </a:t>
+            </a:r>
+            <a:endParaRPr lang="pl-PL" dirty="0"/>
+          </a:p>
+        </p:txBody>
+      </p:sp>
+      <p:sp>
+        <p:nvSpPr>
+          <p:cNvPr id="4" name="Footer Placeholder 3"/>
+          <p:cNvSpPr>
+            <a:spLocks noGrp="1"/>
+          </p:cNvSpPr>
+          <p:nvPr>
+            <p:ph type="ftr" sz="quarter" idx="11"/>
+          </p:nvPr>
+        </p:nvSpPr>
+        <p:spPr/>
+        <p:txBody>
+          <a:bodyPr/>
+          <a:lstStyle/>
+          <a:p>
+            <a:r>
+              <a:rPr lang="pl-PL" smtClean="0"/>
+              <a:t>www.rec-global.com</a:t>
+            </a:r>
+            <a:endParaRPr lang="pl-PL" dirty="0">
+              <a:solidFill>
+                <a:schemeClr val="tx1"/>
+              </a:solidFill>
+            </a:endParaRPr>
+          </a:p>
+        </p:txBody>
+      </p:sp>
+      <p:sp>
+        <p:nvSpPr>
+          <p:cNvPr id="5" name="Slide Number Placeholder 4"/>
+          <p:cNvSpPr>
+            <a:spLocks noGrp="1"/>
+          </p:cNvSpPr>
+          <p:nvPr>
+            <p:ph type="sldNum" sz="quarter" idx="12"/>
+          </p:nvPr>
+        </p:nvSpPr>
+        <p:spPr/>
+        <p:txBody>
+          <a:bodyPr/>
+          <a:lstStyle/>
+          <a:p>
+            <a:pPr algn="ctr"/>
+            <a:fld id="{49FFD7C8-786B-42CE-8D79-AFCFE16DD4F2}" type="slidenum">
+              <a:rPr lang="pl-PL" smtClean="0"/>
+              <a:pPr algn="ctr"/>
+              <a:t>13</a:t>
+            </a:fld>
+            <a:endParaRPr lang="pl-PL" dirty="0"/>
+          </a:p>
+        </p:txBody>
+      </p:sp>
+      <p:sp>
+        <p:nvSpPr>
+          <p:cNvPr id="6" name="Date Placeholder 5"/>
+          <p:cNvSpPr>
+            <a:spLocks noGrp="1"/>
+          </p:cNvSpPr>
+          <p:nvPr>
+            <p:ph type="dt" sz="half" idx="10"/>
+          </p:nvPr>
+        </p:nvSpPr>
+        <p:spPr/>
+        <p:txBody>
+          <a:bodyPr/>
+          <a:lstStyle/>
+          <a:p>
+            <a:fld id="{A1C14688-799C-45A6-846F-47D660935463}" type="datetime1">
+              <a:rPr lang="pl-PL" smtClean="0"/>
+              <a:pPr/>
+              <a:t>2015-09-14</a:t>
+            </a:fld>
+            <a:endParaRPr lang="pl-PL" dirty="0"/>
+          </a:p>
+        </p:txBody>
+      </p:sp>
+    </p:spTree>
+    <p:extLst>
+      <p:ext uri="{BB962C8B-B14F-4D97-AF65-F5344CB8AC3E}">
+        <p14:creationId xmlns:p14="http://schemas.microsoft.com/office/powerpoint/2010/main" val="3584553472"/>
       </p:ext>
     </p:extLst>
   </p:cSld>
@@ -7350,7 +7675,7 @@
             </a:pPr>
             <a:r>
               <a:rPr lang="pl-PL" dirty="0"/>
-              <a:t>EMF demo: </a:t>
+              <a:t>EMF demo: data binding &amp; </a:t>
             </a:r>
             <a:r>
               <a:rPr lang="pl-PL" dirty="0" smtClean="0"/>
@@ -7367,18 +7692,6 @@
               <a:rPr lang="pl-PL" dirty="0" smtClean="0"/>
               <a:t>EMF demo: generating a UI editor</a:t>
             </a:r>
-          </a:p>
-          <a:p>
-            <a:pPr lvl="0">
-              <a:lnSpc>
-                <a:spcPct val="150000"/>
-              </a:lnSpc>
-            </a:pPr>
-            <a:endParaRPr lang="en-US" dirty="0"/>
-          </a:p>
-          <a:p>
-            <a:pPr lvl="1"/>
-            <a:endParaRPr lang="pl-PL" dirty="0" smtClean="0"/>
           </a:p>
           <a:p>
             <a:pPr lvl="2"/>
@@ -9694,6 +10007,13 @@
             </a:r>
           </a:p>
           <a:p>
+            <a:pPr lvl="2"/>
+            <a:r>
+              <a:rPr lang="pl-PL" dirty="0" smtClean="0"/>
+              <a:t>...</a:t>
+            </a:r>
+          </a:p>
+          <a:p>
             <a:pPr lvl="1"/>
             <a:r>
               <a:rPr lang="pl-PL" dirty="0" smtClean="0"/>
@@ -9704,16 +10024,29 @@
             <a:pPr lvl="2"/>
             <a:r>
               <a:rPr lang="pl-PL" dirty="0" smtClean="0"/>
+              <a:t>eResource</a:t>
+            </a:r>
+          </a:p>
+          <a:p>
+            <a:pPr lvl="2"/>
+            <a:r>
+              <a:rPr lang="pl-PL" dirty="0" smtClean="0"/>
               <a:t>eContainer</a:t>
             </a:r>
           </a:p>
           <a:p>
             <a:pPr lvl="2"/>
             <a:r>
-              <a:rPr lang="pl-PL" dirty="0"/>
+              <a:rPr lang="pl-PL" dirty="0" smtClean="0"/>
               <a:t>eContents</a:t>
             </a:r>
-            <a:endParaRPr lang="pl-PL" dirty="0" smtClean="0"/>
+          </a:p>
+          <a:p>
+            <a:pPr lvl="2"/>
+            <a:r>
+              <a:rPr lang="pl-PL" dirty="0" smtClean="0"/>
+              <a:t>...</a:t>
+            </a:r>
           </a:p>
         </p:txBody>
       </p:sp>
@@ -10124,6 +10457,99 @@
                                           <p:spTgt spid="3">
                                             <p:txEl>
                                               <p:pRg st="8" end="8"/>
+                                            </p:txEl>
+                                          </p:spTgt>
+                                        </p:tgtEl>
+                                        <p:attrNameLst>
+                                          <p:attrName>style.visibility</p:attrName>
+                                        </p:attrNameLst>
+                                      </p:cBhvr>
+                                      <p:to>
+                                        <p:strVal val="visible"/>
+                                      </p:to>
+                                    </p:set>
+                                  </p:childTnLst>
+                                </p:cTn>
+                              </p:par>
+                              <p:par>
+                                <p:cTn id="27" presetID="1" presetClass="entr" presetSubtype="0" fill="hold" nodeType="withEffect">
+                                  <p:stCondLst>
+                                    <p:cond delay="0"/>
+                                  </p:stCondLst>
+                                  <p:childTnLst>
+                                    <p:set>
+                                      <p:cBhvr>
+                                        <p:cTn id="28" dur="1" fill="hold">
+                                          <p:stCondLst>
+                                            <p:cond delay="0"/>
+                                          </p:stCondLst>
+                                        </p:cTn>
+                                        <p:tgtEl>
+                                          <p:spTgt spid="3">
+                                            <p:txEl>
+                                              <p:pRg st="9" end="9"/>
+                                            </p:txEl>
+                                          </p:spTgt>
+                                        </p:tgtEl>
+                                        <p:attrNameLst>
+                                          <p:attrName>style.visibility</p:attrName>
+                                        </p:attrNameLst>
+                                      </p:cBhvr>
+                                      <p:to>
+                                        <p:strVal val="visible"/>
+                                      </p:to>
+                                    </p:set>
+                                  </p:childTnLst>
+                                </p:cTn>
+                              </p:par>
+                              <p:par>
+                                <p:cTn id="29" presetID="1" presetClass="entr" presetSubtype="0" fill="hold" nodeType="withEffect">
+                                  <p:stCondLst>
+                                    <p:cond delay="0"/>
+                                  </p:stCondLst>
+                                  <p:childTnLst>
+                                    <p:set>
+                                      <p:cBhvr>
+                                        <p:cTn id="30" dur="1" fill="hold">
+                                          <p:stCondLst>
+                                            <p:cond delay="0"/>
+                                          </p:stCondLst>
+                                        </p:cTn>
+                                        <p:tgtEl>
+                                          <p:spTgt spid="3">
+                                            <p:txEl>
+                                              <p:pRg st="10" end="10"/>
+                                            </p:txEl>
+                                          </p:spTgt>
+                                        </p:tgtEl>
+                                        <p:attrNameLst>
+                                          <p:attrName>style.visibility</p:attrName>
+                                        </p:attrNameLst>
+                                      </p:cBhvr>
+                                      <p:to>
+                                        <p:strVal val="visible"/>
+                                      </p:to>
+                                    </p:set>
+                                  </p:childTnLst>
+                                </p:cTn>
+                              </p:par>
+                              <p:par>
+                                <p:cTn id="31" presetID="1" presetClass="entr" presetSubtype="0" fill="hold" nodeType="withEffect">
+                                  <p:stCondLst>
+                                    <p:cond delay="0"/>
+                                  </p:stCondLst>
+                                  <p:childTnLst>
+                                    <p:set>
+                                      <p:cBhvr>
+                                        <p:cTn id="32" dur="1" fill="hold">
+                                          <p:stCondLst>
+                                            <p:cond delay="0"/>
+                                          </p:stCondLst>
+                                        </p:cTn>
+                                        <p:tgtEl>
+                                          <p:spTgt spid="3">
+                                            <p:txEl>
+                                              <p:pRg st="11" end="11"/>
                                             </p:txEl>
                                           </p:spTgt>
                                         </p:tgtEl>
@@ -11530,12 +11956,6 @@
 </file>
 
 <file path=customXml/item2.xml><?xml version="1.0" encoding="utf-8"?>
-<p:properties xmlns:p="http://schemas.microsoft.com/office/2006/metadata/properties" xmlns:xsi="http://www.w3.org/2001/XMLSchema-instance" xmlns:pc="http://schemas.microsoft.com/office/infopath/2007/PartnerControls">
-  <documentManagement/>
-</p:properties>
-</file>
-
-<file path=customXml/item3.xml><?xml version="1.0" encoding="utf-8"?>
 <ct:contentTypeSchema xmlns:ct="http://schemas.microsoft.com/office/2006/metadata/contentType" xmlns:ma="http://schemas.microsoft.com/office/2006/metadata/properties/metaAttributes" ct:_="" ma:_="" ma:contentTypeName="Document" ma:contentTypeID="0x010100936691DD97235843B5E96CA882CD7A85" ma:contentTypeVersion="5" ma:contentTypeDescription="Create a new document." ma:contentTypeScope="" ma:versionID="6f08e88fdeac68ac664784283c60f55d">
   <xsd:schema xmlns:xsd="http://www.w3.org/2001/XMLSchema" xmlns:xs="http://www.w3.org/2001/XMLSchema" xmlns:p="http://schemas.microsoft.com/office/2006/metadata/properties" targetNamespace="http://schemas.microsoft.com/office/2006/metadata/properties" ma:root="true" ma:fieldsID="1b420e54b54d84c99c75ea622d6798e7">
     <xsd:element name="properties">
@@ -11649,6 +12069,12 @@
 </ct:contentTypeSchema>
 </file>
 
+<file path=customXml/item3.xml><?xml version="1.0" encoding="utf-8"?>
+<p:properties xmlns:p="http://schemas.microsoft.com/office/2006/metadata/properties" xmlns:xsi="http://www.w3.org/2001/XMLSchema-instance" xmlns:pc="http://schemas.microsoft.com/office/infopath/2007/PartnerControls">
+  <documentManagement/>
+</p:properties>
+</file>
+
 <file path=customXml/itemProps1.xml><?xml version="1.0" encoding="utf-8"?>
 <ds:datastoreItem xmlns:ds="http://schemas.openxmlformats.org/officeDocument/2006/customXml" ds:itemID="{6AA8B675-C754-493C-B718-CAC6BC23635B}">
   <ds:schemaRefs>
@@ -11658,21 +12084,6 @@
 </file>
 
 <file path=customXml/itemProps2.xml><?xml version="1.0" encoding="utf-8"?>
-<ds:datastoreItem xmlns:ds="http://schemas.openxmlformats.org/officeDocument/2006/customXml" ds:itemID="{BD743871-875D-472A-961D-1DCE1A0B5DE9}">
-  <ds:schemaRefs>
-    <ds:schemaRef ds:uri="http://www.w3.org/XML/1998/namespace"/>
-    <ds:schemaRef ds:uri="http://schemas.microsoft.com/office/2006/metadata/properties"/>
-    <ds:schemaRef ds:uri="http://schemas.microsoft.com/office/2006/documentManagement/types"/>
-    <ds:schemaRef ds:uri="http://purl.org/dc/dcmitype/"/>
-    <ds:schemaRef ds:uri="http://purl.org/dc/elements/1.1/"/>
-    <ds:schemaRef ds:uri="http://purl.org/dc/terms/"/>
-    <ds:schemaRef ds:uri="http://schemas.microsoft.com/office/infopath/2007/PartnerControls"/>
-    <ds:schemaRef ds:uri="http://schemas.openxmlformats.org/package/2006/metadata/core-properties"/>
-  </ds:schemaRefs>
-</ds:datastoreItem>
-</file>
-
-<file path=customXml/itemProps3.xml><?xml version="1.0" encoding="utf-8"?>
 <ds:datastoreItem xmlns:ds="http://schemas.openxmlformats.org/officeDocument/2006/customXml" ds:itemID="{89F2C655-CE6E-4709-BE63-9C397722D50F}">
   <ds:schemaRefs>
     <ds:schemaRef ds:uri="http://schemas.microsoft.com/office/2006/metadata/contentType"/>
@@ -11686,4 +12097,19 @@
     <ds:schemaRef ds:uri="http://schemas.microsoft.com/office/infopath/2007/PartnerControls"/>
   </ds:schemaRefs>
 </ds:datastoreItem>
+</file>
+
+<file path=customXml/itemProps3.xml><?xml version="1.0" encoding="utf-8"?>
+<ds:datastoreItem xmlns:ds="http://schemas.openxmlformats.org/officeDocument/2006/customXml" ds:itemID="{BD743871-875D-472A-961D-1DCE1A0B5DE9}">
+  <ds:schemaRefs>
+    <ds:schemaRef ds:uri="http://www.w3.org/XML/1998/namespace"/>
+    <ds:schemaRef ds:uri="http://schemas.microsoft.com/office/2006/metadata/properties"/>
+    <ds:schemaRef ds:uri="http://schemas.microsoft.com/office/2006/documentManagement/types"/>
+    <ds:schemaRef ds:uri="http://purl.org/dc/dcmitype/"/>
+    <ds:schemaRef ds:uri="http://purl.org/dc/elements/1.1/"/>
+    <ds:schemaRef ds:uri="http://purl.org/dc/terms/"/>
+    <ds:schemaRef ds:uri="http://schemas.microsoft.com/office/infopath/2007/PartnerControls"/>
+    <ds:schemaRef ds:uri="http://schemas.openxmlformats.org/package/2006/metadata/core-properties"/>
+  </ds:schemaRefs>
+</ds:datastoreItem>
 </file>
</xml_diff>

<commit_message>
added a method for validating an email address.
</commit_message>
<xml_diff>
--- a/JUG - EMF.pptx
+++ b/JUG - EMF.pptx
@@ -5,10 +5,10 @@
     <p:sldMasterId id="2147483648" r:id="rId4"/>
   </p:sldMasterIdLst>
   <p:notesMasterIdLst>
-    <p:notesMasterId r:id="rId18"/>
+    <p:notesMasterId r:id="rId19"/>
   </p:notesMasterIdLst>
   <p:handoutMasterIdLst>
-    <p:handoutMasterId r:id="rId19"/>
+    <p:handoutMasterId r:id="rId20"/>
   </p:handoutMasterIdLst>
   <p:sldIdLst>
     <p:sldId id="280" r:id="rId5"/>
@@ -23,7 +23,8 @@
     <p:sldId id="288" r:id="rId14"/>
     <p:sldId id="289" r:id="rId15"/>
     <p:sldId id="290" r:id="rId16"/>
-    <p:sldId id="291" r:id="rId17"/>
+    <p:sldId id="292" r:id="rId17"/>
+    <p:sldId id="291" r:id="rId18"/>
   </p:sldIdLst>
   <p:sldSz cx="12192000" cy="6858000"/>
   <p:notesSz cx="6858000" cy="9144000"/>
@@ -6521,7 +6522,15 @@
           <a:p>
             <a:r>
               <a:rPr lang="pl-PL" dirty="0"/>
-              <a:t>EMF demo: command </a:t>
+              <a:t>EMF </a:t>
+            </a:r>
+            <a:r>
+              <a:rPr lang="pl-PL" dirty="0"/>
+              <a:t>demo - </a:t>
+            </a:r>
+            <a:r>
+              <a:rPr lang="pl-PL" dirty="0"/>
+              <a:t>command </a:t>
             </a:r>
             <a:r>
               <a:rPr lang="pl-PL" dirty="0" smtClean="0"/>
@@ -6873,7 +6882,11 @@
           <a:p>
             <a:r>
               <a:rPr lang="pl-PL" dirty="0"/>
-              <a:t>EMF demo: </a:t>
+              <a:t>EMF </a:t>
+            </a:r>
+            <a:r>
+              <a:rPr lang="pl-PL" dirty="0"/>
+              <a:t>demo - </a:t>
             </a:r>
             <a:r>
               <a:rPr lang="pl-PL" dirty="0" smtClean="0"/>
@@ -6930,8 +6943,13 @@
           <a:p>
             <a:r>
               <a:rPr lang="pl-PL" sz="2200" dirty="0" smtClean="0"/>
-              <a:t>Validating inputs:</a:t>
-            </a:r>
+              <a:t>Validating </a:t>
+            </a:r>
+            <a:r>
+              <a:rPr lang="pl-PL" sz="2200" dirty="0" smtClean="0"/>
+              <a:t>inputs</a:t>
+            </a:r>
+            <a:endParaRPr lang="pl-PL" sz="2200" dirty="0" smtClean="0"/>
           </a:p>
           <a:p>
             <a:pPr lvl="1"/>
@@ -7401,7 +7419,15 @@
             <a:pPr lvl="0"/>
             <a:r>
               <a:rPr lang="pl-PL" dirty="0"/>
-              <a:t>EMF demo: generating a UI </a:t>
+              <a:t>EMF </a:t>
+            </a:r>
+            <a:r>
+              <a:rPr lang="pl-PL" dirty="0"/>
+              <a:t>demo - </a:t>
+            </a:r>
+            <a:r>
+              <a:rPr lang="pl-PL" dirty="0"/>
+              <a:t>generating a UI </a:t>
             </a:r>
             <a:r>
               <a:rPr lang="pl-PL" dirty="0" smtClean="0"/>
@@ -7426,6 +7452,35 @@
           <a:bodyPr/>
           <a:lstStyle/>
           <a:p>
+            <a:r>
+              <a:rPr lang="pl-PL" dirty="0" smtClean="0"/>
+              <a:t>A simple UI editor created using EMF Forms </a:t>
+            </a:r>
+            <a:r>
+              <a:rPr lang="pl-PL" dirty="0" smtClean="0"/>
+              <a:t>framework</a:t>
+            </a:r>
+          </a:p>
+          <a:p>
+            <a:pPr marL="0" indent="0">
+              <a:buNone/>
+            </a:pPr>
+            <a:r>
+              <a:rPr lang="pl-PL" dirty="0">
+                <a:hlinkClick r:id="rId2"/>
+              </a:rPr>
+              <a:t>http://www.eclipse.org/ecp/emfforms</a:t>
+            </a:r>
+            <a:r>
+              <a:rPr lang="pl-PL" dirty="0" smtClean="0">
+                <a:hlinkClick r:id="rId2"/>
+              </a:rPr>
+              <a:t>/</a:t>
+            </a:r>
+            <a:r>
+              <a:rPr lang="pl-PL" dirty="0" smtClean="0"/>
+              <a:t> </a:t>
+            </a:r>
             <a:endParaRPr lang="pl-PL" dirty="0"/>
           </a:p>
         </p:txBody>
@@ -7515,7 +7570,7 @@
           <p:nvPr/>
         </p:nvPicPr>
         <p:blipFill>
-          <a:blip r:embed="rId2">
+          <a:blip r:embed="rId3">
             <a:extLst>
               <a:ext uri="{28A0092B-C50C-407E-A947-70E740481C1C}">
                 <a14:useLocalDpi xmlns:a14="http://schemas.microsoft.com/office/drawing/2010/main" val="0"/>
@@ -7600,10 +7655,25 @@
           <a:lstStyle/>
           <a:p>
             <a:r>
+              <a:rPr lang="pl-PL" dirty="0"/>
+              <a:t>EMF </a:t>
+            </a:r>
+            <a:r>
+              <a:rPr lang="pl-PL" dirty="0"/>
+              <a:t>demo - </a:t>
+            </a:r>
+            <a:r>
+              <a:rPr lang="pl-PL" dirty="0"/>
+              <a:t>generating a </a:t>
+            </a:r>
+            <a:r>
               <a:rPr lang="pl-PL" dirty="0" smtClean="0"/>
-              <a:t>Thanks!</a:t>
-            </a:r>
-            <a:endParaRPr lang="pl-PL" dirty="0"/>
+              <a:t>Sirius-based </a:t>
+            </a:r>
+            <a:r>
+              <a:rPr lang="pl-PL" dirty="0"/>
+              <a:t>editor</a:t>
+            </a:r>
           </a:p>
         </p:txBody>
       </p:sp>
@@ -7622,39 +7692,95 @@
           <a:bodyPr/>
           <a:lstStyle/>
           <a:p>
+            <a:r>
+              <a:rPr lang="pl-PL" dirty="0" smtClean="0"/>
+              <a:t>Sirius:</a:t>
+            </a:r>
+          </a:p>
+          <a:p>
+            <a:pPr marL="0" indent="0">
+              <a:buNone/>
+            </a:pPr>
+            <a:r>
+              <a:rPr lang="pl-PL" i="1" dirty="0" smtClean="0"/>
+              <a:t>„</a:t>
+            </a:r>
+            <a:r>
+              <a:rPr lang="en-US" b="1" i="1" dirty="0" smtClean="0"/>
+              <a:t>Sirius</a:t>
+            </a:r>
+            <a:r>
+              <a:rPr lang="en-US" i="1" dirty="0" smtClean="0"/>
+              <a:t> </a:t>
+            </a:r>
+            <a:r>
+              <a:rPr lang="en-US" i="1" dirty="0"/>
+              <a:t>is an Eclipse project which </a:t>
+            </a:r>
+            <a:r>
+              <a:rPr lang="en-US" b="1" i="1" dirty="0"/>
+              <a:t>allows you</a:t>
+            </a:r>
+            <a:r>
+              <a:rPr lang="en-US" i="1" dirty="0"/>
+              <a:t> to easily </a:t>
+            </a:r>
+            <a:r>
+              <a:rPr lang="en-US" b="1" i="1" dirty="0"/>
+              <a:t>create</a:t>
+            </a:r>
+            <a:r>
+              <a:rPr lang="en-US" i="1" dirty="0"/>
+              <a:t> your own </a:t>
+            </a:r>
+            <a:r>
+              <a:rPr lang="en-US" b="1" i="1" dirty="0"/>
+              <a:t>graphical</a:t>
+            </a:r>
+            <a:r>
+              <a:rPr lang="en-US" i="1" dirty="0"/>
+              <a:t> </a:t>
+            </a:r>
+            <a:r>
+              <a:rPr lang="en-US" b="1" i="1" dirty="0"/>
+              <a:t>modeling</a:t>
+            </a:r>
+            <a:r>
+              <a:rPr lang="en-US" i="1" dirty="0"/>
+              <a:t> </a:t>
+            </a:r>
+            <a:r>
+              <a:rPr lang="en-US" b="1" i="1" dirty="0"/>
+              <a:t>workbench</a:t>
+            </a:r>
+            <a:r>
+              <a:rPr lang="en-US" i="1" dirty="0"/>
+              <a:t> by leveraging the Eclipse Modeling technologies, including EMF and GMF</a:t>
+            </a:r>
+            <a:r>
+              <a:rPr lang="en-US" i="1" dirty="0" smtClean="0"/>
+              <a:t>.</a:t>
+            </a:r>
+            <a:r>
+              <a:rPr lang="pl-PL" i="1" dirty="0" smtClean="0"/>
+              <a:t>”</a:t>
+            </a:r>
+          </a:p>
+          <a:p>
+            <a:pPr marL="0" indent="0">
+              <a:buNone/>
+            </a:pPr>
             <a:r>
               <a:rPr lang="pl-PL" dirty="0">
                 <a:hlinkClick r:id="rId2"/>
               </a:rPr>
-              <a:t>https://eclipse.org/modeling/emf</a:t>
+              <a:t>https://</a:t>
             </a:r>
             <a:r>
               <a:rPr lang="pl-PL" dirty="0" smtClean="0">
                 <a:hlinkClick r:id="rId2"/>
               </a:rPr>
-              <a:t>/</a:t>
-            </a:r>
-            <a:r>
-              <a:rPr lang="pl-PL" dirty="0" smtClean="0"/>
-              <a:t> </a:t>
-            </a:r>
-          </a:p>
-          <a:p>
-            <a:r>
-              <a:rPr lang="pl-PL" dirty="0">
-                <a:hlinkClick r:id="rId3"/>
-              </a:rPr>
-              <a:t>http://www.eclipse.org/modeling/emf/docs</a:t>
-            </a:r>
-            <a:r>
-              <a:rPr lang="pl-PL" dirty="0" smtClean="0">
-                <a:hlinkClick r:id="rId3"/>
-              </a:rPr>
-              <a:t>/</a:t>
-            </a:r>
-            <a:r>
-              <a:rPr lang="pl-PL" dirty="0" smtClean="0"/>
-              <a:t> </a:t>
+              <a:t>eclipse.org/sirius/overview.html</a:t>
             </a:r>
             <a:endParaRPr lang="pl-PL" dirty="0"/>
           </a:p>
@@ -7707,6 +7833,293 @@
               <a:rPr lang="pl-PL" smtClean="0"/>
               <a:pPr algn="ctr"/>
               <a:t>13</a:t>
+            </a:fld>
+            <a:endParaRPr lang="pl-PL" dirty="0"/>
+          </a:p>
+        </p:txBody>
+      </p:sp>
+      <p:sp>
+        <p:nvSpPr>
+          <p:cNvPr id="6" name="Date Placeholder 5"/>
+          <p:cNvSpPr>
+            <a:spLocks noGrp="1"/>
+          </p:cNvSpPr>
+          <p:nvPr>
+            <p:ph type="dt" sz="half" idx="10"/>
+          </p:nvPr>
+        </p:nvSpPr>
+        <p:spPr/>
+        <p:txBody>
+          <a:bodyPr/>
+          <a:lstStyle/>
+          <a:p>
+            <a:fld id="{A1C14688-799C-45A6-846F-47D660935463}" type="datetime1">
+              <a:rPr lang="pl-PL" smtClean="0"/>
+              <a:pPr/>
+              <a:t>2015-09-14</a:t>
+            </a:fld>
+            <a:endParaRPr lang="pl-PL" dirty="0"/>
+          </a:p>
+        </p:txBody>
+      </p:sp>
+      <p:pic>
+        <p:nvPicPr>
+          <p:cNvPr id="7" name="Picture 2" descr="https://eclipse.org/modeling/emf/images/emf_logo.png"/>
+          <p:cNvPicPr>
+            <a:picLocks noChangeAspect="1" noChangeArrowheads="1"/>
+          </p:cNvPicPr>
+          <p:nvPr/>
+        </p:nvPicPr>
+        <p:blipFill>
+          <a:blip r:embed="rId3">
+            <a:extLst>
+              <a:ext uri="{28A0092B-C50C-407E-A947-70E740481C1C}">
+                <a14:useLocalDpi xmlns:a14="http://schemas.microsoft.com/office/drawing/2010/main" val="0"/>
+              </a:ext>
+            </a:extLst>
+          </a:blip>
+          <a:srcRect/>
+          <a:stretch>
+            <a:fillRect/>
+          </a:stretch>
+        </p:blipFill>
+        <p:spPr bwMode="auto">
+          <a:xfrm>
+            <a:off x="5082346" y="3951975"/>
+            <a:ext cx="2771775" cy="1238250"/>
+          </a:xfrm>
+          <a:prstGeom prst="rect">
+            <a:avLst/>
+          </a:prstGeom>
+          <a:noFill/>
+          <a:extLst>
+            <a:ext uri="{909E8E84-426E-40DD-AFC4-6F175D3DCCD1}">
+              <a14:hiddenFill xmlns:a14="http://schemas.microsoft.com/office/drawing/2010/main">
+                <a:solidFill>
+                  <a:srgbClr val="FFFFFF"/>
+                </a:solidFill>
+              </a14:hiddenFill>
+            </a:ext>
+          </a:extLst>
+        </p:spPr>
+      </p:pic>
+    </p:spTree>
+    <p:extLst>
+      <p:ext uri="{BB962C8B-B14F-4D97-AF65-F5344CB8AC3E}">
+        <p14:creationId xmlns:p14="http://schemas.microsoft.com/office/powerpoint/2010/main" val="2267755026"/>
+      </p:ext>
+    </p:extLst>
+  </p:cSld>
+  <p:clrMapOvr>
+    <a:masterClrMapping/>
+  </p:clrMapOvr>
+  <p:timing>
+    <p:tnLst>
+      <p:par>
+        <p:cTn id="1" dur="indefinite" restart="never" nodeType="tmRoot"/>
+      </p:par>
+    </p:tnLst>
+  </p:timing>
+</p:sld>
+</file>
+
+<file path=ppt/slides/slide14.xml><?xml version="1.0" encoding="utf-8"?>
+<p:sld xmlns:a="http://schemas.openxmlformats.org/drawingml/2006/main" xmlns:r="http://schemas.openxmlformats.org/officeDocument/2006/relationships" xmlns:p="http://schemas.openxmlformats.org/presentationml/2006/main">
+  <p:cSld>
+    <p:spTree>
+      <p:nvGrpSpPr>
+        <p:cNvPr id="1" name=""/>
+        <p:cNvGrpSpPr/>
+        <p:nvPr/>
+      </p:nvGrpSpPr>
+      <p:grpSpPr>
+        <a:xfrm>
+          <a:off x="0" y="0"/>
+          <a:ext cx="0" cy="0"/>
+          <a:chOff x="0" y="0"/>
+          <a:chExt cx="0" cy="0"/>
+        </a:xfrm>
+      </p:grpSpPr>
+      <p:sp>
+        <p:nvSpPr>
+          <p:cNvPr id="2" name="Title 1"/>
+          <p:cNvSpPr>
+            <a:spLocks noGrp="1"/>
+          </p:cNvSpPr>
+          <p:nvPr>
+            <p:ph type="title"/>
+          </p:nvPr>
+        </p:nvSpPr>
+        <p:spPr/>
+        <p:txBody>
+          <a:bodyPr/>
+          <a:lstStyle/>
+          <a:p>
+            <a:r>
+              <a:rPr lang="pl-PL" dirty="0" smtClean="0"/>
+              <a:t>Thanks!</a:t>
+            </a:r>
+            <a:endParaRPr lang="pl-PL" dirty="0"/>
+          </a:p>
+        </p:txBody>
+      </p:sp>
+      <p:sp>
+        <p:nvSpPr>
+          <p:cNvPr id="3" name="Text Placeholder 2"/>
+          <p:cNvSpPr>
+            <a:spLocks noGrp="1"/>
+          </p:cNvSpPr>
+          <p:nvPr>
+            <p:ph type="body" sz="quarter" idx="13"/>
+          </p:nvPr>
+        </p:nvSpPr>
+        <p:spPr/>
+        <p:txBody>
+          <a:bodyPr/>
+          <a:lstStyle/>
+          <a:p>
+            <a:pPr marL="228600" lvl="2">
+              <a:spcBef>
+                <a:spcPts val="1000"/>
+              </a:spcBef>
+              <a:buBlip>
+                <a:blip r:embed="rId2"/>
+              </a:buBlip>
+            </a:pPr>
+            <a:r>
+              <a:rPr lang="pl-PL" sz="2000" dirty="0">
+                <a:hlinkClick r:id="rId3"/>
+              </a:rPr>
+              <a:t>https://eclipse.org/modeling</a:t>
+            </a:r>
+            <a:r>
+              <a:rPr lang="pl-PL" sz="2000" dirty="0" smtClean="0">
+                <a:hlinkClick r:id="rId3"/>
+              </a:rPr>
+              <a:t>/</a:t>
+            </a:r>
+            <a:endParaRPr lang="pl-PL" dirty="0" smtClean="0">
+              <a:hlinkClick r:id="rId4"/>
+            </a:endParaRPr>
+          </a:p>
+          <a:p>
+            <a:r>
+              <a:rPr lang="pl-PL" dirty="0" smtClean="0">
+                <a:hlinkClick r:id="rId4"/>
+              </a:rPr>
+              <a:t>https</a:t>
+            </a:r>
+            <a:r>
+              <a:rPr lang="pl-PL" dirty="0">
+                <a:hlinkClick r:id="rId4"/>
+              </a:rPr>
+              <a:t>://eclipse.org/modeling/emf</a:t>
+            </a:r>
+            <a:r>
+              <a:rPr lang="pl-PL" dirty="0" smtClean="0">
+                <a:hlinkClick r:id="rId4"/>
+              </a:rPr>
+              <a:t>/</a:t>
+            </a:r>
+            <a:r>
+              <a:rPr lang="pl-PL" dirty="0" smtClean="0"/>
+              <a:t> </a:t>
+            </a:r>
+          </a:p>
+          <a:p>
+            <a:r>
+              <a:rPr lang="pl-PL" dirty="0">
+                <a:hlinkClick r:id="rId5"/>
+              </a:rPr>
+              <a:t>http://www.eclipse.org/modeling/emf/docs</a:t>
+            </a:r>
+            <a:r>
+              <a:rPr lang="pl-PL" dirty="0" smtClean="0">
+                <a:hlinkClick r:id="rId5"/>
+              </a:rPr>
+              <a:t>/</a:t>
+            </a:r>
+            <a:endParaRPr lang="pl-PL" dirty="0" smtClean="0"/>
+          </a:p>
+          <a:p>
+            <a:r>
+              <a:rPr lang="pl-PL" dirty="0">
+                <a:hlinkClick r:id="rId6"/>
+              </a:rPr>
+              <a:t>http://www.eclipse.org/ecp/emfforms/</a:t>
+            </a:r>
+            <a:r>
+              <a:rPr lang="pl-PL" dirty="0"/>
+              <a:t> </a:t>
+            </a:r>
+          </a:p>
+          <a:p>
+            <a:r>
+              <a:rPr lang="pl-PL" dirty="0" smtClean="0">
+                <a:hlinkClick r:id="rId7"/>
+              </a:rPr>
+              <a:t>https</a:t>
+            </a:r>
+            <a:r>
+              <a:rPr lang="pl-PL" dirty="0">
+                <a:hlinkClick r:id="rId7"/>
+              </a:rPr>
+              <a:t>://eclipse.org/sirius/overview.html</a:t>
+            </a:r>
+            <a:endParaRPr lang="pl-PL" dirty="0"/>
+          </a:p>
+          <a:p>
+            <a:endParaRPr lang="pl-PL" dirty="0"/>
+          </a:p>
+        </p:txBody>
+      </p:sp>
+      <p:sp>
+        <p:nvSpPr>
+          <p:cNvPr id="4" name="Footer Placeholder 3"/>
+          <p:cNvSpPr>
+            <a:spLocks noGrp="1"/>
+          </p:cNvSpPr>
+          <p:nvPr>
+            <p:ph type="ftr" sz="quarter" idx="11"/>
+          </p:nvPr>
+        </p:nvSpPr>
+        <p:spPr/>
+        <p:txBody>
+          <a:bodyPr/>
+          <a:lstStyle/>
+          <a:p>
+            <a:r>
+              <a:rPr lang="pl-PL" smtClean="0"/>
+              <a:t>www.rec-global.com</a:t>
+            </a:r>
+            <a:endParaRPr lang="pl-PL" dirty="0">
+              <a:solidFill>
+                <a:schemeClr val="tx1"/>
+              </a:solidFill>
+            </a:endParaRPr>
+          </a:p>
+        </p:txBody>
+      </p:sp>
+      <p:sp>
+        <p:nvSpPr>
+          <p:cNvPr id="5" name="Slide Number Placeholder 4"/>
+          <p:cNvSpPr>
+            <a:spLocks noGrp="1"/>
+          </p:cNvSpPr>
+          <p:nvPr>
+            <p:ph type="sldNum" sz="quarter" idx="12"/>
+          </p:nvPr>
+        </p:nvSpPr>
+        <p:spPr/>
+        <p:txBody>
+          <a:bodyPr/>
+          <a:lstStyle/>
+          <a:p>
+            <a:pPr algn="ctr"/>
+            <a:fld id="{49FFD7C8-786B-42CE-8D79-AFCFE16DD4F2}" type="slidenum">
+              <a:rPr lang="pl-PL" smtClean="0"/>
+              <a:pPr algn="ctr"/>
+              <a:t>14</a:t>
             </a:fld>
             <a:endParaRPr lang="pl-PL" dirty="0"/>
           </a:p>
@@ -7906,8 +8319,13 @@
             </a:r>
             <a:r>
               <a:rPr lang="pl-PL" sz="2200" dirty="0" smtClean="0"/>
-              <a:t>– frameworks</a:t>
-            </a:r>
+              <a:t>– </a:t>
+            </a:r>
+            <a:r>
+              <a:rPr lang="pl-PL" sz="2200" dirty="0" smtClean="0"/>
+              <a:t>frameworks</a:t>
+            </a:r>
+            <a:endParaRPr lang="pl-PL" sz="2200" dirty="0" smtClean="0"/>
           </a:p>
           <a:p>
             <a:pPr lvl="0">
@@ -7917,7 +8335,15 @@
             </a:pPr>
             <a:r>
               <a:rPr lang="pl-PL" sz="2200" dirty="0"/>
-              <a:t>EMF demo: hello </a:t>
+              <a:t>EMF </a:t>
+            </a:r>
+            <a:r>
+              <a:rPr lang="pl-PL" sz="2200" dirty="0" smtClean="0"/>
+              <a:t>demo - </a:t>
+            </a:r>
+            <a:r>
+              <a:rPr lang="pl-PL" sz="2200" dirty="0"/>
+              <a:t>hello </a:t>
             </a:r>
             <a:r>
               <a:rPr lang="pl-PL" sz="2200" dirty="0" smtClean="0"/>
@@ -7932,7 +8358,15 @@
             </a:pPr>
             <a:r>
               <a:rPr lang="pl-PL" sz="2200" dirty="0"/>
-              <a:t>EMF demo: command stack &amp; </a:t>
+              <a:t>EMF </a:t>
+            </a:r>
+            <a:r>
+              <a:rPr lang="pl-PL" sz="2200" dirty="0"/>
+              <a:t>demo - </a:t>
+            </a:r>
+            <a:r>
+              <a:rPr lang="pl-PL" sz="2200" dirty="0"/>
+              <a:t>command stack &amp; </a:t>
             </a:r>
             <a:r>
               <a:rPr lang="pl-PL" sz="2200" dirty="0" smtClean="0"/>
@@ -7947,7 +8381,15 @@
             </a:pPr>
             <a:r>
               <a:rPr lang="pl-PL" sz="2200" dirty="0"/>
-              <a:t>EMF demo: data binding &amp; </a:t>
+              <a:t>EMF </a:t>
+            </a:r>
+            <a:r>
+              <a:rPr lang="pl-PL" sz="2200" dirty="0"/>
+              <a:t>demo - </a:t>
+            </a:r>
+            <a:r>
+              <a:rPr lang="pl-PL" sz="2200" dirty="0"/>
+              <a:t>data binding &amp; </a:t>
             </a:r>
             <a:r>
               <a:rPr lang="pl-PL" sz="2200" dirty="0" smtClean="0"/>
@@ -7962,8 +8404,21 @@
             </a:pPr>
             <a:r>
               <a:rPr lang="pl-PL" sz="2200" dirty="0" smtClean="0"/>
-              <a:t>EMF demo: generating a UI editor</a:t>
-            </a:r>
+              <a:t>EMF </a:t>
+            </a:r>
+            <a:r>
+              <a:rPr lang="pl-PL" sz="2200" dirty="0"/>
+              <a:t>demo - </a:t>
+            </a:r>
+            <a:r>
+              <a:rPr lang="pl-PL" sz="2200" dirty="0" smtClean="0"/>
+              <a:t>generating </a:t>
+            </a:r>
+            <a:r>
+              <a:rPr lang="pl-PL" sz="2200" dirty="0" smtClean="0"/>
+              <a:t>UI editors</a:t>
+            </a:r>
+            <a:endParaRPr lang="pl-PL" sz="2200" dirty="0" smtClean="0"/>
           </a:p>
           <a:p>
             <a:pPr lvl="2"/>
@@ -9713,11 +10168,27 @@
           <a:p>
             <a:r>
               <a:rPr lang="pl-PL" dirty="0" smtClean="0"/>
-              <a:t>EMF demo</a:t>
+              <a:t>EMF </a:t>
+            </a:r>
+            <a:r>
+              <a:rPr lang="pl-PL" dirty="0" smtClean="0"/>
+              <a:t>demo</a:t>
             </a:r>
             <a:r>
               <a:rPr lang="pl-PL" dirty="0"/>
-              <a:t>: hello world</a:t>
+              <a:t> </a:t>
+            </a:r>
+            <a:r>
+              <a:rPr lang="pl-PL" dirty="0" smtClean="0"/>
+              <a:t>-</a:t>
+            </a:r>
+            <a:r>
+              <a:rPr lang="pl-PL" dirty="0" smtClean="0"/>
+              <a:t> </a:t>
+            </a:r>
+            <a:r>
+              <a:rPr lang="pl-PL" dirty="0"/>
+              <a:t>hello world</a:t>
             </a:r>
           </a:p>
         </p:txBody>
@@ -12156,12 +12627,6 @@
 </file>
 
 <file path=customXml/item2.xml><?xml version="1.0" encoding="utf-8"?>
-<p:properties xmlns:p="http://schemas.microsoft.com/office/2006/metadata/properties" xmlns:xsi="http://www.w3.org/2001/XMLSchema-instance" xmlns:pc="http://schemas.microsoft.com/office/infopath/2007/PartnerControls">
-  <documentManagement/>
-</p:properties>
-</file>
-
-<file path=customXml/item3.xml><?xml version="1.0" encoding="utf-8"?>
 <ct:contentTypeSchema xmlns:ct="http://schemas.microsoft.com/office/2006/metadata/contentType" xmlns:ma="http://schemas.microsoft.com/office/2006/metadata/properties/metaAttributes" ct:_="" ma:_="" ma:contentTypeName="Document" ma:contentTypeID="0x010100936691DD97235843B5E96CA882CD7A85" ma:contentTypeVersion="5" ma:contentTypeDescription="Create a new document." ma:contentTypeScope="" ma:versionID="6f08e88fdeac68ac664784283c60f55d">
   <xsd:schema xmlns:xsd="http://www.w3.org/2001/XMLSchema" xmlns:xs="http://www.w3.org/2001/XMLSchema" xmlns:p="http://schemas.microsoft.com/office/2006/metadata/properties" targetNamespace="http://schemas.microsoft.com/office/2006/metadata/properties" ma:root="true" ma:fieldsID="1b420e54b54d84c99c75ea622d6798e7">
     <xsd:element name="properties">
@@ -12275,6 +12740,12 @@
 </ct:contentTypeSchema>
 </file>
 
+<file path=customXml/item3.xml><?xml version="1.0" encoding="utf-8"?>
+<p:properties xmlns:p="http://schemas.microsoft.com/office/2006/metadata/properties" xmlns:xsi="http://www.w3.org/2001/XMLSchema-instance" xmlns:pc="http://schemas.microsoft.com/office/infopath/2007/PartnerControls">
+  <documentManagement/>
+</p:properties>
+</file>
+
 <file path=customXml/itemProps1.xml><?xml version="1.0" encoding="utf-8"?>
 <ds:datastoreItem xmlns:ds="http://schemas.openxmlformats.org/officeDocument/2006/customXml" ds:itemID="{6AA8B675-C754-493C-B718-CAC6BC23635B}">
   <ds:schemaRefs>
@@ -12284,21 +12755,6 @@
 </file>
 
 <file path=customXml/itemProps2.xml><?xml version="1.0" encoding="utf-8"?>
-<ds:datastoreItem xmlns:ds="http://schemas.openxmlformats.org/officeDocument/2006/customXml" ds:itemID="{BD743871-875D-472A-961D-1DCE1A0B5DE9}">
-  <ds:schemaRefs>
-    <ds:schemaRef ds:uri="http://www.w3.org/XML/1998/namespace"/>
-    <ds:schemaRef ds:uri="http://schemas.microsoft.com/office/2006/metadata/properties"/>
-    <ds:schemaRef ds:uri="http://schemas.microsoft.com/office/2006/documentManagement/types"/>
-    <ds:schemaRef ds:uri="http://purl.org/dc/dcmitype/"/>
-    <ds:schemaRef ds:uri="http://purl.org/dc/elements/1.1/"/>
-    <ds:schemaRef ds:uri="http://purl.org/dc/terms/"/>
-    <ds:schemaRef ds:uri="http://schemas.microsoft.com/office/infopath/2007/PartnerControls"/>
-    <ds:schemaRef ds:uri="http://schemas.openxmlformats.org/package/2006/metadata/core-properties"/>
-  </ds:schemaRefs>
-</ds:datastoreItem>
-</file>
-
-<file path=customXml/itemProps3.xml><?xml version="1.0" encoding="utf-8"?>
 <ds:datastoreItem xmlns:ds="http://schemas.openxmlformats.org/officeDocument/2006/customXml" ds:itemID="{89F2C655-CE6E-4709-BE63-9C397722D50F}">
   <ds:schemaRefs>
     <ds:schemaRef ds:uri="http://schemas.microsoft.com/office/2006/metadata/contentType"/>
@@ -12312,4 +12768,19 @@
     <ds:schemaRef ds:uri="http://schemas.microsoft.com/office/infopath/2007/PartnerControls"/>
   </ds:schemaRefs>
 </ds:datastoreItem>
+</file>
+
+<file path=customXml/itemProps3.xml><?xml version="1.0" encoding="utf-8"?>
+<ds:datastoreItem xmlns:ds="http://schemas.openxmlformats.org/officeDocument/2006/customXml" ds:itemID="{BD743871-875D-472A-961D-1DCE1A0B5DE9}">
+  <ds:schemaRefs>
+    <ds:schemaRef ds:uri="http://www.w3.org/XML/1998/namespace"/>
+    <ds:schemaRef ds:uri="http://schemas.microsoft.com/office/2006/metadata/properties"/>
+    <ds:schemaRef ds:uri="http://schemas.microsoft.com/office/2006/documentManagement/types"/>
+    <ds:schemaRef ds:uri="http://purl.org/dc/dcmitype/"/>
+    <ds:schemaRef ds:uri="http://purl.org/dc/elements/1.1/"/>
+    <ds:schemaRef ds:uri="http://purl.org/dc/terms/"/>
+    <ds:schemaRef ds:uri="http://schemas.microsoft.com/office/infopath/2007/PartnerControls"/>
+    <ds:schemaRef ds:uri="http://schemas.openxmlformats.org/package/2006/metadata/core-properties"/>
+  </ds:schemaRefs>
+</ds:datastoreItem>
 </file>
</xml_diff>

<commit_message>
added an editor for a model
</commit_message>
<xml_diff>
--- a/JUG - EMF.pptx
+++ b/JUG - EMF.pptx
@@ -239,7 +239,7 @@
             <a:fld id="{056D73CD-AD5E-416F-914D-693791469B20}" type="datetimeFigureOut">
               <a:rPr lang="pl-PL" smtClean="0"/>
               <a:pPr/>
-              <a:t>2015-09-14</a:t>
+              <a:t>2015-09-16</a:t>
             </a:fld>
             <a:endParaRPr lang="pl-PL"/>
           </a:p>
@@ -406,7 +406,7 @@
             <a:fld id="{42E25A34-81B0-4A1E-8A53-54C191A31FEF}" type="datetimeFigureOut">
               <a:rPr lang="pl-PL" smtClean="0"/>
               <a:pPr/>
-              <a:t>2015-09-14</a:t>
+              <a:t>2015-09-16</a:t>
             </a:fld>
             <a:endParaRPr lang="pl-PL"/>
           </a:p>
@@ -1356,7 +1356,7 @@
             <a:fld id="{A1C14688-799C-45A6-846F-47D660935463}" type="datetime1">
               <a:rPr lang="pl-PL" smtClean="0"/>
               <a:pPr/>
-              <a:t>2015-09-14</a:t>
+              <a:t>2015-09-16</a:t>
             </a:fld>
             <a:endParaRPr lang="pl-PL" dirty="0"/>
           </a:p>
@@ -2095,7 +2095,7 @@
             <a:fld id="{A1C14688-799C-45A6-846F-47D660935463}" type="datetime1">
               <a:rPr lang="pl-PL" smtClean="0"/>
               <a:pPr/>
-              <a:t>2015-09-14</a:t>
+              <a:t>2015-09-16</a:t>
             </a:fld>
             <a:endParaRPr lang="pl-PL" dirty="0"/>
           </a:p>
@@ -2402,7 +2402,7 @@
             <a:fld id="{CA444EF8-B926-415D-95F0-FB0651B7AA0D}" type="datetime1">
               <a:rPr lang="pl-PL" smtClean="0"/>
               <a:pPr/>
-              <a:t>2015-09-14</a:t>
+              <a:t>2015-09-16</a:t>
             </a:fld>
             <a:endParaRPr lang="pl-PL" dirty="0"/>
           </a:p>
@@ -2634,7 +2634,7 @@
             <a:fld id="{A1C14688-799C-45A6-846F-47D660935463}" type="datetime1">
               <a:rPr lang="pl-PL" smtClean="0"/>
               <a:pPr/>
-              <a:t>2015-09-14</a:t>
+              <a:t>2015-09-16</a:t>
             </a:fld>
             <a:endParaRPr lang="pl-PL" dirty="0"/>
           </a:p>
@@ -3084,7 +3084,7 @@
             <a:fld id="{A1C14688-799C-45A6-846F-47D660935463}" type="datetime1">
               <a:rPr lang="pl-PL" smtClean="0"/>
               <a:pPr/>
-              <a:t>2015-09-14</a:t>
+              <a:t>2015-09-16</a:t>
             </a:fld>
             <a:endParaRPr lang="pl-PL" dirty="0"/>
           </a:p>
@@ -3440,7 +3440,7 @@
             <a:fld id="{A1C14688-799C-45A6-846F-47D660935463}" type="datetime1">
               <a:rPr lang="pl-PL" smtClean="0"/>
               <a:pPr/>
-              <a:t>2015-09-14</a:t>
+              <a:t>2015-09-16</a:t>
             </a:fld>
             <a:endParaRPr lang="pl-PL" dirty="0"/>
           </a:p>
@@ -3723,7 +3723,7 @@
             <a:fld id="{A1C14688-799C-45A6-846F-47D660935463}" type="datetime1">
               <a:rPr lang="pl-PL" smtClean="0"/>
               <a:pPr/>
-              <a:t>2015-09-14</a:t>
+              <a:t>2015-09-16</a:t>
             </a:fld>
             <a:endParaRPr lang="pl-PL" dirty="0"/>
           </a:p>
@@ -4018,7 +4018,7 @@
             <a:fld id="{A1C14688-799C-45A6-846F-47D660935463}" type="datetime1">
               <a:rPr lang="pl-PL" smtClean="0"/>
               <a:pPr/>
-              <a:t>2015-09-14</a:t>
+              <a:t>2015-09-16</a:t>
             </a:fld>
             <a:endParaRPr lang="pl-PL" dirty="0"/>
           </a:p>
@@ -4389,7 +4389,7 @@
             <a:fld id="{A1C14688-799C-45A6-846F-47D660935463}" type="datetime1">
               <a:rPr lang="pl-PL" smtClean="0"/>
               <a:pPr/>
-              <a:t>2015-09-14</a:t>
+              <a:t>2015-09-16</a:t>
             </a:fld>
             <a:endParaRPr lang="pl-PL" dirty="0"/>
           </a:p>
@@ -4684,7 +4684,7 @@
             <a:fld id="{A1C14688-799C-45A6-846F-47D660935463}" type="datetime1">
               <a:rPr lang="pl-PL" smtClean="0"/>
               <a:pPr/>
-              <a:t>2015-09-14</a:t>
+              <a:t>2015-09-16</a:t>
             </a:fld>
             <a:endParaRPr lang="pl-PL" dirty="0"/>
           </a:p>
@@ -5364,7 +5364,7 @@
             <a:fld id="{A1C14688-799C-45A6-846F-47D660935463}" type="datetime1">
               <a:rPr lang="pl-PL" smtClean="0"/>
               <a:pPr/>
-              <a:t>2015-09-14</a:t>
+              <a:t>2015-09-16</a:t>
             </a:fld>
             <a:endParaRPr lang="pl-PL" dirty="0"/>
           </a:p>
@@ -5806,7 +5806,7 @@
             <a:fld id="{A1C14688-799C-45A6-846F-47D660935463}" type="datetime1">
               <a:rPr lang="pl-PL" smtClean="0"/>
               <a:pPr/>
-              <a:t>2015-09-14</a:t>
+              <a:t>2015-09-16</a:t>
             </a:fld>
             <a:endParaRPr lang="pl-PL" dirty="0"/>
           </a:p>
@@ -5988,7 +5988,7 @@
             <a:fld id="{767CAEAC-D843-4FF2-8657-8264B0202C16}" type="datetime1">
               <a:rPr lang="pl-PL" smtClean="0"/>
               <a:pPr/>
-              <a:t>2015-09-14</a:t>
+              <a:t>2015-09-16</a:t>
             </a:fld>
             <a:endParaRPr lang="pl-PL" dirty="0"/>
           </a:p>
@@ -6522,15 +6522,7 @@
           <a:p>
             <a:r>
               <a:rPr lang="pl-PL" dirty="0"/>
-              <a:t>EMF </a:t>
-            </a:r>
-            <a:r>
-              <a:rPr lang="pl-PL" dirty="0"/>
-              <a:t>demo - </a:t>
-            </a:r>
-            <a:r>
-              <a:rPr lang="pl-PL" dirty="0"/>
-              <a:t>command </a:t>
+              <a:t>EMF demo - command </a:t>
             </a:r>
             <a:r>
               <a:rPr lang="pl-PL" dirty="0" smtClean="0"/>
@@ -6647,7 +6639,7 @@
             <a:fld id="{A1C14688-799C-45A6-846F-47D660935463}" type="datetime1">
               <a:rPr lang="pl-PL" smtClean="0"/>
               <a:pPr/>
-              <a:t>2015-09-14</a:t>
+              <a:t>2015-09-16</a:t>
             </a:fld>
             <a:endParaRPr lang="pl-PL" dirty="0"/>
           </a:p>
@@ -6882,11 +6874,7 @@
           <a:p>
             <a:r>
               <a:rPr lang="pl-PL" dirty="0"/>
-              <a:t>EMF </a:t>
-            </a:r>
-            <a:r>
-              <a:rPr lang="pl-PL" dirty="0"/>
-              <a:t>demo - </a:t>
+              <a:t>EMF demo - </a:t>
             </a:r>
             <a:r>
               <a:rPr lang="pl-PL" dirty="0" smtClean="0"/>
@@ -6943,19 +6931,14 @@
           <a:p>
             <a:r>
               <a:rPr lang="pl-PL" sz="2200" dirty="0" smtClean="0"/>
-              <a:t>Validating </a:t>
-            </a:r>
-            <a:r>
-              <a:rPr lang="pl-PL" sz="2200" dirty="0" smtClean="0"/>
-              <a:t>inputs</a:t>
-            </a:r>
-            <a:endParaRPr lang="pl-PL" sz="2200" dirty="0" smtClean="0"/>
+              <a:t>Validating inputs</a:t>
+            </a:r>
           </a:p>
           <a:p>
             <a:pPr lvl="1"/>
             <a:r>
               <a:rPr lang="pl-PL" sz="2000" dirty="0"/>
-              <a:t>Object Constraint Language (OCL)</a:t>
+              <a:t>Java</a:t>
             </a:r>
             <a:endParaRPr lang="pl-PL" sz="2000" dirty="0" smtClean="0"/>
           </a:p>
@@ -6963,8 +6946,16 @@
             <a:pPr lvl="1"/>
             <a:r>
               <a:rPr lang="pl-PL" sz="2000" dirty="0" smtClean="0"/>
-              <a:t>Java</a:t>
-            </a:r>
+              <a:t>Object </a:t>
+            </a:r>
+            <a:r>
+              <a:rPr lang="pl-PL" sz="2000" dirty="0"/>
+              <a:t>Constraint Language (OCL)</a:t>
+            </a:r>
+            <a:endParaRPr lang="pl-PL" sz="2000" dirty="0" smtClean="0"/>
+          </a:p>
+          <a:p>
+            <a:pPr lvl="1"/>
             <a:endParaRPr lang="pl-PL" sz="2000" dirty="0"/>
           </a:p>
         </p:txBody>
@@ -7039,7 +7030,7 @@
             <a:fld id="{A1C14688-799C-45A6-846F-47D660935463}" type="datetime1">
               <a:rPr lang="pl-PL" smtClean="0"/>
               <a:pPr/>
-              <a:t>2015-09-14</a:t>
+              <a:t>2015-09-16</a:t>
             </a:fld>
             <a:endParaRPr lang="pl-PL" dirty="0"/>
           </a:p>
@@ -7289,15 +7280,33 @@
                                   </p:childTnLst>
                                 </p:cTn>
                               </p:par>
+                            </p:childTnLst>
+                          </p:cTn>
+                        </p:par>
+                      </p:childTnLst>
+                    </p:cTn>
+                  </p:par>
+                  <p:par>
+                    <p:cTn id="17" fill="hold">
+                      <p:stCondLst>
+                        <p:cond delay="indefinite"/>
+                      </p:stCondLst>
+                      <p:childTnLst>
+                        <p:par>
+                          <p:cTn id="18" fill="hold">
+                            <p:stCondLst>
+                              <p:cond delay="0"/>
+                            </p:stCondLst>
+                            <p:childTnLst>
                               <p:par>
-                                <p:cTn id="17" presetID="1" presetClass="entr" presetSubtype="0" fill="hold" nodeType="withEffect">
+                                <p:cTn id="19" presetID="1" presetClass="entr" presetSubtype="0" fill="hold" nodeType="clickEffect">
                                   <p:stCondLst>
                                     <p:cond delay="0"/>
                                   </p:stCondLst>
                                   <p:childTnLst>
                                     <p:set>
                                       <p:cBhvr>
-                                        <p:cTn id="18" dur="1" fill="hold">
+                                        <p:cTn id="20" dur="1" fill="hold">
                                           <p:stCondLst>
                                             <p:cond delay="0"/>
                                           </p:stCondLst>
@@ -7321,14 +7330,14 @@
                                 </p:cTn>
                               </p:par>
                               <p:par>
-                                <p:cTn id="19" presetID="1" presetClass="entr" presetSubtype="0" fill="hold" nodeType="withEffect">
+                                <p:cTn id="21" presetID="1" presetClass="entr" presetSubtype="0" fill="hold" nodeType="withEffect">
                                   <p:stCondLst>
                                     <p:cond delay="0"/>
                                   </p:stCondLst>
                                   <p:childTnLst>
                                     <p:set>
                                       <p:cBhvr>
-                                        <p:cTn id="20" dur="1" fill="hold">
+                                        <p:cTn id="22" dur="1" fill="hold">
                                           <p:stCondLst>
                                             <p:cond delay="0"/>
                                           </p:stCondLst>
@@ -7419,15 +7428,7 @@
             <a:pPr lvl="0"/>
             <a:r>
               <a:rPr lang="pl-PL" dirty="0"/>
-              <a:t>EMF </a:t>
-            </a:r>
-            <a:r>
-              <a:rPr lang="pl-PL" dirty="0"/>
-              <a:t>demo - </a:t>
-            </a:r>
-            <a:r>
-              <a:rPr lang="pl-PL" dirty="0"/>
-              <a:t>generating a UI </a:t>
+              <a:t>EMF demo - generating a UI </a:t>
             </a:r>
             <a:r>
               <a:rPr lang="pl-PL" dirty="0" smtClean="0"/>
@@ -7453,13 +7454,45 @@
           <a:lstStyle/>
           <a:p>
             <a:r>
-              <a:rPr lang="pl-PL" dirty="0" smtClean="0"/>
+              <a:rPr lang="pl-PL" dirty="0"/>
               <a:t>A simple UI editor created using EMF Forms </a:t>
             </a:r>
             <a:r>
               <a:rPr lang="pl-PL" dirty="0" smtClean="0"/>
               <a:t>framework</a:t>
             </a:r>
+            <a:endParaRPr lang="pl-PL" dirty="0" smtClean="0"/>
+          </a:p>
+          <a:p>
+            <a:r>
+              <a:rPr lang="pl-PL" dirty="0" smtClean="0"/>
+              <a:t>UI:</a:t>
+            </a:r>
+          </a:p>
+          <a:p>
+            <a:pPr lvl="1"/>
+            <a:r>
+              <a:rPr lang="pl-PL" dirty="0" smtClean="0"/>
+              <a:t>JavaFX</a:t>
+            </a:r>
+          </a:p>
+          <a:p>
+            <a:pPr lvl="1"/>
+            <a:r>
+              <a:rPr lang="pl-PL" dirty="0" smtClean="0"/>
+              <a:t>SWT</a:t>
+            </a:r>
+          </a:p>
+          <a:p>
+            <a:pPr lvl="1"/>
+            <a:r>
+              <a:rPr lang="pl-PL" dirty="0" smtClean="0"/>
+              <a:t>Eclipse RAP</a:t>
+            </a:r>
+          </a:p>
+          <a:p>
+            <a:pPr lvl="1"/>
+            <a:endParaRPr lang="pl-PL" dirty="0" smtClean="0"/>
           </a:p>
           <a:p>
             <a:pPr marL="0" indent="0">
@@ -7481,7 +7514,7 @@
               <a:rPr lang="pl-PL" dirty="0" smtClean="0"/>
               <a:t> </a:t>
             </a:r>
-            <a:endParaRPr lang="pl-PL" dirty="0"/>
+            <a:endParaRPr lang="pl-PL" dirty="0" smtClean="0"/>
           </a:p>
         </p:txBody>
       </p:sp>
@@ -7555,7 +7588,7 @@
             <a:fld id="{A1C14688-799C-45A6-846F-47D660935463}" type="datetime1">
               <a:rPr lang="pl-PL" smtClean="0"/>
               <a:pPr/>
-              <a:t>2015-09-14</a:t>
+              <a:t>2015-09-16</a:t>
             </a:fld>
             <a:endParaRPr lang="pl-PL" dirty="0"/>
           </a:p>
@@ -7656,15 +7689,7 @@
           <a:p>
             <a:r>
               <a:rPr lang="pl-PL" dirty="0"/>
-              <a:t>EMF </a:t>
-            </a:r>
-            <a:r>
-              <a:rPr lang="pl-PL" dirty="0"/>
-              <a:t>demo - </a:t>
-            </a:r>
-            <a:r>
-              <a:rPr lang="pl-PL" dirty="0"/>
-              <a:t>generating a </a:t>
+              <a:t>EMF demo - generating a </a:t>
             </a:r>
             <a:r>
               <a:rPr lang="pl-PL" dirty="0" smtClean="0"/>
@@ -7723,7 +7748,15 @@
             </a:r>
             <a:r>
               <a:rPr lang="en-US" i="1" dirty="0"/>
-              <a:t> to easily </a:t>
+              <a:t> </a:t>
+            </a:r>
+            <a:r>
+              <a:rPr lang="en-US" b="1" i="1" dirty="0"/>
+              <a:t>to</a:t>
+            </a:r>
+            <a:r>
+              <a:rPr lang="en-US" i="1" dirty="0"/>
+              <a:t> easily </a:t>
             </a:r>
             <a:r>
               <a:rPr lang="en-US" b="1" i="1" dirty="0"/>
@@ -7856,7 +7889,7 @@
             <a:fld id="{A1C14688-799C-45A6-846F-47D660935463}" type="datetime1">
               <a:rPr lang="pl-PL" smtClean="0"/>
               <a:pPr/>
-              <a:t>2015-09-14</a:t>
+              <a:t>2015-09-16</a:t>
             </a:fld>
             <a:endParaRPr lang="pl-PL" dirty="0"/>
           </a:p>
@@ -8143,7 +8176,7 @@
             <a:fld id="{A1C14688-799C-45A6-846F-47D660935463}" type="datetime1">
               <a:rPr lang="pl-PL" smtClean="0"/>
               <a:pPr/>
-              <a:t>2015-09-14</a:t>
+              <a:t>2015-09-16</a:t>
             </a:fld>
             <a:endParaRPr lang="pl-PL" dirty="0"/>
           </a:p>
@@ -8319,13 +8352,8 @@
             </a:r>
             <a:r>
               <a:rPr lang="pl-PL" sz="2200" dirty="0" smtClean="0"/>
-              <a:t>– </a:t>
-            </a:r>
-            <a:r>
-              <a:rPr lang="pl-PL" sz="2200" dirty="0" smtClean="0"/>
-              <a:t>frameworks</a:t>
-            </a:r>
-            <a:endParaRPr lang="pl-PL" sz="2200" dirty="0" smtClean="0"/>
+              <a:t>– frameworks</a:t>
+            </a:r>
           </a:p>
           <a:p>
             <a:pPr lvl="0">
@@ -8358,15 +8386,7 @@
             </a:pPr>
             <a:r>
               <a:rPr lang="pl-PL" sz="2200" dirty="0"/>
-              <a:t>EMF </a:t>
-            </a:r>
-            <a:r>
-              <a:rPr lang="pl-PL" sz="2200" dirty="0"/>
-              <a:t>demo - </a:t>
-            </a:r>
-            <a:r>
-              <a:rPr lang="pl-PL" sz="2200" dirty="0"/>
-              <a:t>command stack &amp; </a:t>
+              <a:t>EMF demo - command stack &amp; </a:t>
             </a:r>
             <a:r>
               <a:rPr lang="pl-PL" sz="2200" dirty="0" smtClean="0"/>
@@ -8381,15 +8401,7 @@
             </a:pPr>
             <a:r>
               <a:rPr lang="pl-PL" sz="2200" dirty="0"/>
-              <a:t>EMF </a:t>
-            </a:r>
-            <a:r>
-              <a:rPr lang="pl-PL" sz="2200" dirty="0"/>
-              <a:t>demo - </a:t>
-            </a:r>
-            <a:r>
-              <a:rPr lang="pl-PL" sz="2200" dirty="0"/>
-              <a:t>data binding &amp; </a:t>
+              <a:t>EMF demo - data binding &amp; </a:t>
             </a:r>
             <a:r>
               <a:rPr lang="pl-PL" sz="2200" dirty="0" smtClean="0"/>
@@ -8412,13 +8424,8 @@
             </a:r>
             <a:r>
               <a:rPr lang="pl-PL" sz="2200" dirty="0" smtClean="0"/>
-              <a:t>generating </a:t>
-            </a:r>
-            <a:r>
-              <a:rPr lang="pl-PL" sz="2200" dirty="0" smtClean="0"/>
-              <a:t>UI editors</a:t>
-            </a:r>
-            <a:endParaRPr lang="pl-PL" sz="2200" dirty="0" smtClean="0"/>
+              <a:t>generating UI editors</a:t>
+            </a:r>
           </a:p>
           <a:p>
             <a:pPr lvl="2"/>
@@ -8449,7 +8456,7 @@
             <a:fld id="{844BCD22-CA02-4C92-9F05-D5071550F6B3}" type="datetime1">
               <a:rPr lang="pl-PL" smtClean="0"/>
               <a:pPr/>
-              <a:t>2015-09-14</a:t>
+              <a:t>2015-09-16</a:t>
             </a:fld>
             <a:endParaRPr lang="pl-PL" dirty="0"/>
           </a:p>
@@ -8678,7 +8685,7 @@
             <a:fld id="{A1C14688-799C-45A6-846F-47D660935463}" type="datetime1">
               <a:rPr lang="pl-PL" smtClean="0"/>
               <a:pPr/>
-              <a:t>2015-09-14</a:t>
+              <a:t>2015-09-16</a:t>
             </a:fld>
             <a:endParaRPr lang="pl-PL" dirty="0"/>
           </a:p>
@@ -9212,7 +9219,7 @@
             <a:fld id="{A1C14688-799C-45A6-846F-47D660935463}" type="datetime1">
               <a:rPr lang="pl-PL" smtClean="0"/>
               <a:pPr/>
-              <a:t>2015-09-14</a:t>
+              <a:t>2015-09-16</a:t>
             </a:fld>
             <a:endParaRPr lang="pl-PL" dirty="0"/>
           </a:p>
@@ -9685,7 +9692,7 @@
             <a:fld id="{A1C14688-799C-45A6-846F-47D660935463}" type="datetime1">
               <a:rPr lang="pl-PL" smtClean="0"/>
               <a:pPr/>
-              <a:t>2015-09-14</a:t>
+              <a:t>2015-09-16</a:t>
             </a:fld>
             <a:endParaRPr lang="pl-PL" dirty="0"/>
           </a:p>
@@ -10168,11 +10175,7 @@
           <a:p>
             <a:r>
               <a:rPr lang="pl-PL" dirty="0" smtClean="0"/>
-              <a:t>EMF </a:t>
-            </a:r>
-            <a:r>
-              <a:rPr lang="pl-PL" dirty="0" smtClean="0"/>
-              <a:t>demo</a:t>
+              <a:t>EMF demo</a:t>
             </a:r>
             <a:r>
               <a:rPr lang="pl-PL" dirty="0"/>
@@ -10180,11 +10183,7 @@
             </a:r>
             <a:r>
               <a:rPr lang="pl-PL" dirty="0" smtClean="0"/>
-              <a:t>-</a:t>
-            </a:r>
-            <a:r>
-              <a:rPr lang="pl-PL" dirty="0" smtClean="0"/>
-              <a:t> </a:t>
+              <a:t>- </a:t>
             </a:r>
             <a:r>
               <a:rPr lang="pl-PL" dirty="0"/>
@@ -10308,7 +10307,7 @@
             <a:fld id="{A1C14688-799C-45A6-846F-47D660935463}" type="datetime1">
               <a:rPr lang="pl-PL" smtClean="0"/>
               <a:pPr/>
-              <a:t>2015-09-14</a:t>
+              <a:t>2015-09-16</a:t>
             </a:fld>
             <a:endParaRPr lang="pl-PL" dirty="0"/>
           </a:p>
@@ -10730,7 +10729,7 @@
             <a:fld id="{A1C14688-799C-45A6-846F-47D660935463}" type="datetime1">
               <a:rPr lang="pl-PL" smtClean="0"/>
               <a:pPr/>
-              <a:t>2015-09-14</a:t>
+              <a:t>2015-09-16</a:t>
             </a:fld>
             <a:endParaRPr lang="pl-PL" dirty="0"/>
           </a:p>
@@ -10910,7 +10909,7 @@
             <a:fld id="{A1C14688-799C-45A6-846F-47D660935463}" type="datetime1">
               <a:rPr lang="pl-PL" smtClean="0"/>
               <a:pPr/>
-              <a:t>2015-09-14</a:t>
+              <a:t>2015-09-16</a:t>
             </a:fld>
             <a:endParaRPr lang="pl-PL" dirty="0"/>
           </a:p>
@@ -11434,7 +11433,7 @@
             <a:fld id="{A1C14688-799C-45A6-846F-47D660935463}" type="datetime1">
               <a:rPr lang="pl-PL" smtClean="0"/>
               <a:pPr/>
-              <a:t>2015-09-14</a:t>
+              <a:t>2015-09-16</a:t>
             </a:fld>
             <a:endParaRPr lang="pl-PL" dirty="0"/>
           </a:p>
@@ -12627,6 +12626,12 @@
 </file>
 
 <file path=customXml/item2.xml><?xml version="1.0" encoding="utf-8"?>
+<p:properties xmlns:p="http://schemas.microsoft.com/office/2006/metadata/properties" xmlns:xsi="http://www.w3.org/2001/XMLSchema-instance" xmlns:pc="http://schemas.microsoft.com/office/infopath/2007/PartnerControls">
+  <documentManagement/>
+</p:properties>
+</file>
+
+<file path=customXml/item3.xml><?xml version="1.0" encoding="utf-8"?>
 <ct:contentTypeSchema xmlns:ct="http://schemas.microsoft.com/office/2006/metadata/contentType" xmlns:ma="http://schemas.microsoft.com/office/2006/metadata/properties/metaAttributes" ct:_="" ma:_="" ma:contentTypeName="Document" ma:contentTypeID="0x010100936691DD97235843B5E96CA882CD7A85" ma:contentTypeVersion="5" ma:contentTypeDescription="Create a new document." ma:contentTypeScope="" ma:versionID="6f08e88fdeac68ac664784283c60f55d">
   <xsd:schema xmlns:xsd="http://www.w3.org/2001/XMLSchema" xmlns:xs="http://www.w3.org/2001/XMLSchema" xmlns:p="http://schemas.microsoft.com/office/2006/metadata/properties" targetNamespace="http://schemas.microsoft.com/office/2006/metadata/properties" ma:root="true" ma:fieldsID="1b420e54b54d84c99c75ea622d6798e7">
     <xsd:element name="properties">
@@ -12740,12 +12745,6 @@
 </ct:contentTypeSchema>
 </file>
 
-<file path=customXml/item3.xml><?xml version="1.0" encoding="utf-8"?>
-<p:properties xmlns:p="http://schemas.microsoft.com/office/2006/metadata/properties" xmlns:xsi="http://www.w3.org/2001/XMLSchema-instance" xmlns:pc="http://schemas.microsoft.com/office/infopath/2007/PartnerControls">
-  <documentManagement/>
-</p:properties>
-</file>
-
 <file path=customXml/itemProps1.xml><?xml version="1.0" encoding="utf-8"?>
 <ds:datastoreItem xmlns:ds="http://schemas.openxmlformats.org/officeDocument/2006/customXml" ds:itemID="{6AA8B675-C754-493C-B718-CAC6BC23635B}">
   <ds:schemaRefs>
@@ -12755,6 +12754,21 @@
 </file>
 
 <file path=customXml/itemProps2.xml><?xml version="1.0" encoding="utf-8"?>
+<ds:datastoreItem xmlns:ds="http://schemas.openxmlformats.org/officeDocument/2006/customXml" ds:itemID="{BD743871-875D-472A-961D-1DCE1A0B5DE9}">
+  <ds:schemaRefs>
+    <ds:schemaRef ds:uri="http://www.w3.org/XML/1998/namespace"/>
+    <ds:schemaRef ds:uri="http://schemas.microsoft.com/office/2006/metadata/properties"/>
+    <ds:schemaRef ds:uri="http://schemas.microsoft.com/office/2006/documentManagement/types"/>
+    <ds:schemaRef ds:uri="http://purl.org/dc/dcmitype/"/>
+    <ds:schemaRef ds:uri="http://purl.org/dc/elements/1.1/"/>
+    <ds:schemaRef ds:uri="http://purl.org/dc/terms/"/>
+    <ds:schemaRef ds:uri="http://schemas.microsoft.com/office/infopath/2007/PartnerControls"/>
+    <ds:schemaRef ds:uri="http://schemas.openxmlformats.org/package/2006/metadata/core-properties"/>
+  </ds:schemaRefs>
+</ds:datastoreItem>
+</file>
+
+<file path=customXml/itemProps3.xml><?xml version="1.0" encoding="utf-8"?>
 <ds:datastoreItem xmlns:ds="http://schemas.openxmlformats.org/officeDocument/2006/customXml" ds:itemID="{89F2C655-CE6E-4709-BE63-9C397722D50F}">
   <ds:schemaRefs>
     <ds:schemaRef ds:uri="http://schemas.microsoft.com/office/2006/metadata/contentType"/>
@@ -12768,19 +12782,4 @@
     <ds:schemaRef ds:uri="http://schemas.microsoft.com/office/infopath/2007/PartnerControls"/>
   </ds:schemaRefs>
 </ds:datastoreItem>
-</file>
-
-<file path=customXml/itemProps3.xml><?xml version="1.0" encoding="utf-8"?>
-<ds:datastoreItem xmlns:ds="http://schemas.openxmlformats.org/officeDocument/2006/customXml" ds:itemID="{BD743871-875D-472A-961D-1DCE1A0B5DE9}">
-  <ds:schemaRefs>
-    <ds:schemaRef ds:uri="http://www.w3.org/XML/1998/namespace"/>
-    <ds:schemaRef ds:uri="http://schemas.microsoft.com/office/2006/metadata/properties"/>
-    <ds:schemaRef ds:uri="http://schemas.microsoft.com/office/2006/documentManagement/types"/>
-    <ds:schemaRef ds:uri="http://purl.org/dc/dcmitype/"/>
-    <ds:schemaRef ds:uri="http://purl.org/dc/elements/1.1/"/>
-    <ds:schemaRef ds:uri="http://purl.org/dc/terms/"/>
-    <ds:schemaRef ds:uri="http://schemas.microsoft.com/office/infopath/2007/PartnerControls"/>
-    <ds:schemaRef ds:uri="http://schemas.openxmlformats.org/package/2006/metadata/core-properties"/>
-  </ds:schemaRefs>
-</ds:datastoreItem>
 </file>
</xml_diff>

<commit_message>
updated a presentation(added jpa model).
</commit_message>
<xml_diff>
--- a/JUG - EMF.pptx
+++ b/JUG - EMF.pptx
@@ -5,26 +5,28 @@
     <p:sldMasterId id="2147483648" r:id="rId4"/>
   </p:sldMasterIdLst>
   <p:notesMasterIdLst>
-    <p:notesMasterId r:id="rId19"/>
+    <p:notesMasterId r:id="rId21"/>
   </p:notesMasterIdLst>
   <p:handoutMasterIdLst>
-    <p:handoutMasterId r:id="rId20"/>
+    <p:handoutMasterId r:id="rId22"/>
   </p:handoutMasterIdLst>
   <p:sldIdLst>
     <p:sldId id="280" r:id="rId5"/>
     <p:sldId id="274" r:id="rId6"/>
-    <p:sldId id="282" r:id="rId7"/>
-    <p:sldId id="281" r:id="rId8"/>
-    <p:sldId id="283" r:id="rId9"/>
-    <p:sldId id="286" r:id="rId10"/>
-    <p:sldId id="284" r:id="rId11"/>
-    <p:sldId id="287" r:id="rId12"/>
-    <p:sldId id="285" r:id="rId13"/>
-    <p:sldId id="288" r:id="rId14"/>
-    <p:sldId id="289" r:id="rId15"/>
-    <p:sldId id="290" r:id="rId16"/>
-    <p:sldId id="292" r:id="rId17"/>
-    <p:sldId id="291" r:id="rId18"/>
+    <p:sldId id="293" r:id="rId7"/>
+    <p:sldId id="294" r:id="rId8"/>
+    <p:sldId id="282" r:id="rId9"/>
+    <p:sldId id="281" r:id="rId10"/>
+    <p:sldId id="283" r:id="rId11"/>
+    <p:sldId id="286" r:id="rId12"/>
+    <p:sldId id="284" r:id="rId13"/>
+    <p:sldId id="287" r:id="rId14"/>
+    <p:sldId id="285" r:id="rId15"/>
+    <p:sldId id="288" r:id="rId16"/>
+    <p:sldId id="289" r:id="rId17"/>
+    <p:sldId id="290" r:id="rId18"/>
+    <p:sldId id="292" r:id="rId19"/>
+    <p:sldId id="291" r:id="rId20"/>
   </p:sldIdLst>
   <p:sldSz cx="12192000" cy="6858000"/>
   <p:notesSz cx="6858000" cy="9144000"/>
@@ -239,7 +241,7 @@
             <a:fld id="{056D73CD-AD5E-416F-914D-693791469B20}" type="datetimeFigureOut">
               <a:rPr lang="pl-PL" smtClean="0"/>
               <a:pPr/>
-              <a:t>2015-09-16</a:t>
+              <a:t>2015-09-17</a:t>
             </a:fld>
             <a:endParaRPr lang="pl-PL"/>
           </a:p>
@@ -406,7 +408,7 @@
             <a:fld id="{42E25A34-81B0-4A1E-8A53-54C191A31FEF}" type="datetimeFigureOut">
               <a:rPr lang="pl-PL" smtClean="0"/>
               <a:pPr/>
-              <a:t>2015-09-16</a:t>
+              <a:t>2015-09-17</a:t>
             </a:fld>
             <a:endParaRPr lang="pl-PL"/>
           </a:p>
@@ -1356,7 +1358,7 @@
             <a:fld id="{A1C14688-799C-45A6-846F-47D660935463}" type="datetime1">
               <a:rPr lang="pl-PL" smtClean="0"/>
               <a:pPr/>
-              <a:t>2015-09-16</a:t>
+              <a:t>2015-09-17</a:t>
             </a:fld>
             <a:endParaRPr lang="pl-PL" dirty="0"/>
           </a:p>
@@ -2095,7 +2097,7 @@
             <a:fld id="{A1C14688-799C-45A6-846F-47D660935463}" type="datetime1">
               <a:rPr lang="pl-PL" smtClean="0"/>
               <a:pPr/>
-              <a:t>2015-09-16</a:t>
+              <a:t>2015-09-17</a:t>
             </a:fld>
             <a:endParaRPr lang="pl-PL" dirty="0"/>
           </a:p>
@@ -2402,7 +2404,7 @@
             <a:fld id="{CA444EF8-B926-415D-95F0-FB0651B7AA0D}" type="datetime1">
               <a:rPr lang="pl-PL" smtClean="0"/>
               <a:pPr/>
-              <a:t>2015-09-16</a:t>
+              <a:t>2015-09-17</a:t>
             </a:fld>
             <a:endParaRPr lang="pl-PL" dirty="0"/>
           </a:p>
@@ -2634,7 +2636,7 @@
             <a:fld id="{A1C14688-799C-45A6-846F-47D660935463}" type="datetime1">
               <a:rPr lang="pl-PL" smtClean="0"/>
               <a:pPr/>
-              <a:t>2015-09-16</a:t>
+              <a:t>2015-09-17</a:t>
             </a:fld>
             <a:endParaRPr lang="pl-PL" dirty="0"/>
           </a:p>
@@ -3084,7 +3086,7 @@
             <a:fld id="{A1C14688-799C-45A6-846F-47D660935463}" type="datetime1">
               <a:rPr lang="pl-PL" smtClean="0"/>
               <a:pPr/>
-              <a:t>2015-09-16</a:t>
+              <a:t>2015-09-17</a:t>
             </a:fld>
             <a:endParaRPr lang="pl-PL" dirty="0"/>
           </a:p>
@@ -3440,7 +3442,7 @@
             <a:fld id="{A1C14688-799C-45A6-846F-47D660935463}" type="datetime1">
               <a:rPr lang="pl-PL" smtClean="0"/>
               <a:pPr/>
-              <a:t>2015-09-16</a:t>
+              <a:t>2015-09-17</a:t>
             </a:fld>
             <a:endParaRPr lang="pl-PL" dirty="0"/>
           </a:p>
@@ -3723,7 +3725,7 @@
             <a:fld id="{A1C14688-799C-45A6-846F-47D660935463}" type="datetime1">
               <a:rPr lang="pl-PL" smtClean="0"/>
               <a:pPr/>
-              <a:t>2015-09-16</a:t>
+              <a:t>2015-09-17</a:t>
             </a:fld>
             <a:endParaRPr lang="pl-PL" dirty="0"/>
           </a:p>
@@ -4018,7 +4020,7 @@
             <a:fld id="{A1C14688-799C-45A6-846F-47D660935463}" type="datetime1">
               <a:rPr lang="pl-PL" smtClean="0"/>
               <a:pPr/>
-              <a:t>2015-09-16</a:t>
+              <a:t>2015-09-17</a:t>
             </a:fld>
             <a:endParaRPr lang="pl-PL" dirty="0"/>
           </a:p>
@@ -4389,7 +4391,7 @@
             <a:fld id="{A1C14688-799C-45A6-846F-47D660935463}" type="datetime1">
               <a:rPr lang="pl-PL" smtClean="0"/>
               <a:pPr/>
-              <a:t>2015-09-16</a:t>
+              <a:t>2015-09-17</a:t>
             </a:fld>
             <a:endParaRPr lang="pl-PL" dirty="0"/>
           </a:p>
@@ -4684,7 +4686,7 @@
             <a:fld id="{A1C14688-799C-45A6-846F-47D660935463}" type="datetime1">
               <a:rPr lang="pl-PL" smtClean="0"/>
               <a:pPr/>
-              <a:t>2015-09-16</a:t>
+              <a:t>2015-09-17</a:t>
             </a:fld>
             <a:endParaRPr lang="pl-PL" dirty="0"/>
           </a:p>
@@ -5364,7 +5366,7 @@
             <a:fld id="{A1C14688-799C-45A6-846F-47D660935463}" type="datetime1">
               <a:rPr lang="pl-PL" smtClean="0"/>
               <a:pPr/>
-              <a:t>2015-09-16</a:t>
+              <a:t>2015-09-17</a:t>
             </a:fld>
             <a:endParaRPr lang="pl-PL" dirty="0"/>
           </a:p>
@@ -5806,7 +5808,7 @@
             <a:fld id="{A1C14688-799C-45A6-846F-47D660935463}" type="datetime1">
               <a:rPr lang="pl-PL" smtClean="0"/>
               <a:pPr/>
-              <a:t>2015-09-16</a:t>
+              <a:t>2015-09-17</a:t>
             </a:fld>
             <a:endParaRPr lang="pl-PL" dirty="0"/>
           </a:p>
@@ -5988,7 +5990,7 @@
             <a:fld id="{767CAEAC-D843-4FF2-8657-8264B0202C16}" type="datetime1">
               <a:rPr lang="pl-PL" smtClean="0"/>
               <a:pPr/>
-              <a:t>2015-09-16</a:t>
+              <a:t>2015-09-17</a:t>
             </a:fld>
             <a:endParaRPr lang="pl-PL" dirty="0"/>
           </a:p>
@@ -6521,12 +6523,8 @@
           <a:lstStyle/>
           <a:p>
             <a:r>
-              <a:rPr lang="pl-PL" dirty="0"/>
-              <a:t>EMF demo - command </a:t>
-            </a:r>
-            <a:r>
               <a:rPr lang="pl-PL" dirty="0" smtClean="0"/>
-              <a:t>stack &amp; adapters</a:t>
+              <a:t>Object vs EObject</a:t>
             </a:r>
             <a:endParaRPr lang="pl-PL" dirty="0"/>
           </a:p>
@@ -6548,24 +6546,31 @@
           <a:lstStyle/>
           <a:p>
             <a:r>
-              <a:rPr lang="pl-PL" sz="2200" dirty="0" smtClean="0"/>
-              <a:t>Editing objects using commands</a:t>
-            </a:r>
-          </a:p>
-          <a:p>
-            <a:r>
-              <a:rPr lang="pl-PL" sz="2200" dirty="0" smtClean="0"/>
-              <a:t>Undo/redo</a:t>
-            </a:r>
-          </a:p>
-          <a:p>
-            <a:r>
-              <a:rPr lang="pl-PL" sz="2200" dirty="0" smtClean="0"/>
-              <a:t>Adapters as change listeners</a:t>
-            </a:r>
-          </a:p>
-          <a:p>
-            <a:endParaRPr lang="pl-PL" dirty="0"/>
+              <a:rPr lang="en-US" sz="2200" dirty="0" err="1"/>
+              <a:t>EObject</a:t>
+            </a:r>
+            <a:r>
+              <a:rPr lang="en-US" sz="2200" dirty="0"/>
+              <a:t> is the root of all modeled </a:t>
+            </a:r>
+            <a:r>
+              <a:rPr lang="en-US" sz="2200" dirty="0" smtClean="0"/>
+              <a:t>objects</a:t>
+            </a:r>
+            <a:endParaRPr lang="pl-PL" sz="2200" dirty="0" smtClean="0"/>
+          </a:p>
+          <a:p>
+            <a:r>
+              <a:rPr lang="en-US" sz="2200" dirty="0"/>
+              <a:t>It provides support for the behaviors and features common to all modeled objects: </a:t>
+            </a:r>
+            <a:endParaRPr lang="pl-PL" sz="2200" dirty="0" smtClean="0"/>
+          </a:p>
+          <a:p>
+            <a:pPr marL="0" indent="0">
+              <a:buNone/>
+            </a:pPr>
+            <a:endParaRPr lang="pl-PL" dirty="0" smtClean="0"/>
           </a:p>
         </p:txBody>
       </p:sp>
@@ -6639,7 +6644,1004 @@
             <a:fld id="{A1C14688-799C-45A6-846F-47D660935463}" type="datetime1">
               <a:rPr lang="pl-PL" smtClean="0"/>
               <a:pPr/>
-              <a:t>2015-09-16</a:t>
+              <a:t>2015-09-17</a:t>
+            </a:fld>
+            <a:endParaRPr lang="pl-PL" dirty="0"/>
+          </a:p>
+        </p:txBody>
+      </p:sp>
+      <p:graphicFrame>
+        <p:nvGraphicFramePr>
+          <p:cNvPr id="7" name="Table 6"/>
+          <p:cNvGraphicFramePr>
+            <a:graphicFrameLocks noGrp="1"/>
+          </p:cNvGraphicFramePr>
+          <p:nvPr>
+            <p:extLst>
+              <p:ext uri="{D42A27DB-BD31-4B8C-83A1-F6EECF244321}">
+                <p14:modId xmlns:p14="http://schemas.microsoft.com/office/powerpoint/2010/main" val="3357031139"/>
+              </p:ext>
+            </p:extLst>
+          </p:nvPr>
+        </p:nvGraphicFramePr>
+        <p:xfrm>
+          <a:off x="1339117" y="2855963"/>
+          <a:ext cx="8403692" cy="2047810"/>
+        </p:xfrm>
+        <a:graphic>
+          <a:graphicData uri="http://schemas.openxmlformats.org/drawingml/2006/table">
+            <a:tbl>
+              <a:tblPr firstRow="1" bandRow="1">
+                <a:tableStyleId>{073A0DAA-6AF3-43AB-8588-CEC1D06C72B9}</a:tableStyleId>
+              </a:tblPr>
+              <a:tblGrid>
+                <a:gridCol w="4201846"/>
+                <a:gridCol w="4201846"/>
+              </a:tblGrid>
+              <a:tr h="486939">
+                <a:tc>
+                  <a:txBody>
+                    <a:bodyPr/>
+                    <a:lstStyle/>
+                    <a:p>
+                      <a:pPr algn="ctr"/>
+                      <a:r>
+                        <a:rPr lang="pl-PL" sz="2400" dirty="0" smtClean="0"/>
+                        <a:t>Reflection</a:t>
+                      </a:r>
+                      <a:endParaRPr lang="pl-PL" sz="2400" dirty="0"/>
+                    </a:p>
+                  </a:txBody>
+                  <a:tcPr/>
+                </a:tc>
+                <a:tc>
+                  <a:txBody>
+                    <a:bodyPr/>
+                    <a:lstStyle/>
+                    <a:p>
+                      <a:pPr algn="ctr"/>
+                      <a:r>
+                        <a:rPr lang="pl-PL" sz="2400" dirty="0" smtClean="0"/>
+                        <a:t>Content</a:t>
+                      </a:r>
+                      <a:endParaRPr lang="pl-PL" sz="2400" dirty="0"/>
+                    </a:p>
+                  </a:txBody>
+                  <a:tcPr/>
+                </a:tc>
+              </a:tr>
+              <a:tr h="1560871">
+                <a:tc>
+                  <a:txBody>
+                    <a:bodyPr/>
+                    <a:lstStyle/>
+                    <a:p>
+                      <a:pPr marL="285750" indent="-285750">
+                        <a:buFont typeface="Arial" panose="020B0604020202020204" pitchFamily="34" charset="0"/>
+                        <a:buChar char="•"/>
+                      </a:pPr>
+                      <a:r>
+                        <a:rPr lang="pl-PL" sz="2200" dirty="0" smtClean="0"/>
+                        <a:t>eClass</a:t>
+                      </a:r>
+                    </a:p>
+                    <a:p>
+                      <a:pPr marL="285750" indent="-285750">
+                        <a:buFont typeface="Arial" panose="020B0604020202020204" pitchFamily="34" charset="0"/>
+                        <a:buChar char="•"/>
+                      </a:pPr>
+                      <a:r>
+                        <a:rPr lang="pl-PL" sz="2200" dirty="0" smtClean="0"/>
+                        <a:t>eGet</a:t>
+                      </a:r>
+                    </a:p>
+                    <a:p>
+                      <a:pPr marL="285750" indent="-285750">
+                        <a:buFont typeface="Arial" panose="020B0604020202020204" pitchFamily="34" charset="0"/>
+                        <a:buChar char="•"/>
+                      </a:pPr>
+                      <a:r>
+                        <a:rPr lang="pl-PL" sz="2200" dirty="0" smtClean="0"/>
+                        <a:t>eSet</a:t>
+                      </a:r>
+                    </a:p>
+                    <a:p>
+                      <a:pPr marL="285750" indent="-285750">
+                        <a:buFont typeface="Arial" panose="020B0604020202020204" pitchFamily="34" charset="0"/>
+                        <a:buChar char="•"/>
+                      </a:pPr>
+                      <a:r>
+                        <a:rPr lang="pl-PL" sz="2200" dirty="0" smtClean="0"/>
+                        <a:t>...</a:t>
+                      </a:r>
+                      <a:endParaRPr lang="pl-PL" sz="2200" dirty="0"/>
+                    </a:p>
+                  </a:txBody>
+                  <a:tcPr/>
+                </a:tc>
+                <a:tc>
+                  <a:txBody>
+                    <a:bodyPr/>
+                    <a:lstStyle/>
+                    <a:p>
+                      <a:pPr marL="285750" indent="-285750">
+                        <a:buFont typeface="Arial" panose="020B0604020202020204" pitchFamily="34" charset="0"/>
+                        <a:buChar char="•"/>
+                      </a:pPr>
+                      <a:r>
+                        <a:rPr lang="pl-PL" sz="2200" dirty="0" smtClean="0"/>
+                        <a:t>eResource</a:t>
+                      </a:r>
+                    </a:p>
+                    <a:p>
+                      <a:pPr marL="285750" indent="-285750">
+                        <a:buFont typeface="Arial" panose="020B0604020202020204" pitchFamily="34" charset="0"/>
+                        <a:buChar char="•"/>
+                      </a:pPr>
+                      <a:r>
+                        <a:rPr lang="pl-PL" sz="2200" dirty="0" smtClean="0"/>
+                        <a:t>eContainer</a:t>
+                      </a:r>
+                    </a:p>
+                    <a:p>
+                      <a:pPr marL="285750" indent="-285750">
+                        <a:buFont typeface="Arial" panose="020B0604020202020204" pitchFamily="34" charset="0"/>
+                        <a:buChar char="•"/>
+                      </a:pPr>
+                      <a:r>
+                        <a:rPr lang="pl-PL" sz="2200" dirty="0" smtClean="0"/>
+                        <a:t>eContents</a:t>
+                      </a:r>
+                    </a:p>
+                    <a:p>
+                      <a:pPr marL="285750" indent="-285750">
+                        <a:buFont typeface="Arial" panose="020B0604020202020204" pitchFamily="34" charset="0"/>
+                        <a:buChar char="•"/>
+                      </a:pPr>
+                      <a:r>
+                        <a:rPr lang="pl-PL" sz="2200" dirty="0" smtClean="0"/>
+                        <a:t>...</a:t>
+                      </a:r>
+                      <a:endParaRPr lang="pl-PL" sz="2200" dirty="0"/>
+                    </a:p>
+                  </a:txBody>
+                  <a:tcPr/>
+                </a:tc>
+              </a:tr>
+            </a:tbl>
+          </a:graphicData>
+        </a:graphic>
+      </p:graphicFrame>
+    </p:spTree>
+    <p:extLst>
+      <p:ext uri="{BB962C8B-B14F-4D97-AF65-F5344CB8AC3E}">
+        <p14:creationId xmlns:p14="http://schemas.microsoft.com/office/powerpoint/2010/main" val="803711769"/>
+      </p:ext>
+    </p:extLst>
+  </p:cSld>
+  <p:clrMapOvr>
+    <a:masterClrMapping/>
+  </p:clrMapOvr>
+  <p:timing>
+    <p:tnLst>
+      <p:par>
+        <p:cTn id="1" dur="indefinite" restart="never" nodeType="tmRoot">
+          <p:childTnLst>
+            <p:seq concurrent="1" nextAc="seek">
+              <p:cTn id="2" dur="indefinite" nodeType="mainSeq">
+                <p:childTnLst>
+                  <p:par>
+                    <p:cTn id="3" fill="hold">
+                      <p:stCondLst>
+                        <p:cond delay="indefinite"/>
+                      </p:stCondLst>
+                      <p:childTnLst>
+                        <p:par>
+                          <p:cTn id="4" fill="hold">
+                            <p:stCondLst>
+                              <p:cond delay="0"/>
+                            </p:stCondLst>
+                            <p:childTnLst>
+                              <p:par>
+                                <p:cTn id="5" presetID="1" presetClass="entr" presetSubtype="0" fill="hold" grpId="0" nodeType="clickEffect">
+                                  <p:stCondLst>
+                                    <p:cond delay="0"/>
+                                  </p:stCondLst>
+                                  <p:childTnLst>
+                                    <p:set>
+                                      <p:cBhvr>
+                                        <p:cTn id="6" dur="1" fill="hold">
+                                          <p:stCondLst>
+                                            <p:cond delay="0"/>
+                                          </p:stCondLst>
+                                        </p:cTn>
+                                        <p:tgtEl>
+                                          <p:spTgt spid="3">
+                                            <p:txEl>
+                                              <p:pRg st="0" end="0"/>
+                                            </p:txEl>
+                                          </p:spTgt>
+                                        </p:tgtEl>
+                                        <p:attrNameLst>
+                                          <p:attrName>style.visibility</p:attrName>
+                                        </p:attrNameLst>
+                                      </p:cBhvr>
+                                      <p:to>
+                                        <p:strVal val="visible"/>
+                                      </p:to>
+                                    </p:set>
+                                  </p:childTnLst>
+                                </p:cTn>
+                              </p:par>
+                            </p:childTnLst>
+                          </p:cTn>
+                        </p:par>
+                      </p:childTnLst>
+                    </p:cTn>
+                  </p:par>
+                  <p:par>
+                    <p:cTn id="7" fill="hold">
+                      <p:stCondLst>
+                        <p:cond delay="indefinite"/>
+                      </p:stCondLst>
+                      <p:childTnLst>
+                        <p:par>
+                          <p:cTn id="8" fill="hold">
+                            <p:stCondLst>
+                              <p:cond delay="0"/>
+                            </p:stCondLst>
+                            <p:childTnLst>
+                              <p:par>
+                                <p:cTn id="9" presetID="1" presetClass="entr" presetSubtype="0" fill="hold" nodeType="clickEffect">
+                                  <p:stCondLst>
+                                    <p:cond delay="0"/>
+                                  </p:stCondLst>
+                                  <p:childTnLst>
+                                    <p:set>
+                                      <p:cBhvr>
+                                        <p:cTn id="10" dur="1" fill="hold">
+                                          <p:stCondLst>
+                                            <p:cond delay="0"/>
+                                          </p:stCondLst>
+                                        </p:cTn>
+                                        <p:tgtEl>
+                                          <p:spTgt spid="3">
+                                            <p:txEl>
+                                              <p:pRg st="1" end="1"/>
+                                            </p:txEl>
+                                          </p:spTgt>
+                                        </p:tgtEl>
+                                        <p:attrNameLst>
+                                          <p:attrName>style.visibility</p:attrName>
+                                        </p:attrNameLst>
+                                      </p:cBhvr>
+                                      <p:to>
+                                        <p:strVal val="visible"/>
+                                      </p:to>
+                                    </p:set>
+                                  </p:childTnLst>
+                                </p:cTn>
+                              </p:par>
+                            </p:childTnLst>
+                          </p:cTn>
+                        </p:par>
+                      </p:childTnLst>
+                    </p:cTn>
+                  </p:par>
+                  <p:par>
+                    <p:cTn id="11" fill="hold">
+                      <p:stCondLst>
+                        <p:cond delay="indefinite"/>
+                      </p:stCondLst>
+                      <p:childTnLst>
+                        <p:par>
+                          <p:cTn id="12" fill="hold">
+                            <p:stCondLst>
+                              <p:cond delay="0"/>
+                            </p:stCondLst>
+                            <p:childTnLst>
+                              <p:par>
+                                <p:cTn id="13" presetID="1" presetClass="entr" presetSubtype="0" fill="hold" nodeType="clickEffect">
+                                  <p:stCondLst>
+                                    <p:cond delay="0"/>
+                                  </p:stCondLst>
+                                  <p:childTnLst>
+                                    <p:set>
+                                      <p:cBhvr>
+                                        <p:cTn id="14" dur="1" fill="hold">
+                                          <p:stCondLst>
+                                            <p:cond delay="0"/>
+                                          </p:stCondLst>
+                                        </p:cTn>
+                                        <p:tgtEl>
+                                          <p:spTgt spid="7"/>
+                                        </p:tgtEl>
+                                        <p:attrNameLst>
+                                          <p:attrName>style.visibility</p:attrName>
+                                        </p:attrNameLst>
+                                      </p:cBhvr>
+                                      <p:to>
+                                        <p:strVal val="visible"/>
+                                      </p:to>
+                                    </p:set>
+                                  </p:childTnLst>
+                                </p:cTn>
+                              </p:par>
+                            </p:childTnLst>
+                          </p:cTn>
+                        </p:par>
+                      </p:childTnLst>
+                    </p:cTn>
+                  </p:par>
+                </p:childTnLst>
+              </p:cTn>
+              <p:prevCondLst>
+                <p:cond evt="onPrev" delay="0">
+                  <p:tgtEl>
+                    <p:sldTgt/>
+                  </p:tgtEl>
+                </p:cond>
+              </p:prevCondLst>
+              <p:nextCondLst>
+                <p:cond evt="onNext" delay="0">
+                  <p:tgtEl>
+                    <p:sldTgt/>
+                  </p:tgtEl>
+                </p:cond>
+              </p:nextCondLst>
+            </p:seq>
+          </p:childTnLst>
+        </p:cTn>
+      </p:par>
+    </p:tnLst>
+    <p:bldLst>
+      <p:bldP spid="3" grpId="0" uiExpand="1" build="p"/>
+    </p:bldLst>
+  </p:timing>
+</p:sld>
+</file>
+
+<file path=ppt/slides/slide11.xml><?xml version="1.0" encoding="utf-8"?>
+<p:sld xmlns:a="http://schemas.openxmlformats.org/drawingml/2006/main" xmlns:r="http://schemas.openxmlformats.org/officeDocument/2006/relationships" xmlns:p="http://schemas.openxmlformats.org/presentationml/2006/main">
+  <p:cSld>
+    <p:spTree>
+      <p:nvGrpSpPr>
+        <p:cNvPr id="1" name=""/>
+        <p:cNvGrpSpPr/>
+        <p:nvPr/>
+      </p:nvGrpSpPr>
+      <p:grpSpPr>
+        <a:xfrm>
+          <a:off x="0" y="0"/>
+          <a:ext cx="0" cy="0"/>
+          <a:chOff x="0" y="0"/>
+          <a:chExt cx="0" cy="0"/>
+        </a:xfrm>
+      </p:grpSpPr>
+      <p:sp>
+        <p:nvSpPr>
+          <p:cNvPr id="2" name="Title 1"/>
+          <p:cNvSpPr>
+            <a:spLocks noGrp="1"/>
+          </p:cNvSpPr>
+          <p:nvPr>
+            <p:ph type="title"/>
+          </p:nvPr>
+        </p:nvSpPr>
+        <p:spPr/>
+        <p:txBody>
+          <a:bodyPr/>
+          <a:lstStyle/>
+          <a:p>
+            <a:r>
+              <a:rPr lang="pl-PL" dirty="0" smtClean="0"/>
+              <a:t>EMF - metamodel</a:t>
+            </a:r>
+            <a:endParaRPr lang="pl-PL" dirty="0"/>
+          </a:p>
+        </p:txBody>
+      </p:sp>
+      <p:sp>
+        <p:nvSpPr>
+          <p:cNvPr id="3" name="Text Placeholder 2"/>
+          <p:cNvSpPr>
+            <a:spLocks noGrp="1"/>
+          </p:cNvSpPr>
+          <p:nvPr>
+            <p:ph type="body" sz="quarter" idx="13"/>
+          </p:nvPr>
+        </p:nvSpPr>
+        <p:spPr/>
+        <p:txBody>
+          <a:bodyPr>
+            <a:normAutofit/>
+          </a:bodyPr>
+          <a:lstStyle/>
+          <a:p>
+            <a:r>
+              <a:rPr lang="pl-PL" sz="2200" dirty="0"/>
+              <a:t>EClass</a:t>
+            </a:r>
+            <a:endParaRPr lang="pl-PL" sz="2200" dirty="0" smtClean="0"/>
+          </a:p>
+          <a:p>
+            <a:r>
+              <a:rPr lang="pl-PL" sz="2200" dirty="0"/>
+              <a:t>EStructuralFeature</a:t>
+            </a:r>
+          </a:p>
+          <a:p>
+            <a:pPr lvl="1"/>
+            <a:r>
+              <a:rPr lang="pl-PL" sz="2000" dirty="0" smtClean="0"/>
+              <a:t>EAttribute</a:t>
+            </a:r>
+          </a:p>
+          <a:p>
+            <a:pPr lvl="1"/>
+            <a:r>
+              <a:rPr lang="pl-PL" sz="2000" dirty="0" smtClean="0"/>
+              <a:t>EReference</a:t>
+            </a:r>
+          </a:p>
+          <a:p>
+            <a:r>
+              <a:rPr lang="pl-PL" sz="2200" dirty="0" smtClean="0"/>
+              <a:t>EOperation</a:t>
+            </a:r>
+          </a:p>
+          <a:p>
+            <a:r>
+              <a:rPr lang="pl-PL" sz="2200" dirty="0" smtClean="0"/>
+              <a:t>EDataType</a:t>
+            </a:r>
+          </a:p>
+        </p:txBody>
+      </p:sp>
+      <p:sp>
+        <p:nvSpPr>
+          <p:cNvPr id="4" name="Footer Placeholder 3"/>
+          <p:cNvSpPr>
+            <a:spLocks noGrp="1"/>
+          </p:cNvSpPr>
+          <p:nvPr>
+            <p:ph type="ftr" sz="quarter" idx="11"/>
+          </p:nvPr>
+        </p:nvSpPr>
+        <p:spPr/>
+        <p:txBody>
+          <a:bodyPr/>
+          <a:lstStyle/>
+          <a:p>
+            <a:r>
+              <a:rPr lang="pl-PL" smtClean="0"/>
+              <a:t>www.rec-global.com</a:t>
+            </a:r>
+            <a:endParaRPr lang="pl-PL" dirty="0">
+              <a:solidFill>
+                <a:schemeClr val="tx1"/>
+              </a:solidFill>
+            </a:endParaRPr>
+          </a:p>
+        </p:txBody>
+      </p:sp>
+      <p:sp>
+        <p:nvSpPr>
+          <p:cNvPr id="5" name="Slide Number Placeholder 4"/>
+          <p:cNvSpPr>
+            <a:spLocks noGrp="1"/>
+          </p:cNvSpPr>
+          <p:nvPr>
+            <p:ph type="sldNum" sz="quarter" idx="12"/>
+          </p:nvPr>
+        </p:nvSpPr>
+        <p:spPr/>
+        <p:txBody>
+          <a:bodyPr/>
+          <a:lstStyle/>
+          <a:p>
+            <a:pPr algn="ctr"/>
+            <a:fld id="{49FFD7C8-786B-42CE-8D79-AFCFE16DD4F2}" type="slidenum">
+              <a:rPr lang="pl-PL" smtClean="0"/>
+              <a:pPr algn="ctr"/>
+              <a:t>11</a:t>
+            </a:fld>
+            <a:endParaRPr lang="pl-PL" dirty="0"/>
+          </a:p>
+        </p:txBody>
+      </p:sp>
+      <p:sp>
+        <p:nvSpPr>
+          <p:cNvPr id="6" name="Date Placeholder 5"/>
+          <p:cNvSpPr>
+            <a:spLocks noGrp="1"/>
+          </p:cNvSpPr>
+          <p:nvPr>
+            <p:ph type="dt" sz="half" idx="10"/>
+          </p:nvPr>
+        </p:nvSpPr>
+        <p:spPr/>
+        <p:txBody>
+          <a:bodyPr/>
+          <a:lstStyle/>
+          <a:p>
+            <a:fld id="{A1C14688-799C-45A6-846F-47D660935463}" type="datetime1">
+              <a:rPr lang="pl-PL" smtClean="0"/>
+              <a:pPr/>
+              <a:t>2015-09-17</a:t>
+            </a:fld>
+            <a:endParaRPr lang="pl-PL" dirty="0"/>
+          </a:p>
+        </p:txBody>
+      </p:sp>
+      <p:pic>
+        <p:nvPicPr>
+          <p:cNvPr id="7" name="Picture 6"/>
+          <p:cNvPicPr>
+            <a:picLocks noChangeAspect="1"/>
+          </p:cNvPicPr>
+          <p:nvPr/>
+        </p:nvPicPr>
+        <p:blipFill>
+          <a:blip r:embed="rId2"/>
+          <a:stretch>
+            <a:fillRect/>
+          </a:stretch>
+        </p:blipFill>
+        <p:spPr>
+          <a:xfrm>
+            <a:off x="3559442" y="1772955"/>
+            <a:ext cx="7096125" cy="2552700"/>
+          </a:xfrm>
+          <a:prstGeom prst="rect">
+            <a:avLst/>
+          </a:prstGeom>
+        </p:spPr>
+      </p:pic>
+    </p:spTree>
+    <p:extLst>
+      <p:ext uri="{BB962C8B-B14F-4D97-AF65-F5344CB8AC3E}">
+        <p14:creationId xmlns:p14="http://schemas.microsoft.com/office/powerpoint/2010/main" val="4075416827"/>
+      </p:ext>
+    </p:extLst>
+  </p:cSld>
+  <p:clrMapOvr>
+    <a:masterClrMapping/>
+  </p:clrMapOvr>
+  <p:timing>
+    <p:tnLst>
+      <p:par>
+        <p:cTn id="1" dur="indefinite" restart="never" nodeType="tmRoot">
+          <p:childTnLst>
+            <p:seq concurrent="1" nextAc="seek">
+              <p:cTn id="2" dur="indefinite" nodeType="mainSeq">
+                <p:childTnLst>
+                  <p:par>
+                    <p:cTn id="3" fill="hold">
+                      <p:stCondLst>
+                        <p:cond delay="indefinite"/>
+                      </p:stCondLst>
+                      <p:childTnLst>
+                        <p:par>
+                          <p:cTn id="4" fill="hold">
+                            <p:stCondLst>
+                              <p:cond delay="0"/>
+                            </p:stCondLst>
+                            <p:childTnLst>
+                              <p:par>
+                                <p:cTn id="5" presetID="1" presetClass="entr" presetSubtype="0" fill="hold" nodeType="clickEffect">
+                                  <p:stCondLst>
+                                    <p:cond delay="0"/>
+                                  </p:stCondLst>
+                                  <p:childTnLst>
+                                    <p:set>
+                                      <p:cBhvr>
+                                        <p:cTn id="6" dur="1" fill="hold">
+                                          <p:stCondLst>
+                                            <p:cond delay="0"/>
+                                          </p:stCondLst>
+                                        </p:cTn>
+                                        <p:tgtEl>
+                                          <p:spTgt spid="3">
+                                            <p:txEl>
+                                              <p:pRg st="0" end="0"/>
+                                            </p:txEl>
+                                          </p:spTgt>
+                                        </p:tgtEl>
+                                        <p:attrNameLst>
+                                          <p:attrName>style.visibility</p:attrName>
+                                        </p:attrNameLst>
+                                      </p:cBhvr>
+                                      <p:to>
+                                        <p:strVal val="visible"/>
+                                      </p:to>
+                                    </p:set>
+                                  </p:childTnLst>
+                                </p:cTn>
+                              </p:par>
+                              <p:par>
+                                <p:cTn id="7" presetID="1" presetClass="entr" presetSubtype="0" fill="hold" nodeType="withEffect">
+                                  <p:stCondLst>
+                                    <p:cond delay="0"/>
+                                  </p:stCondLst>
+                                  <p:childTnLst>
+                                    <p:set>
+                                      <p:cBhvr>
+                                        <p:cTn id="8" dur="1" fill="hold">
+                                          <p:stCondLst>
+                                            <p:cond delay="0"/>
+                                          </p:stCondLst>
+                                        </p:cTn>
+                                        <p:tgtEl>
+                                          <p:spTgt spid="3">
+                                            <p:txEl>
+                                              <p:pRg st="1" end="1"/>
+                                            </p:txEl>
+                                          </p:spTgt>
+                                        </p:tgtEl>
+                                        <p:attrNameLst>
+                                          <p:attrName>style.visibility</p:attrName>
+                                        </p:attrNameLst>
+                                      </p:cBhvr>
+                                      <p:to>
+                                        <p:strVal val="visible"/>
+                                      </p:to>
+                                    </p:set>
+                                  </p:childTnLst>
+                                </p:cTn>
+                              </p:par>
+                              <p:par>
+                                <p:cTn id="9" presetID="1" presetClass="entr" presetSubtype="0" fill="hold" nodeType="withEffect">
+                                  <p:stCondLst>
+                                    <p:cond delay="0"/>
+                                  </p:stCondLst>
+                                  <p:childTnLst>
+                                    <p:set>
+                                      <p:cBhvr>
+                                        <p:cTn id="10" dur="1" fill="hold">
+                                          <p:stCondLst>
+                                            <p:cond delay="0"/>
+                                          </p:stCondLst>
+                                        </p:cTn>
+                                        <p:tgtEl>
+                                          <p:spTgt spid="3">
+                                            <p:txEl>
+                                              <p:pRg st="2" end="2"/>
+                                            </p:txEl>
+                                          </p:spTgt>
+                                        </p:tgtEl>
+                                        <p:attrNameLst>
+                                          <p:attrName>style.visibility</p:attrName>
+                                        </p:attrNameLst>
+                                      </p:cBhvr>
+                                      <p:to>
+                                        <p:strVal val="visible"/>
+                                      </p:to>
+                                    </p:set>
+                                  </p:childTnLst>
+                                </p:cTn>
+                              </p:par>
+                              <p:par>
+                                <p:cTn id="11" presetID="1" presetClass="entr" presetSubtype="0" fill="hold" nodeType="withEffect">
+                                  <p:stCondLst>
+                                    <p:cond delay="0"/>
+                                  </p:stCondLst>
+                                  <p:childTnLst>
+                                    <p:set>
+                                      <p:cBhvr>
+                                        <p:cTn id="12" dur="1" fill="hold">
+                                          <p:stCondLst>
+                                            <p:cond delay="0"/>
+                                          </p:stCondLst>
+                                        </p:cTn>
+                                        <p:tgtEl>
+                                          <p:spTgt spid="3">
+                                            <p:txEl>
+                                              <p:pRg st="3" end="3"/>
+                                            </p:txEl>
+                                          </p:spTgt>
+                                        </p:tgtEl>
+                                        <p:attrNameLst>
+                                          <p:attrName>style.visibility</p:attrName>
+                                        </p:attrNameLst>
+                                      </p:cBhvr>
+                                      <p:to>
+                                        <p:strVal val="visible"/>
+                                      </p:to>
+                                    </p:set>
+                                  </p:childTnLst>
+                                </p:cTn>
+                              </p:par>
+                              <p:par>
+                                <p:cTn id="13" presetID="1" presetClass="entr" presetSubtype="0" fill="hold" nodeType="withEffect">
+                                  <p:stCondLst>
+                                    <p:cond delay="0"/>
+                                  </p:stCondLst>
+                                  <p:childTnLst>
+                                    <p:set>
+                                      <p:cBhvr>
+                                        <p:cTn id="14" dur="1" fill="hold">
+                                          <p:stCondLst>
+                                            <p:cond delay="0"/>
+                                          </p:stCondLst>
+                                        </p:cTn>
+                                        <p:tgtEl>
+                                          <p:spTgt spid="3">
+                                            <p:txEl>
+                                              <p:pRg st="4" end="4"/>
+                                            </p:txEl>
+                                          </p:spTgt>
+                                        </p:tgtEl>
+                                        <p:attrNameLst>
+                                          <p:attrName>style.visibility</p:attrName>
+                                        </p:attrNameLst>
+                                      </p:cBhvr>
+                                      <p:to>
+                                        <p:strVal val="visible"/>
+                                      </p:to>
+                                    </p:set>
+                                  </p:childTnLst>
+                                </p:cTn>
+                              </p:par>
+                              <p:par>
+                                <p:cTn id="15" presetID="1" presetClass="entr" presetSubtype="0" fill="hold" nodeType="withEffect">
+                                  <p:stCondLst>
+                                    <p:cond delay="0"/>
+                                  </p:stCondLst>
+                                  <p:childTnLst>
+                                    <p:set>
+                                      <p:cBhvr>
+                                        <p:cTn id="16" dur="1" fill="hold">
+                                          <p:stCondLst>
+                                            <p:cond delay="0"/>
+                                          </p:stCondLst>
+                                        </p:cTn>
+                                        <p:tgtEl>
+                                          <p:spTgt spid="3">
+                                            <p:txEl>
+                                              <p:pRg st="5" end="5"/>
+                                            </p:txEl>
+                                          </p:spTgt>
+                                        </p:tgtEl>
+                                        <p:attrNameLst>
+                                          <p:attrName>style.visibility</p:attrName>
+                                        </p:attrNameLst>
+                                      </p:cBhvr>
+                                      <p:to>
+                                        <p:strVal val="visible"/>
+                                      </p:to>
+                                    </p:set>
+                                  </p:childTnLst>
+                                </p:cTn>
+                              </p:par>
+                            </p:childTnLst>
+                          </p:cTn>
+                        </p:par>
+                      </p:childTnLst>
+                    </p:cTn>
+                  </p:par>
+                  <p:par>
+                    <p:cTn id="17" fill="hold">
+                      <p:stCondLst>
+                        <p:cond delay="indefinite"/>
+                      </p:stCondLst>
+                      <p:childTnLst>
+                        <p:par>
+                          <p:cTn id="18" fill="hold">
+                            <p:stCondLst>
+                              <p:cond delay="0"/>
+                            </p:stCondLst>
+                            <p:childTnLst>
+                              <p:par>
+                                <p:cTn id="19" presetID="1" presetClass="entr" presetSubtype="0" fill="hold" nodeType="clickEffect">
+                                  <p:stCondLst>
+                                    <p:cond delay="0"/>
+                                  </p:stCondLst>
+                                  <p:childTnLst>
+                                    <p:set>
+                                      <p:cBhvr>
+                                        <p:cTn id="20" dur="1" fill="hold">
+                                          <p:stCondLst>
+                                            <p:cond delay="0"/>
+                                          </p:stCondLst>
+                                        </p:cTn>
+                                        <p:tgtEl>
+                                          <p:spTgt spid="7"/>
+                                        </p:tgtEl>
+                                        <p:attrNameLst>
+                                          <p:attrName>style.visibility</p:attrName>
+                                        </p:attrNameLst>
+                                      </p:cBhvr>
+                                      <p:to>
+                                        <p:strVal val="visible"/>
+                                      </p:to>
+                                    </p:set>
+                                  </p:childTnLst>
+                                </p:cTn>
+                              </p:par>
+                            </p:childTnLst>
+                          </p:cTn>
+                        </p:par>
+                      </p:childTnLst>
+                    </p:cTn>
+                  </p:par>
+                </p:childTnLst>
+              </p:cTn>
+              <p:prevCondLst>
+                <p:cond evt="onPrev" delay="0">
+                  <p:tgtEl>
+                    <p:sldTgt/>
+                  </p:tgtEl>
+                </p:cond>
+              </p:prevCondLst>
+              <p:nextCondLst>
+                <p:cond evt="onNext" delay="0">
+                  <p:tgtEl>
+                    <p:sldTgt/>
+                  </p:tgtEl>
+                </p:cond>
+              </p:nextCondLst>
+            </p:seq>
+          </p:childTnLst>
+        </p:cTn>
+      </p:par>
+    </p:tnLst>
+  </p:timing>
+</p:sld>
+</file>
+
+<file path=ppt/slides/slide12.xml><?xml version="1.0" encoding="utf-8"?>
+<p:sld xmlns:a="http://schemas.openxmlformats.org/drawingml/2006/main" xmlns:r="http://schemas.openxmlformats.org/officeDocument/2006/relationships" xmlns:p="http://schemas.openxmlformats.org/presentationml/2006/main">
+  <p:cSld>
+    <p:spTree>
+      <p:nvGrpSpPr>
+        <p:cNvPr id="1" name=""/>
+        <p:cNvGrpSpPr/>
+        <p:nvPr/>
+      </p:nvGrpSpPr>
+      <p:grpSpPr>
+        <a:xfrm>
+          <a:off x="0" y="0"/>
+          <a:ext cx="0" cy="0"/>
+          <a:chOff x="0" y="0"/>
+          <a:chExt cx="0" cy="0"/>
+        </a:xfrm>
+      </p:grpSpPr>
+      <p:sp>
+        <p:nvSpPr>
+          <p:cNvPr id="2" name="Title 1"/>
+          <p:cNvSpPr>
+            <a:spLocks noGrp="1"/>
+          </p:cNvSpPr>
+          <p:nvPr>
+            <p:ph type="title"/>
+          </p:nvPr>
+        </p:nvSpPr>
+        <p:spPr/>
+        <p:txBody>
+          <a:bodyPr/>
+          <a:lstStyle/>
+          <a:p>
+            <a:r>
+              <a:rPr lang="pl-PL" dirty="0"/>
+              <a:t>EMF demo - command </a:t>
+            </a:r>
+            <a:r>
+              <a:rPr lang="pl-PL" dirty="0" smtClean="0"/>
+              <a:t>stack &amp; adapters</a:t>
+            </a:r>
+            <a:endParaRPr lang="pl-PL" dirty="0"/>
+          </a:p>
+        </p:txBody>
+      </p:sp>
+      <p:sp>
+        <p:nvSpPr>
+          <p:cNvPr id="3" name="Text Placeholder 2"/>
+          <p:cNvSpPr>
+            <a:spLocks noGrp="1"/>
+          </p:cNvSpPr>
+          <p:nvPr>
+            <p:ph type="body" sz="quarter" idx="13"/>
+          </p:nvPr>
+        </p:nvSpPr>
+        <p:spPr/>
+        <p:txBody>
+          <a:bodyPr/>
+          <a:lstStyle/>
+          <a:p>
+            <a:r>
+              <a:rPr lang="pl-PL" sz="2200" dirty="0" smtClean="0"/>
+              <a:t>Editing objects using commands</a:t>
+            </a:r>
+          </a:p>
+          <a:p>
+            <a:r>
+              <a:rPr lang="pl-PL" sz="2200" dirty="0" smtClean="0"/>
+              <a:t>Undo/redo</a:t>
+            </a:r>
+          </a:p>
+          <a:p>
+            <a:r>
+              <a:rPr lang="pl-PL" sz="2200" dirty="0" smtClean="0"/>
+              <a:t>Adapters as change listeners</a:t>
+            </a:r>
+          </a:p>
+          <a:p>
+            <a:endParaRPr lang="pl-PL" dirty="0"/>
+          </a:p>
+        </p:txBody>
+      </p:sp>
+      <p:sp>
+        <p:nvSpPr>
+          <p:cNvPr id="4" name="Footer Placeholder 3"/>
+          <p:cNvSpPr>
+            <a:spLocks noGrp="1"/>
+          </p:cNvSpPr>
+          <p:nvPr>
+            <p:ph type="ftr" sz="quarter" idx="11"/>
+          </p:nvPr>
+        </p:nvSpPr>
+        <p:spPr/>
+        <p:txBody>
+          <a:bodyPr/>
+          <a:lstStyle/>
+          <a:p>
+            <a:r>
+              <a:rPr lang="pl-PL" smtClean="0"/>
+              <a:t>www.rec-global.com</a:t>
+            </a:r>
+            <a:endParaRPr lang="pl-PL" dirty="0">
+              <a:solidFill>
+                <a:schemeClr val="tx1"/>
+              </a:solidFill>
+            </a:endParaRPr>
+          </a:p>
+        </p:txBody>
+      </p:sp>
+      <p:sp>
+        <p:nvSpPr>
+          <p:cNvPr id="5" name="Slide Number Placeholder 4"/>
+          <p:cNvSpPr>
+            <a:spLocks noGrp="1"/>
+          </p:cNvSpPr>
+          <p:nvPr>
+            <p:ph type="sldNum" sz="quarter" idx="12"/>
+          </p:nvPr>
+        </p:nvSpPr>
+        <p:spPr/>
+        <p:txBody>
+          <a:bodyPr/>
+          <a:lstStyle/>
+          <a:p>
+            <a:pPr algn="ctr"/>
+            <a:fld id="{49FFD7C8-786B-42CE-8D79-AFCFE16DD4F2}" type="slidenum">
+              <a:rPr lang="pl-PL" smtClean="0"/>
+              <a:pPr algn="ctr"/>
+              <a:t>12</a:t>
+            </a:fld>
+            <a:endParaRPr lang="pl-PL" dirty="0"/>
+          </a:p>
+        </p:txBody>
+      </p:sp>
+      <p:sp>
+        <p:nvSpPr>
+          <p:cNvPr id="6" name="Date Placeholder 5"/>
+          <p:cNvSpPr>
+            <a:spLocks noGrp="1"/>
+          </p:cNvSpPr>
+          <p:nvPr>
+            <p:ph type="dt" sz="half" idx="10"/>
+          </p:nvPr>
+        </p:nvSpPr>
+        <p:spPr/>
+        <p:txBody>
+          <a:bodyPr/>
+          <a:lstStyle/>
+          <a:p>
+            <a:fld id="{A1C14688-799C-45A6-846F-47D660935463}" type="datetime1">
+              <a:rPr lang="pl-PL" smtClean="0"/>
+              <a:pPr/>
+              <a:t>2015-09-17</a:t>
             </a:fld>
             <a:endParaRPr lang="pl-PL" dirty="0"/>
           </a:p>
@@ -6840,7 +7842,7 @@
 </p:sld>
 </file>
 
-<file path=ppt/slides/slide11.xml><?xml version="1.0" encoding="utf-8"?>
+<file path=ppt/slides/slide13.xml><?xml version="1.0" encoding="utf-8"?>
 <p:sld xmlns:a="http://schemas.openxmlformats.org/drawingml/2006/main" xmlns:r="http://schemas.openxmlformats.org/officeDocument/2006/relationships" xmlns:p="http://schemas.openxmlformats.org/presentationml/2006/main">
   <p:cSld>
     <p:spTree>
@@ -7006,7 +8008,7 @@
             <a:fld id="{49FFD7C8-786B-42CE-8D79-AFCFE16DD4F2}" type="slidenum">
               <a:rPr lang="pl-PL" smtClean="0"/>
               <a:pPr algn="ctr"/>
-              <a:t>11</a:t>
+              <a:t>13</a:t>
             </a:fld>
             <a:endParaRPr lang="pl-PL" dirty="0"/>
           </a:p>
@@ -7030,7 +8032,7 @@
             <a:fld id="{A1C14688-799C-45A6-846F-47D660935463}" type="datetime1">
               <a:rPr lang="pl-PL" smtClean="0"/>
               <a:pPr/>
-              <a:t>2015-09-16</a:t>
+              <a:t>2015-09-17</a:t>
             </a:fld>
             <a:endParaRPr lang="pl-PL" dirty="0"/>
           </a:p>
@@ -7391,7 +8393,7 @@
 </p:sld>
 </file>
 
-<file path=ppt/slides/slide12.xml><?xml version="1.0" encoding="utf-8"?>
+<file path=ppt/slides/slide14.xml><?xml version="1.0" encoding="utf-8"?>
 <p:sld xmlns:a="http://schemas.openxmlformats.org/drawingml/2006/main" xmlns:r="http://schemas.openxmlformats.org/officeDocument/2006/relationships" xmlns:p="http://schemas.openxmlformats.org/presentationml/2006/main">
   <p:cSld>
     <p:spTree>
@@ -7461,7 +8463,6 @@
               <a:rPr lang="pl-PL" dirty="0" smtClean="0"/>
               <a:t>framework</a:t>
             </a:r>
-            <a:endParaRPr lang="pl-PL" dirty="0" smtClean="0"/>
           </a:p>
           <a:p>
             <a:r>
@@ -7514,7 +8515,6 @@
               <a:rPr lang="pl-PL" dirty="0" smtClean="0"/>
               <a:t> </a:t>
             </a:r>
-            <a:endParaRPr lang="pl-PL" dirty="0" smtClean="0"/>
           </a:p>
         </p:txBody>
       </p:sp>
@@ -7564,7 +8564,7 @@
             <a:fld id="{49FFD7C8-786B-42CE-8D79-AFCFE16DD4F2}" type="slidenum">
               <a:rPr lang="pl-PL" smtClean="0"/>
               <a:pPr algn="ctr"/>
-              <a:t>12</a:t>
+              <a:t>14</a:t>
             </a:fld>
             <a:endParaRPr lang="pl-PL" dirty="0"/>
           </a:p>
@@ -7588,7 +8588,7 @@
             <a:fld id="{A1C14688-799C-45A6-846F-47D660935463}" type="datetime1">
               <a:rPr lang="pl-PL" smtClean="0"/>
               <a:pPr/>
-              <a:t>2015-09-16</a:t>
+              <a:t>2015-09-17</a:t>
             </a:fld>
             <a:endParaRPr lang="pl-PL" dirty="0"/>
           </a:p>
@@ -7655,7 +8655,7 @@
 </p:sld>
 </file>
 
-<file path=ppt/slides/slide13.xml><?xml version="1.0" encoding="utf-8"?>
+<file path=ppt/slides/slide15.xml><?xml version="1.0" encoding="utf-8"?>
 <p:sld xmlns:a="http://schemas.openxmlformats.org/drawingml/2006/main" xmlns:r="http://schemas.openxmlformats.org/officeDocument/2006/relationships" xmlns:p="http://schemas.openxmlformats.org/presentationml/2006/main">
   <p:cSld>
     <p:spTree>
@@ -7865,7 +8865,7 @@
             <a:fld id="{49FFD7C8-786B-42CE-8D79-AFCFE16DD4F2}" type="slidenum">
               <a:rPr lang="pl-PL" smtClean="0"/>
               <a:pPr algn="ctr"/>
-              <a:t>13</a:t>
+              <a:t>15</a:t>
             </a:fld>
             <a:endParaRPr lang="pl-PL" dirty="0"/>
           </a:p>
@@ -7889,7 +8889,7 @@
             <a:fld id="{A1C14688-799C-45A6-846F-47D660935463}" type="datetime1">
               <a:rPr lang="pl-PL" smtClean="0"/>
               <a:pPr/>
-              <a:t>2015-09-16</a:t>
+              <a:t>2015-09-17</a:t>
             </a:fld>
             <a:endParaRPr lang="pl-PL" dirty="0"/>
           </a:p>
@@ -7956,7 +8956,7 @@
 </p:sld>
 </file>
 
-<file path=ppt/slides/slide14.xml><?xml version="1.0" encoding="utf-8"?>
+<file path=ppt/slides/slide16.xml><?xml version="1.0" encoding="utf-8"?>
 <p:sld xmlns:a="http://schemas.openxmlformats.org/drawingml/2006/main" xmlns:r="http://schemas.openxmlformats.org/officeDocument/2006/relationships" xmlns:p="http://schemas.openxmlformats.org/presentationml/2006/main">
   <p:cSld>
     <p:spTree>
@@ -8152,7 +9152,7 @@
             <a:fld id="{49FFD7C8-786B-42CE-8D79-AFCFE16DD4F2}" type="slidenum">
               <a:rPr lang="pl-PL" smtClean="0"/>
               <a:pPr algn="ctr"/>
-              <a:t>14</a:t>
+              <a:t>16</a:t>
             </a:fld>
             <a:endParaRPr lang="pl-PL" dirty="0"/>
           </a:p>
@@ -8176,7 +9176,7 @@
             <a:fld id="{A1C14688-799C-45A6-846F-47D660935463}" type="datetime1">
               <a:rPr lang="pl-PL" smtClean="0"/>
               <a:pPr/>
-              <a:t>2015-09-16</a:t>
+              <a:t>2015-09-17</a:t>
             </a:fld>
             <a:endParaRPr lang="pl-PL" dirty="0"/>
           </a:p>
@@ -8456,7 +9456,7 @@
             <a:fld id="{844BCD22-CA02-4C92-9F05-D5071550F6B3}" type="datetime1">
               <a:rPr lang="pl-PL" smtClean="0"/>
               <a:pPr/>
-              <a:t>2015-09-16</a:t>
+              <a:t>2015-09-17</a:t>
             </a:fld>
             <a:endParaRPr lang="pl-PL" dirty="0"/>
           </a:p>
@@ -8506,112 +9506,13 @@
         </p:nvSpPr>
         <p:spPr/>
         <p:txBody>
-          <a:bodyPr>
-            <a:normAutofit/>
-          </a:bodyPr>
+          <a:bodyPr/>
           <a:lstStyle/>
           <a:p>
-            <a:pPr lvl="0">
-              <a:lnSpc>
-                <a:spcPct val="150000"/>
-              </a:lnSpc>
-            </a:pPr>
             <a:r>
               <a:rPr lang="pl-PL" dirty="0"/>
               <a:t>Model-Driven Development</a:t>
             </a:r>
-          </a:p>
-        </p:txBody>
-      </p:sp>
-      <p:sp>
-        <p:nvSpPr>
-          <p:cNvPr id="3" name="Text Placeholder 2"/>
-          <p:cNvSpPr>
-            <a:spLocks noGrp="1"/>
-          </p:cNvSpPr>
-          <p:nvPr>
-            <p:ph type="body" sz="quarter" idx="13"/>
-          </p:nvPr>
-        </p:nvSpPr>
-        <p:spPr/>
-        <p:txBody>
-          <a:bodyPr>
-            <a:normAutofit/>
-          </a:bodyPr>
-          <a:lstStyle/>
-          <a:p>
-            <a:r>
-              <a:rPr lang="pl-PL" sz="2200" dirty="0" smtClean="0"/>
-              <a:t>Clear visibility</a:t>
-            </a:r>
-          </a:p>
-          <a:p>
-            <a:r>
-              <a:rPr lang="pl-PL" sz="2200" dirty="0"/>
-              <a:t>Flexibility(models can be adjusted</a:t>
-            </a:r>
-            <a:r>
-              <a:rPr lang="pl-PL" sz="2200" dirty="0" smtClean="0"/>
-              <a:t>)</a:t>
-            </a:r>
-          </a:p>
-          <a:p>
-            <a:r>
-              <a:rPr lang="pl-PL" sz="2200" dirty="0" smtClean="0"/>
-              <a:t>Fast </a:t>
-            </a:r>
-            <a:r>
-              <a:rPr lang="pl-PL" sz="2200" dirty="0"/>
-              <a:t>&amp; cost-effective</a:t>
-            </a:r>
-            <a:endParaRPr lang="pl-PL" sz="2200" dirty="0" smtClean="0"/>
-          </a:p>
-          <a:p>
-            <a:r>
-              <a:rPr lang="pl-PL" sz="2200" dirty="0" smtClean="0"/>
-              <a:t>Leads </a:t>
-            </a:r>
-            <a:r>
-              <a:rPr lang="pl-PL" sz="2200" dirty="0"/>
-              <a:t>to increased </a:t>
-            </a:r>
-            <a:r>
-              <a:rPr lang="pl-PL" sz="2200" dirty="0" smtClean="0"/>
-              <a:t>quality</a:t>
-            </a:r>
-          </a:p>
-          <a:p>
-            <a:r>
-              <a:rPr lang="pl-PL" sz="2200" dirty="0" smtClean="0"/>
-              <a:t>Enforces architecture</a:t>
-            </a:r>
-          </a:p>
-          <a:p>
-            <a:r>
-              <a:rPr lang="pl-PL" sz="2200" dirty="0" smtClean="0"/>
-              <a:t>L</a:t>
-            </a:r>
-            <a:r>
-              <a:rPr lang="en-US" sz="2200" dirty="0" smtClean="0"/>
-              <a:t>et</a:t>
-            </a:r>
-            <a:r>
-              <a:rPr lang="pl-PL" sz="2200" dirty="0" smtClean="0"/>
-              <a:t>’</a:t>
-            </a:r>
-            <a:r>
-              <a:rPr lang="en-US" sz="2200" dirty="0" smtClean="0"/>
-              <a:t>s programmers </a:t>
-            </a:r>
-            <a:r>
-              <a:rPr lang="en-US" sz="2200" dirty="0"/>
-              <a:t>focus on the hard </a:t>
-            </a:r>
-            <a:r>
-              <a:rPr lang="en-US" sz="2200" dirty="0" smtClean="0"/>
-              <a:t>stuff</a:t>
-            </a:r>
-            <a:endParaRPr lang="pl-PL" sz="2200" dirty="0" smtClean="0"/>
           </a:p>
         </p:txBody>
       </p:sp>
@@ -8685,7 +9586,492 @@
             <a:fld id="{A1C14688-799C-45A6-846F-47D660935463}" type="datetime1">
               <a:rPr lang="pl-PL" smtClean="0"/>
               <a:pPr/>
-              <a:t>2015-09-16</a:t>
+              <a:t>2015-09-17</a:t>
+            </a:fld>
+            <a:endParaRPr lang="pl-PL" dirty="0"/>
+          </a:p>
+        </p:txBody>
+      </p:sp>
+      <p:pic>
+        <p:nvPicPr>
+          <p:cNvPr id="10" name="Picture 9"/>
+          <p:cNvPicPr>
+            <a:picLocks noChangeAspect="1"/>
+          </p:cNvPicPr>
+          <p:nvPr/>
+        </p:nvPicPr>
+        <p:blipFill>
+          <a:blip r:embed="rId2"/>
+          <a:stretch>
+            <a:fillRect/>
+          </a:stretch>
+        </p:blipFill>
+        <p:spPr>
+          <a:xfrm>
+            <a:off x="474622" y="1070171"/>
+            <a:ext cx="8391525" cy="3676650"/>
+          </a:xfrm>
+          <a:prstGeom prst="rect">
+            <a:avLst/>
+          </a:prstGeom>
+        </p:spPr>
+      </p:pic>
+    </p:spTree>
+    <p:extLst>
+      <p:ext uri="{BB962C8B-B14F-4D97-AF65-F5344CB8AC3E}">
+        <p14:creationId xmlns:p14="http://schemas.microsoft.com/office/powerpoint/2010/main" val="3168187911"/>
+      </p:ext>
+    </p:extLst>
+  </p:cSld>
+  <p:clrMapOvr>
+    <a:masterClrMapping/>
+  </p:clrMapOvr>
+  <p:timing>
+    <p:tnLst>
+      <p:par>
+        <p:cTn id="1" dur="indefinite" restart="never" nodeType="tmRoot">
+          <p:childTnLst>
+            <p:seq concurrent="1" nextAc="seek">
+              <p:cTn id="2" dur="indefinite" nodeType="mainSeq">
+                <p:childTnLst>
+                  <p:par>
+                    <p:cTn id="3" fill="hold">
+                      <p:stCondLst>
+                        <p:cond delay="indefinite"/>
+                      </p:stCondLst>
+                      <p:childTnLst>
+                        <p:par>
+                          <p:cTn id="4" fill="hold">
+                            <p:stCondLst>
+                              <p:cond delay="0"/>
+                            </p:stCondLst>
+                            <p:childTnLst>
+                              <p:par>
+                                <p:cTn id="5" presetID="1" presetClass="entr" presetSubtype="0" fill="hold" nodeType="clickEffect">
+                                  <p:stCondLst>
+                                    <p:cond delay="0"/>
+                                  </p:stCondLst>
+                                  <p:childTnLst>
+                                    <p:set>
+                                      <p:cBhvr>
+                                        <p:cTn id="6" dur="1" fill="hold">
+                                          <p:stCondLst>
+                                            <p:cond delay="0"/>
+                                          </p:stCondLst>
+                                        </p:cTn>
+                                        <p:tgtEl>
+                                          <p:spTgt spid="10"/>
+                                        </p:tgtEl>
+                                        <p:attrNameLst>
+                                          <p:attrName>style.visibility</p:attrName>
+                                        </p:attrNameLst>
+                                      </p:cBhvr>
+                                      <p:to>
+                                        <p:strVal val="visible"/>
+                                      </p:to>
+                                    </p:set>
+                                  </p:childTnLst>
+                                </p:cTn>
+                              </p:par>
+                            </p:childTnLst>
+                          </p:cTn>
+                        </p:par>
+                      </p:childTnLst>
+                    </p:cTn>
+                  </p:par>
+                </p:childTnLst>
+              </p:cTn>
+              <p:prevCondLst>
+                <p:cond evt="onPrev" delay="0">
+                  <p:tgtEl>
+                    <p:sldTgt/>
+                  </p:tgtEl>
+                </p:cond>
+              </p:prevCondLst>
+              <p:nextCondLst>
+                <p:cond evt="onNext" delay="0">
+                  <p:tgtEl>
+                    <p:sldTgt/>
+                  </p:tgtEl>
+                </p:cond>
+              </p:nextCondLst>
+            </p:seq>
+          </p:childTnLst>
+        </p:cTn>
+      </p:par>
+    </p:tnLst>
+  </p:timing>
+</p:sld>
+</file>
+
+<file path=ppt/slides/slide4.xml><?xml version="1.0" encoding="utf-8"?>
+<p:sld xmlns:a="http://schemas.openxmlformats.org/drawingml/2006/main" xmlns:r="http://schemas.openxmlformats.org/officeDocument/2006/relationships" xmlns:p="http://schemas.openxmlformats.org/presentationml/2006/main">
+  <p:cSld>
+    <p:spTree>
+      <p:nvGrpSpPr>
+        <p:cNvPr id="1" name=""/>
+        <p:cNvGrpSpPr/>
+        <p:nvPr/>
+      </p:nvGrpSpPr>
+      <p:grpSpPr>
+        <a:xfrm>
+          <a:off x="0" y="0"/>
+          <a:ext cx="0" cy="0"/>
+          <a:chOff x="0" y="0"/>
+          <a:chExt cx="0" cy="0"/>
+        </a:xfrm>
+      </p:grpSpPr>
+      <p:sp>
+        <p:nvSpPr>
+          <p:cNvPr id="2" name="Title 1"/>
+          <p:cNvSpPr>
+            <a:spLocks noGrp="1"/>
+          </p:cNvSpPr>
+          <p:nvPr>
+            <p:ph type="title"/>
+          </p:nvPr>
+        </p:nvSpPr>
+        <p:spPr/>
+        <p:txBody>
+          <a:bodyPr/>
+          <a:lstStyle/>
+          <a:p>
+            <a:r>
+              <a:rPr lang="pl-PL" dirty="0"/>
+              <a:t>Model-Driven Development</a:t>
+            </a:r>
+          </a:p>
+        </p:txBody>
+      </p:sp>
+      <p:sp>
+        <p:nvSpPr>
+          <p:cNvPr id="4" name="Footer Placeholder 3"/>
+          <p:cNvSpPr>
+            <a:spLocks noGrp="1"/>
+          </p:cNvSpPr>
+          <p:nvPr>
+            <p:ph type="ftr" sz="quarter" idx="11"/>
+          </p:nvPr>
+        </p:nvSpPr>
+        <p:spPr/>
+        <p:txBody>
+          <a:bodyPr/>
+          <a:lstStyle/>
+          <a:p>
+            <a:r>
+              <a:rPr lang="pl-PL" smtClean="0"/>
+              <a:t>www.rec-global.com</a:t>
+            </a:r>
+            <a:endParaRPr lang="pl-PL" dirty="0">
+              <a:solidFill>
+                <a:schemeClr val="tx1"/>
+              </a:solidFill>
+            </a:endParaRPr>
+          </a:p>
+        </p:txBody>
+      </p:sp>
+      <p:sp>
+        <p:nvSpPr>
+          <p:cNvPr id="5" name="Slide Number Placeholder 4"/>
+          <p:cNvSpPr>
+            <a:spLocks noGrp="1"/>
+          </p:cNvSpPr>
+          <p:nvPr>
+            <p:ph type="sldNum" sz="quarter" idx="12"/>
+          </p:nvPr>
+        </p:nvSpPr>
+        <p:spPr/>
+        <p:txBody>
+          <a:bodyPr/>
+          <a:lstStyle/>
+          <a:p>
+            <a:pPr algn="ctr"/>
+            <a:fld id="{49FFD7C8-786B-42CE-8D79-AFCFE16DD4F2}" type="slidenum">
+              <a:rPr lang="pl-PL" smtClean="0"/>
+              <a:pPr algn="ctr"/>
+              <a:t>4</a:t>
+            </a:fld>
+            <a:endParaRPr lang="pl-PL" dirty="0"/>
+          </a:p>
+        </p:txBody>
+      </p:sp>
+      <p:sp>
+        <p:nvSpPr>
+          <p:cNvPr id="6" name="Date Placeholder 5"/>
+          <p:cNvSpPr>
+            <a:spLocks noGrp="1"/>
+          </p:cNvSpPr>
+          <p:nvPr>
+            <p:ph type="dt" sz="half" idx="10"/>
+          </p:nvPr>
+        </p:nvSpPr>
+        <p:spPr/>
+        <p:txBody>
+          <a:bodyPr/>
+          <a:lstStyle/>
+          <a:p>
+            <a:fld id="{A1C14688-799C-45A6-846F-47D660935463}" type="datetime1">
+              <a:rPr lang="pl-PL" smtClean="0"/>
+              <a:pPr/>
+              <a:t>2015-09-17</a:t>
+            </a:fld>
+            <a:endParaRPr lang="pl-PL" dirty="0"/>
+          </a:p>
+        </p:txBody>
+      </p:sp>
+      <p:pic>
+        <p:nvPicPr>
+          <p:cNvPr id="8" name="Picture 7"/>
+          <p:cNvPicPr>
+            <a:picLocks noChangeAspect="1"/>
+          </p:cNvPicPr>
+          <p:nvPr/>
+        </p:nvPicPr>
+        <p:blipFill>
+          <a:blip r:embed="rId2"/>
+          <a:stretch>
+            <a:fillRect/>
+          </a:stretch>
+        </p:blipFill>
+        <p:spPr>
+          <a:xfrm>
+            <a:off x="519829" y="1142999"/>
+            <a:ext cx="8401050" cy="4191000"/>
+          </a:xfrm>
+          <a:prstGeom prst="rect">
+            <a:avLst/>
+          </a:prstGeom>
+        </p:spPr>
+      </p:pic>
+    </p:spTree>
+    <p:extLst>
+      <p:ext uri="{BB962C8B-B14F-4D97-AF65-F5344CB8AC3E}">
+        <p14:creationId xmlns:p14="http://schemas.microsoft.com/office/powerpoint/2010/main" val="3659081677"/>
+      </p:ext>
+    </p:extLst>
+  </p:cSld>
+  <p:clrMapOvr>
+    <a:masterClrMapping/>
+  </p:clrMapOvr>
+  <p:timing>
+    <p:tnLst>
+      <p:par>
+        <p:cTn id="1" dur="indefinite" restart="never" nodeType="tmRoot"/>
+      </p:par>
+    </p:tnLst>
+  </p:timing>
+</p:sld>
+</file>
+
+<file path=ppt/slides/slide5.xml><?xml version="1.0" encoding="utf-8"?>
+<p:sld xmlns:a="http://schemas.openxmlformats.org/drawingml/2006/main" xmlns:r="http://schemas.openxmlformats.org/officeDocument/2006/relationships" xmlns:p="http://schemas.openxmlformats.org/presentationml/2006/main">
+  <p:cSld>
+    <p:spTree>
+      <p:nvGrpSpPr>
+        <p:cNvPr id="1" name=""/>
+        <p:cNvGrpSpPr/>
+        <p:nvPr/>
+      </p:nvGrpSpPr>
+      <p:grpSpPr>
+        <a:xfrm>
+          <a:off x="0" y="0"/>
+          <a:ext cx="0" cy="0"/>
+          <a:chOff x="0" y="0"/>
+          <a:chExt cx="0" cy="0"/>
+        </a:xfrm>
+      </p:grpSpPr>
+      <p:sp>
+        <p:nvSpPr>
+          <p:cNvPr id="2" name="Title 1"/>
+          <p:cNvSpPr>
+            <a:spLocks noGrp="1"/>
+          </p:cNvSpPr>
+          <p:nvPr>
+            <p:ph type="title"/>
+          </p:nvPr>
+        </p:nvSpPr>
+        <p:spPr/>
+        <p:txBody>
+          <a:bodyPr>
+            <a:normAutofit/>
+          </a:bodyPr>
+          <a:lstStyle/>
+          <a:p>
+            <a:pPr lvl="0">
+              <a:lnSpc>
+                <a:spcPct val="150000"/>
+              </a:lnSpc>
+            </a:pPr>
+            <a:r>
+              <a:rPr lang="pl-PL" dirty="0"/>
+              <a:t>Model-Driven Development</a:t>
+            </a:r>
+          </a:p>
+        </p:txBody>
+      </p:sp>
+      <p:sp>
+        <p:nvSpPr>
+          <p:cNvPr id="3" name="Text Placeholder 2"/>
+          <p:cNvSpPr>
+            <a:spLocks noGrp="1"/>
+          </p:cNvSpPr>
+          <p:nvPr>
+            <p:ph type="body" sz="quarter" idx="13"/>
+          </p:nvPr>
+        </p:nvSpPr>
+        <p:spPr/>
+        <p:txBody>
+          <a:bodyPr>
+            <a:normAutofit/>
+          </a:bodyPr>
+          <a:lstStyle/>
+          <a:p>
+            <a:r>
+              <a:rPr lang="pl-PL" sz="2200" dirty="0" smtClean="0"/>
+              <a:t>Clear visibility</a:t>
+            </a:r>
+          </a:p>
+          <a:p>
+            <a:r>
+              <a:rPr lang="pl-PL" sz="2200" dirty="0"/>
+              <a:t>Flexibility(models can be adjusted</a:t>
+            </a:r>
+            <a:r>
+              <a:rPr lang="pl-PL" sz="2200" dirty="0" smtClean="0"/>
+              <a:t>)</a:t>
+            </a:r>
+          </a:p>
+          <a:p>
+            <a:r>
+              <a:rPr lang="pl-PL" sz="2200" dirty="0" smtClean="0"/>
+              <a:t>Fast </a:t>
+            </a:r>
+            <a:r>
+              <a:rPr lang="pl-PL" sz="2200" dirty="0"/>
+              <a:t>&amp; cost-effective</a:t>
+            </a:r>
+            <a:endParaRPr lang="pl-PL" sz="2200" dirty="0" smtClean="0"/>
+          </a:p>
+          <a:p>
+            <a:r>
+              <a:rPr lang="pl-PL" sz="2200" dirty="0" smtClean="0"/>
+              <a:t>Leads </a:t>
+            </a:r>
+            <a:r>
+              <a:rPr lang="pl-PL" sz="2200" dirty="0"/>
+              <a:t>to increased </a:t>
+            </a:r>
+            <a:r>
+              <a:rPr lang="pl-PL" sz="2200" dirty="0" smtClean="0"/>
+              <a:t>quality</a:t>
+            </a:r>
+          </a:p>
+          <a:p>
+            <a:r>
+              <a:rPr lang="pl-PL" sz="2200" dirty="0" smtClean="0"/>
+              <a:t>Enforces architecture</a:t>
+            </a:r>
+          </a:p>
+          <a:p>
+            <a:r>
+              <a:rPr lang="pl-PL" sz="2200" dirty="0" smtClean="0"/>
+              <a:t>L</a:t>
+            </a:r>
+            <a:r>
+              <a:rPr lang="en-US" sz="2200" dirty="0" smtClean="0"/>
+              <a:t>et</a:t>
+            </a:r>
+            <a:r>
+              <a:rPr lang="pl-PL" sz="2200" dirty="0" smtClean="0"/>
+              <a:t>’</a:t>
+            </a:r>
+            <a:r>
+              <a:rPr lang="en-US" sz="2200" dirty="0" smtClean="0"/>
+              <a:t>s programmers </a:t>
+            </a:r>
+            <a:r>
+              <a:rPr lang="en-US" sz="2200" dirty="0"/>
+              <a:t>focus on the hard </a:t>
+            </a:r>
+            <a:r>
+              <a:rPr lang="en-US" sz="2200" dirty="0" smtClean="0"/>
+              <a:t>stuff</a:t>
+            </a:r>
+            <a:endParaRPr lang="pl-PL" sz="2200" dirty="0" smtClean="0"/>
+          </a:p>
+        </p:txBody>
+      </p:sp>
+      <p:sp>
+        <p:nvSpPr>
+          <p:cNvPr id="4" name="Footer Placeholder 3"/>
+          <p:cNvSpPr>
+            <a:spLocks noGrp="1"/>
+          </p:cNvSpPr>
+          <p:nvPr>
+            <p:ph type="ftr" sz="quarter" idx="11"/>
+          </p:nvPr>
+        </p:nvSpPr>
+        <p:spPr/>
+        <p:txBody>
+          <a:bodyPr/>
+          <a:lstStyle/>
+          <a:p>
+            <a:r>
+              <a:rPr lang="pl-PL" smtClean="0"/>
+              <a:t>www.rec-global.com</a:t>
+            </a:r>
+            <a:endParaRPr lang="pl-PL" dirty="0">
+              <a:solidFill>
+                <a:schemeClr val="tx1"/>
+              </a:solidFill>
+            </a:endParaRPr>
+          </a:p>
+        </p:txBody>
+      </p:sp>
+      <p:sp>
+        <p:nvSpPr>
+          <p:cNvPr id="5" name="Slide Number Placeholder 4"/>
+          <p:cNvSpPr>
+            <a:spLocks noGrp="1"/>
+          </p:cNvSpPr>
+          <p:nvPr>
+            <p:ph type="sldNum" sz="quarter" idx="12"/>
+          </p:nvPr>
+        </p:nvSpPr>
+        <p:spPr/>
+        <p:txBody>
+          <a:bodyPr/>
+          <a:lstStyle/>
+          <a:p>
+            <a:pPr algn="ctr"/>
+            <a:fld id="{49FFD7C8-786B-42CE-8D79-AFCFE16DD4F2}" type="slidenum">
+              <a:rPr lang="pl-PL" smtClean="0"/>
+              <a:pPr algn="ctr"/>
+              <a:t>5</a:t>
+            </a:fld>
+            <a:endParaRPr lang="pl-PL" dirty="0"/>
+          </a:p>
+        </p:txBody>
+      </p:sp>
+      <p:sp>
+        <p:nvSpPr>
+          <p:cNvPr id="6" name="Date Placeholder 5"/>
+          <p:cNvSpPr>
+            <a:spLocks noGrp="1"/>
+          </p:cNvSpPr>
+          <p:nvPr>
+            <p:ph type="dt" sz="half" idx="10"/>
+          </p:nvPr>
+        </p:nvSpPr>
+        <p:spPr/>
+        <p:txBody>
+          <a:bodyPr/>
+          <a:lstStyle/>
+          <a:p>
+            <a:fld id="{A1C14688-799C-45A6-846F-47D660935463}" type="datetime1">
+              <a:rPr lang="pl-PL" smtClean="0"/>
+              <a:pPr/>
+              <a:t>2015-09-17</a:t>
             </a:fld>
             <a:endParaRPr lang="pl-PL" dirty="0"/>
           </a:p>
@@ -9031,7 +10417,7 @@
 </p:sld>
 </file>
 
-<file path=ppt/slides/slide4.xml><?xml version="1.0" encoding="utf-8"?>
+<file path=ppt/slides/slide6.xml><?xml version="1.0" encoding="utf-8"?>
 <p:sld xmlns:a="http://schemas.openxmlformats.org/drawingml/2006/main" xmlns:r="http://schemas.openxmlformats.org/officeDocument/2006/relationships" xmlns:p="http://schemas.openxmlformats.org/presentationml/2006/main">
   <p:cSld>
     <p:spTree>
@@ -9195,7 +10581,7 @@
             <a:fld id="{49FFD7C8-786B-42CE-8D79-AFCFE16DD4F2}" type="slidenum">
               <a:rPr lang="pl-PL" smtClean="0"/>
               <a:pPr algn="ctr"/>
-              <a:t>4</a:t>
+              <a:t>6</a:t>
             </a:fld>
             <a:endParaRPr lang="pl-PL" dirty="0"/>
           </a:p>
@@ -9219,7 +10605,7 @@
             <a:fld id="{A1C14688-799C-45A6-846F-47D660935463}" type="datetime1">
               <a:rPr lang="pl-PL" smtClean="0"/>
               <a:pPr/>
-              <a:t>2015-09-16</a:t>
+              <a:t>2015-09-17</a:t>
             </a:fld>
             <a:endParaRPr lang="pl-PL" dirty="0"/>
           </a:p>
@@ -9418,7 +10804,7 @@
 </p:sld>
 </file>
 
-<file path=ppt/slides/slide5.xml><?xml version="1.0" encoding="utf-8"?>
+<file path=ppt/slides/slide7.xml><?xml version="1.0" encoding="utf-8"?>
 <p:sld xmlns:a="http://schemas.openxmlformats.org/drawingml/2006/main" xmlns:r="http://schemas.openxmlformats.org/officeDocument/2006/relationships" xmlns:p="http://schemas.openxmlformats.org/presentationml/2006/main">
   <p:cSld>
     <p:spTree>
@@ -9668,7 +11054,7 @@
             <a:fld id="{49FFD7C8-786B-42CE-8D79-AFCFE16DD4F2}" type="slidenum">
               <a:rPr lang="pl-PL" smtClean="0"/>
               <a:pPr algn="ctr"/>
-              <a:t>5</a:t>
+              <a:t>7</a:t>
             </a:fld>
             <a:endParaRPr lang="pl-PL" dirty="0"/>
           </a:p>
@@ -9692,7 +11078,7 @@
             <a:fld id="{A1C14688-799C-45A6-846F-47D660935463}" type="datetime1">
               <a:rPr lang="pl-PL" smtClean="0"/>
               <a:pPr/>
-              <a:t>2015-09-16</a:t>
+              <a:t>2015-09-17</a:t>
             </a:fld>
             <a:endParaRPr lang="pl-PL" dirty="0"/>
           </a:p>
@@ -10141,7 +11527,7 @@
 </p:sld>
 </file>
 
-<file path=ppt/slides/slide6.xml><?xml version="1.0" encoding="utf-8"?>
+<file path=ppt/slides/slide8.xml><?xml version="1.0" encoding="utf-8"?>
 <p:sld xmlns:a="http://schemas.openxmlformats.org/drawingml/2006/main" xmlns:r="http://schemas.openxmlformats.org/officeDocument/2006/relationships" xmlns:p="http://schemas.openxmlformats.org/presentationml/2006/main">
   <p:cSld>
     <p:spTree>
@@ -10283,7 +11669,7 @@
             <a:fld id="{49FFD7C8-786B-42CE-8D79-AFCFE16DD4F2}" type="slidenum">
               <a:rPr lang="pl-PL" smtClean="0"/>
               <a:pPr algn="ctr"/>
-              <a:t>6</a:t>
+              <a:t>8</a:t>
             </a:fld>
             <a:endParaRPr lang="pl-PL" dirty="0"/>
           </a:p>
@@ -10307,7 +11693,7 @@
             <a:fld id="{A1C14688-799C-45A6-846F-47D660935463}" type="datetime1">
               <a:rPr lang="pl-PL" smtClean="0"/>
               <a:pPr/>
-              <a:t>2015-09-16</a:t>
+              <a:t>2015-09-17</a:t>
             </a:fld>
             <a:endParaRPr lang="pl-PL" dirty="0"/>
           </a:p>
@@ -10539,733 +11925,6 @@
 </p:sld>
 </file>
 
-<file path=ppt/slides/slide7.xml><?xml version="1.0" encoding="utf-8"?>
-<p:sld xmlns:a="http://schemas.openxmlformats.org/drawingml/2006/main" xmlns:r="http://schemas.openxmlformats.org/officeDocument/2006/relationships" xmlns:p="http://schemas.openxmlformats.org/presentationml/2006/main">
-  <p:cSld>
-    <p:spTree>
-      <p:nvGrpSpPr>
-        <p:cNvPr id="1" name=""/>
-        <p:cNvGrpSpPr/>
-        <p:nvPr/>
-      </p:nvGrpSpPr>
-      <p:grpSpPr>
-        <a:xfrm>
-          <a:off x="0" y="0"/>
-          <a:ext cx="0" cy="0"/>
-          <a:chOff x="0" y="0"/>
-          <a:chExt cx="0" cy="0"/>
-        </a:xfrm>
-      </p:grpSpPr>
-      <p:sp>
-        <p:nvSpPr>
-          <p:cNvPr id="2" name="Title 1"/>
-          <p:cNvSpPr>
-            <a:spLocks noGrp="1"/>
-          </p:cNvSpPr>
-          <p:nvPr>
-            <p:ph type="title"/>
-          </p:nvPr>
-        </p:nvSpPr>
-        <p:spPr/>
-        <p:txBody>
-          <a:bodyPr/>
-          <a:lstStyle/>
-          <a:p>
-            <a:r>
-              <a:rPr lang="pl-PL" dirty="0" smtClean="0"/>
-              <a:t>EMF – ecore &amp; genmodel</a:t>
-            </a:r>
-            <a:endParaRPr lang="pl-PL" dirty="0"/>
-          </a:p>
-        </p:txBody>
-      </p:sp>
-      <p:sp>
-        <p:nvSpPr>
-          <p:cNvPr id="3" name="Text Placeholder 2"/>
-          <p:cNvSpPr>
-            <a:spLocks noGrp="1"/>
-          </p:cNvSpPr>
-          <p:nvPr>
-            <p:ph type="body" sz="quarter" idx="13"/>
-          </p:nvPr>
-        </p:nvSpPr>
-        <p:spPr/>
-        <p:txBody>
-          <a:bodyPr/>
-          <a:lstStyle/>
-          <a:p>
-            <a:r>
-              <a:rPr lang="pl-PL" sz="2200" dirty="0" smtClean="0"/>
-              <a:t>Two files:</a:t>
-            </a:r>
-          </a:p>
-          <a:p>
-            <a:pPr lvl="1"/>
-            <a:r>
-              <a:rPr lang="en-US" sz="2200" b="1" dirty="0" err="1" smtClean="0"/>
-              <a:t>ecore</a:t>
-            </a:r>
-            <a:r>
-              <a:rPr lang="en-US" sz="2200" dirty="0" smtClean="0"/>
-              <a:t> </a:t>
-            </a:r>
-            <a:r>
-              <a:rPr lang="pl-PL" sz="2200" dirty="0" smtClean="0"/>
-              <a:t>- </a:t>
-            </a:r>
-            <a:r>
-              <a:rPr lang="en-US" sz="2200" dirty="0" smtClean="0"/>
-              <a:t>contains </a:t>
-            </a:r>
-            <a:r>
-              <a:rPr lang="en-US" sz="2200" dirty="0"/>
-              <a:t>the information about the defined </a:t>
-            </a:r>
-            <a:r>
-              <a:rPr lang="en-US" sz="2200" dirty="0" smtClean="0"/>
-              <a:t>classes</a:t>
-            </a:r>
-            <a:endParaRPr lang="pl-PL" sz="2200" dirty="0" smtClean="0"/>
-          </a:p>
-          <a:p>
-            <a:pPr lvl="1"/>
-            <a:r>
-              <a:rPr lang="pl-PL" sz="2200" b="1" dirty="0" smtClean="0"/>
-              <a:t>genmodel</a:t>
-            </a:r>
-            <a:r>
-              <a:rPr lang="pl-PL" sz="2200" dirty="0" smtClean="0"/>
-              <a:t> - </a:t>
-            </a:r>
-            <a:r>
-              <a:rPr lang="en-US" sz="2200" dirty="0"/>
-              <a:t>contains </a:t>
-            </a:r>
-            <a:r>
-              <a:rPr lang="en-US" sz="2200" dirty="0" smtClean="0"/>
-              <a:t>information </a:t>
-            </a:r>
-            <a:r>
-              <a:rPr lang="en-US" sz="2200" dirty="0"/>
-              <a:t>for the code generation</a:t>
-            </a:r>
-            <a:endParaRPr lang="pl-PL" sz="2200" dirty="0" smtClean="0"/>
-          </a:p>
-          <a:p>
-            <a:pPr marL="0" indent="0">
-              <a:buNone/>
-            </a:pPr>
-            <a:endParaRPr lang="pl-PL" dirty="0" smtClean="0"/>
-          </a:p>
-        </p:txBody>
-      </p:sp>
-      <p:sp>
-        <p:nvSpPr>
-          <p:cNvPr id="4" name="Footer Placeholder 3"/>
-          <p:cNvSpPr>
-            <a:spLocks noGrp="1"/>
-          </p:cNvSpPr>
-          <p:nvPr>
-            <p:ph type="ftr" sz="quarter" idx="11"/>
-          </p:nvPr>
-        </p:nvSpPr>
-        <p:spPr/>
-        <p:txBody>
-          <a:bodyPr/>
-          <a:lstStyle/>
-          <a:p>
-            <a:r>
-              <a:rPr lang="pl-PL" smtClean="0"/>
-              <a:t>www.rec-global.com</a:t>
-            </a:r>
-            <a:endParaRPr lang="pl-PL" dirty="0">
-              <a:solidFill>
-                <a:schemeClr val="tx1"/>
-              </a:solidFill>
-            </a:endParaRPr>
-          </a:p>
-        </p:txBody>
-      </p:sp>
-      <p:sp>
-        <p:nvSpPr>
-          <p:cNvPr id="5" name="Slide Number Placeholder 4"/>
-          <p:cNvSpPr>
-            <a:spLocks noGrp="1"/>
-          </p:cNvSpPr>
-          <p:nvPr>
-            <p:ph type="sldNum" sz="quarter" idx="12"/>
-          </p:nvPr>
-        </p:nvSpPr>
-        <p:spPr/>
-        <p:txBody>
-          <a:bodyPr/>
-          <a:lstStyle/>
-          <a:p>
-            <a:pPr algn="ctr"/>
-            <a:fld id="{49FFD7C8-786B-42CE-8D79-AFCFE16DD4F2}" type="slidenum">
-              <a:rPr lang="pl-PL" smtClean="0"/>
-              <a:pPr algn="ctr"/>
-              <a:t>7</a:t>
-            </a:fld>
-            <a:endParaRPr lang="pl-PL" dirty="0"/>
-          </a:p>
-        </p:txBody>
-      </p:sp>
-      <p:sp>
-        <p:nvSpPr>
-          <p:cNvPr id="6" name="Date Placeholder 5"/>
-          <p:cNvSpPr>
-            <a:spLocks noGrp="1"/>
-          </p:cNvSpPr>
-          <p:nvPr>
-            <p:ph type="dt" sz="half" idx="10"/>
-          </p:nvPr>
-        </p:nvSpPr>
-        <p:spPr/>
-        <p:txBody>
-          <a:bodyPr/>
-          <a:lstStyle/>
-          <a:p>
-            <a:fld id="{A1C14688-799C-45A6-846F-47D660935463}" type="datetime1">
-              <a:rPr lang="pl-PL" smtClean="0"/>
-              <a:pPr/>
-              <a:t>2015-09-16</a:t>
-            </a:fld>
-            <a:endParaRPr lang="pl-PL" dirty="0"/>
-          </a:p>
-        </p:txBody>
-      </p:sp>
-    </p:spTree>
-    <p:extLst>
-      <p:ext uri="{BB962C8B-B14F-4D97-AF65-F5344CB8AC3E}">
-        <p14:creationId xmlns:p14="http://schemas.microsoft.com/office/powerpoint/2010/main" val="1695547840"/>
-      </p:ext>
-    </p:extLst>
-  </p:cSld>
-  <p:clrMapOvr>
-    <a:masterClrMapping/>
-  </p:clrMapOvr>
-  <p:timing>
-    <p:tnLst>
-      <p:par>
-        <p:cTn id="1" dur="indefinite" restart="never" nodeType="tmRoot"/>
-      </p:par>
-    </p:tnLst>
-  </p:timing>
-</p:sld>
-</file>
-
-<file path=ppt/slides/slide8.xml><?xml version="1.0" encoding="utf-8"?>
-<p:sld xmlns:a="http://schemas.openxmlformats.org/drawingml/2006/main" xmlns:r="http://schemas.openxmlformats.org/officeDocument/2006/relationships" xmlns:p="http://schemas.openxmlformats.org/presentationml/2006/main">
-  <p:cSld>
-    <p:spTree>
-      <p:nvGrpSpPr>
-        <p:cNvPr id="1" name=""/>
-        <p:cNvGrpSpPr/>
-        <p:nvPr/>
-      </p:nvGrpSpPr>
-      <p:grpSpPr>
-        <a:xfrm>
-          <a:off x="0" y="0"/>
-          <a:ext cx="0" cy="0"/>
-          <a:chOff x="0" y="0"/>
-          <a:chExt cx="0" cy="0"/>
-        </a:xfrm>
-      </p:grpSpPr>
-      <p:sp>
-        <p:nvSpPr>
-          <p:cNvPr id="2" name="Title 1"/>
-          <p:cNvSpPr>
-            <a:spLocks noGrp="1"/>
-          </p:cNvSpPr>
-          <p:nvPr>
-            <p:ph type="title"/>
-          </p:nvPr>
-        </p:nvSpPr>
-        <p:spPr/>
-        <p:txBody>
-          <a:bodyPr/>
-          <a:lstStyle/>
-          <a:p>
-            <a:r>
-              <a:rPr lang="pl-PL" dirty="0" smtClean="0"/>
-              <a:t>Object vs EObject</a:t>
-            </a:r>
-            <a:endParaRPr lang="pl-PL" dirty="0"/>
-          </a:p>
-        </p:txBody>
-      </p:sp>
-      <p:sp>
-        <p:nvSpPr>
-          <p:cNvPr id="3" name="Text Placeholder 2"/>
-          <p:cNvSpPr>
-            <a:spLocks noGrp="1"/>
-          </p:cNvSpPr>
-          <p:nvPr>
-            <p:ph type="body" sz="quarter" idx="13"/>
-          </p:nvPr>
-        </p:nvSpPr>
-        <p:spPr/>
-        <p:txBody>
-          <a:bodyPr/>
-          <a:lstStyle/>
-          <a:p>
-            <a:r>
-              <a:rPr lang="en-US" sz="2200" dirty="0" err="1"/>
-              <a:t>EObject</a:t>
-            </a:r>
-            <a:r>
-              <a:rPr lang="en-US" sz="2200" dirty="0"/>
-              <a:t> is the root of all modeled </a:t>
-            </a:r>
-            <a:r>
-              <a:rPr lang="en-US" sz="2200" dirty="0" smtClean="0"/>
-              <a:t>objects</a:t>
-            </a:r>
-            <a:endParaRPr lang="pl-PL" sz="2200" dirty="0" smtClean="0"/>
-          </a:p>
-          <a:p>
-            <a:r>
-              <a:rPr lang="en-US" sz="2200" dirty="0"/>
-              <a:t>It provides support for the behaviors and features common to all modeled objects: </a:t>
-            </a:r>
-            <a:endParaRPr lang="pl-PL" sz="2200" dirty="0" smtClean="0"/>
-          </a:p>
-          <a:p>
-            <a:pPr marL="0" indent="0">
-              <a:buNone/>
-            </a:pPr>
-            <a:endParaRPr lang="pl-PL" dirty="0" smtClean="0"/>
-          </a:p>
-        </p:txBody>
-      </p:sp>
-      <p:sp>
-        <p:nvSpPr>
-          <p:cNvPr id="4" name="Footer Placeholder 3"/>
-          <p:cNvSpPr>
-            <a:spLocks noGrp="1"/>
-          </p:cNvSpPr>
-          <p:nvPr>
-            <p:ph type="ftr" sz="quarter" idx="11"/>
-          </p:nvPr>
-        </p:nvSpPr>
-        <p:spPr/>
-        <p:txBody>
-          <a:bodyPr/>
-          <a:lstStyle/>
-          <a:p>
-            <a:r>
-              <a:rPr lang="pl-PL" smtClean="0"/>
-              <a:t>www.rec-global.com</a:t>
-            </a:r>
-            <a:endParaRPr lang="pl-PL" dirty="0">
-              <a:solidFill>
-                <a:schemeClr val="tx1"/>
-              </a:solidFill>
-            </a:endParaRPr>
-          </a:p>
-        </p:txBody>
-      </p:sp>
-      <p:sp>
-        <p:nvSpPr>
-          <p:cNvPr id="5" name="Slide Number Placeholder 4"/>
-          <p:cNvSpPr>
-            <a:spLocks noGrp="1"/>
-          </p:cNvSpPr>
-          <p:nvPr>
-            <p:ph type="sldNum" sz="quarter" idx="12"/>
-          </p:nvPr>
-        </p:nvSpPr>
-        <p:spPr/>
-        <p:txBody>
-          <a:bodyPr/>
-          <a:lstStyle/>
-          <a:p>
-            <a:pPr algn="ctr"/>
-            <a:fld id="{49FFD7C8-786B-42CE-8D79-AFCFE16DD4F2}" type="slidenum">
-              <a:rPr lang="pl-PL" smtClean="0"/>
-              <a:pPr algn="ctr"/>
-              <a:t>8</a:t>
-            </a:fld>
-            <a:endParaRPr lang="pl-PL" dirty="0"/>
-          </a:p>
-        </p:txBody>
-      </p:sp>
-      <p:sp>
-        <p:nvSpPr>
-          <p:cNvPr id="6" name="Date Placeholder 5"/>
-          <p:cNvSpPr>
-            <a:spLocks noGrp="1"/>
-          </p:cNvSpPr>
-          <p:nvPr>
-            <p:ph type="dt" sz="half" idx="10"/>
-          </p:nvPr>
-        </p:nvSpPr>
-        <p:spPr/>
-        <p:txBody>
-          <a:bodyPr/>
-          <a:lstStyle/>
-          <a:p>
-            <a:fld id="{A1C14688-799C-45A6-846F-47D660935463}" type="datetime1">
-              <a:rPr lang="pl-PL" smtClean="0"/>
-              <a:pPr/>
-              <a:t>2015-09-16</a:t>
-            </a:fld>
-            <a:endParaRPr lang="pl-PL" dirty="0"/>
-          </a:p>
-        </p:txBody>
-      </p:sp>
-      <p:graphicFrame>
-        <p:nvGraphicFramePr>
-          <p:cNvPr id="7" name="Table 6"/>
-          <p:cNvGraphicFramePr>
-            <a:graphicFrameLocks noGrp="1"/>
-          </p:cNvGraphicFramePr>
-          <p:nvPr>
-            <p:extLst>
-              <p:ext uri="{D42A27DB-BD31-4B8C-83A1-F6EECF244321}">
-                <p14:modId xmlns:p14="http://schemas.microsoft.com/office/powerpoint/2010/main" val="3357031139"/>
-              </p:ext>
-            </p:extLst>
-          </p:nvPr>
-        </p:nvGraphicFramePr>
-        <p:xfrm>
-          <a:off x="1339117" y="2855963"/>
-          <a:ext cx="8403692" cy="2047810"/>
-        </p:xfrm>
-        <a:graphic>
-          <a:graphicData uri="http://schemas.openxmlformats.org/drawingml/2006/table">
-            <a:tbl>
-              <a:tblPr firstRow="1" bandRow="1">
-                <a:tableStyleId>{073A0DAA-6AF3-43AB-8588-CEC1D06C72B9}</a:tableStyleId>
-              </a:tblPr>
-              <a:tblGrid>
-                <a:gridCol w="4201846"/>
-                <a:gridCol w="4201846"/>
-              </a:tblGrid>
-              <a:tr h="486939">
-                <a:tc>
-                  <a:txBody>
-                    <a:bodyPr/>
-                    <a:lstStyle/>
-                    <a:p>
-                      <a:pPr algn="ctr"/>
-                      <a:r>
-                        <a:rPr lang="pl-PL" sz="2400" dirty="0" smtClean="0"/>
-                        <a:t>Reflection</a:t>
-                      </a:r>
-                      <a:endParaRPr lang="pl-PL" sz="2400" dirty="0"/>
-                    </a:p>
-                  </a:txBody>
-                  <a:tcPr/>
-                </a:tc>
-                <a:tc>
-                  <a:txBody>
-                    <a:bodyPr/>
-                    <a:lstStyle/>
-                    <a:p>
-                      <a:pPr algn="ctr"/>
-                      <a:r>
-                        <a:rPr lang="pl-PL" sz="2400" dirty="0" smtClean="0"/>
-                        <a:t>Content</a:t>
-                      </a:r>
-                      <a:endParaRPr lang="pl-PL" sz="2400" dirty="0"/>
-                    </a:p>
-                  </a:txBody>
-                  <a:tcPr/>
-                </a:tc>
-              </a:tr>
-              <a:tr h="1560871">
-                <a:tc>
-                  <a:txBody>
-                    <a:bodyPr/>
-                    <a:lstStyle/>
-                    <a:p>
-                      <a:pPr marL="285750" indent="-285750">
-                        <a:buFont typeface="Arial" panose="020B0604020202020204" pitchFamily="34" charset="0"/>
-                        <a:buChar char="•"/>
-                      </a:pPr>
-                      <a:r>
-                        <a:rPr lang="pl-PL" sz="2200" dirty="0" smtClean="0"/>
-                        <a:t>eClass</a:t>
-                      </a:r>
-                    </a:p>
-                    <a:p>
-                      <a:pPr marL="285750" indent="-285750">
-                        <a:buFont typeface="Arial" panose="020B0604020202020204" pitchFamily="34" charset="0"/>
-                        <a:buChar char="•"/>
-                      </a:pPr>
-                      <a:r>
-                        <a:rPr lang="pl-PL" sz="2200" dirty="0" smtClean="0"/>
-                        <a:t>eGet</a:t>
-                      </a:r>
-                    </a:p>
-                    <a:p>
-                      <a:pPr marL="285750" indent="-285750">
-                        <a:buFont typeface="Arial" panose="020B0604020202020204" pitchFamily="34" charset="0"/>
-                        <a:buChar char="•"/>
-                      </a:pPr>
-                      <a:r>
-                        <a:rPr lang="pl-PL" sz="2200" dirty="0" smtClean="0"/>
-                        <a:t>eSet</a:t>
-                      </a:r>
-                    </a:p>
-                    <a:p>
-                      <a:pPr marL="285750" indent="-285750">
-                        <a:buFont typeface="Arial" panose="020B0604020202020204" pitchFamily="34" charset="0"/>
-                        <a:buChar char="•"/>
-                      </a:pPr>
-                      <a:r>
-                        <a:rPr lang="pl-PL" sz="2200" dirty="0" smtClean="0"/>
-                        <a:t>...</a:t>
-                      </a:r>
-                      <a:endParaRPr lang="pl-PL" sz="2200" dirty="0"/>
-                    </a:p>
-                  </a:txBody>
-                  <a:tcPr/>
-                </a:tc>
-                <a:tc>
-                  <a:txBody>
-                    <a:bodyPr/>
-                    <a:lstStyle/>
-                    <a:p>
-                      <a:pPr marL="285750" indent="-285750">
-                        <a:buFont typeface="Arial" panose="020B0604020202020204" pitchFamily="34" charset="0"/>
-                        <a:buChar char="•"/>
-                      </a:pPr>
-                      <a:r>
-                        <a:rPr lang="pl-PL" sz="2200" dirty="0" smtClean="0"/>
-                        <a:t>eResource</a:t>
-                      </a:r>
-                    </a:p>
-                    <a:p>
-                      <a:pPr marL="285750" indent="-285750">
-                        <a:buFont typeface="Arial" panose="020B0604020202020204" pitchFamily="34" charset="0"/>
-                        <a:buChar char="•"/>
-                      </a:pPr>
-                      <a:r>
-                        <a:rPr lang="pl-PL" sz="2200" dirty="0" smtClean="0"/>
-                        <a:t>eContainer</a:t>
-                      </a:r>
-                    </a:p>
-                    <a:p>
-                      <a:pPr marL="285750" indent="-285750">
-                        <a:buFont typeface="Arial" panose="020B0604020202020204" pitchFamily="34" charset="0"/>
-                        <a:buChar char="•"/>
-                      </a:pPr>
-                      <a:r>
-                        <a:rPr lang="pl-PL" sz="2200" dirty="0" smtClean="0"/>
-                        <a:t>eContents</a:t>
-                      </a:r>
-                    </a:p>
-                    <a:p>
-                      <a:pPr marL="285750" indent="-285750">
-                        <a:buFont typeface="Arial" panose="020B0604020202020204" pitchFamily="34" charset="0"/>
-                        <a:buChar char="•"/>
-                      </a:pPr>
-                      <a:r>
-                        <a:rPr lang="pl-PL" sz="2200" dirty="0" smtClean="0"/>
-                        <a:t>...</a:t>
-                      </a:r>
-                      <a:endParaRPr lang="pl-PL" sz="2200" dirty="0"/>
-                    </a:p>
-                  </a:txBody>
-                  <a:tcPr/>
-                </a:tc>
-              </a:tr>
-            </a:tbl>
-          </a:graphicData>
-        </a:graphic>
-      </p:graphicFrame>
-    </p:spTree>
-    <p:extLst>
-      <p:ext uri="{BB962C8B-B14F-4D97-AF65-F5344CB8AC3E}">
-        <p14:creationId xmlns:p14="http://schemas.microsoft.com/office/powerpoint/2010/main" val="803711769"/>
-      </p:ext>
-    </p:extLst>
-  </p:cSld>
-  <p:clrMapOvr>
-    <a:masterClrMapping/>
-  </p:clrMapOvr>
-  <p:timing>
-    <p:tnLst>
-      <p:par>
-        <p:cTn id="1" dur="indefinite" restart="never" nodeType="tmRoot">
-          <p:childTnLst>
-            <p:seq concurrent="1" nextAc="seek">
-              <p:cTn id="2" dur="indefinite" nodeType="mainSeq">
-                <p:childTnLst>
-                  <p:par>
-                    <p:cTn id="3" fill="hold">
-                      <p:stCondLst>
-                        <p:cond delay="indefinite"/>
-                      </p:stCondLst>
-                      <p:childTnLst>
-                        <p:par>
-                          <p:cTn id="4" fill="hold">
-                            <p:stCondLst>
-                              <p:cond delay="0"/>
-                            </p:stCondLst>
-                            <p:childTnLst>
-                              <p:par>
-                                <p:cTn id="5" presetID="1" presetClass="entr" presetSubtype="0" fill="hold" grpId="0" nodeType="clickEffect">
-                                  <p:stCondLst>
-                                    <p:cond delay="0"/>
-                                  </p:stCondLst>
-                                  <p:childTnLst>
-                                    <p:set>
-                                      <p:cBhvr>
-                                        <p:cTn id="6" dur="1" fill="hold">
-                                          <p:stCondLst>
-                                            <p:cond delay="0"/>
-                                          </p:stCondLst>
-                                        </p:cTn>
-                                        <p:tgtEl>
-                                          <p:spTgt spid="3">
-                                            <p:txEl>
-                                              <p:pRg st="0" end="0"/>
-                                            </p:txEl>
-                                          </p:spTgt>
-                                        </p:tgtEl>
-                                        <p:attrNameLst>
-                                          <p:attrName>style.visibility</p:attrName>
-                                        </p:attrNameLst>
-                                      </p:cBhvr>
-                                      <p:to>
-                                        <p:strVal val="visible"/>
-                                      </p:to>
-                                    </p:set>
-                                  </p:childTnLst>
-                                </p:cTn>
-                              </p:par>
-                            </p:childTnLst>
-                          </p:cTn>
-                        </p:par>
-                      </p:childTnLst>
-                    </p:cTn>
-                  </p:par>
-                  <p:par>
-                    <p:cTn id="7" fill="hold">
-                      <p:stCondLst>
-                        <p:cond delay="indefinite"/>
-                      </p:stCondLst>
-                      <p:childTnLst>
-                        <p:par>
-                          <p:cTn id="8" fill="hold">
-                            <p:stCondLst>
-                              <p:cond delay="0"/>
-                            </p:stCondLst>
-                            <p:childTnLst>
-                              <p:par>
-                                <p:cTn id="9" presetID="1" presetClass="entr" presetSubtype="0" fill="hold" nodeType="clickEffect">
-                                  <p:stCondLst>
-                                    <p:cond delay="0"/>
-                                  </p:stCondLst>
-                                  <p:childTnLst>
-                                    <p:set>
-                                      <p:cBhvr>
-                                        <p:cTn id="10" dur="1" fill="hold">
-                                          <p:stCondLst>
-                                            <p:cond delay="0"/>
-                                          </p:stCondLst>
-                                        </p:cTn>
-                                        <p:tgtEl>
-                                          <p:spTgt spid="3">
-                                            <p:txEl>
-                                              <p:pRg st="1" end="1"/>
-                                            </p:txEl>
-                                          </p:spTgt>
-                                        </p:tgtEl>
-                                        <p:attrNameLst>
-                                          <p:attrName>style.visibility</p:attrName>
-                                        </p:attrNameLst>
-                                      </p:cBhvr>
-                                      <p:to>
-                                        <p:strVal val="visible"/>
-                                      </p:to>
-                                    </p:set>
-                                  </p:childTnLst>
-                                </p:cTn>
-                              </p:par>
-                            </p:childTnLst>
-                          </p:cTn>
-                        </p:par>
-                      </p:childTnLst>
-                    </p:cTn>
-                  </p:par>
-                  <p:par>
-                    <p:cTn id="11" fill="hold">
-                      <p:stCondLst>
-                        <p:cond delay="indefinite"/>
-                      </p:stCondLst>
-                      <p:childTnLst>
-                        <p:par>
-                          <p:cTn id="12" fill="hold">
-                            <p:stCondLst>
-                              <p:cond delay="0"/>
-                            </p:stCondLst>
-                            <p:childTnLst>
-                              <p:par>
-                                <p:cTn id="13" presetID="1" presetClass="entr" presetSubtype="0" fill="hold" nodeType="clickEffect">
-                                  <p:stCondLst>
-                                    <p:cond delay="0"/>
-                                  </p:stCondLst>
-                                  <p:childTnLst>
-                                    <p:set>
-                                      <p:cBhvr>
-                                        <p:cTn id="14" dur="1" fill="hold">
-                                          <p:stCondLst>
-                                            <p:cond delay="0"/>
-                                          </p:stCondLst>
-                                        </p:cTn>
-                                        <p:tgtEl>
-                                          <p:spTgt spid="7"/>
-                                        </p:tgtEl>
-                                        <p:attrNameLst>
-                                          <p:attrName>style.visibility</p:attrName>
-                                        </p:attrNameLst>
-                                      </p:cBhvr>
-                                      <p:to>
-                                        <p:strVal val="visible"/>
-                                      </p:to>
-                                    </p:set>
-                                  </p:childTnLst>
-                                </p:cTn>
-                              </p:par>
-                            </p:childTnLst>
-                          </p:cTn>
-                        </p:par>
-                      </p:childTnLst>
-                    </p:cTn>
-                  </p:par>
-                </p:childTnLst>
-              </p:cTn>
-              <p:prevCondLst>
-                <p:cond evt="onPrev" delay="0">
-                  <p:tgtEl>
-                    <p:sldTgt/>
-                  </p:tgtEl>
-                </p:cond>
-              </p:prevCondLst>
-              <p:nextCondLst>
-                <p:cond evt="onNext" delay="0">
-                  <p:tgtEl>
-                    <p:sldTgt/>
-                  </p:tgtEl>
-                </p:cond>
-              </p:nextCondLst>
-            </p:seq>
-          </p:childTnLst>
-        </p:cTn>
-      </p:par>
-    </p:tnLst>
-    <p:bldLst>
-      <p:bldP spid="3" grpId="0" uiExpand="1" build="p"/>
-    </p:bldLst>
-  </p:timing>
-</p:sld>
-</file>
-
 <file path=ppt/slides/slide9.xml><?xml version="1.0" encoding="utf-8"?>
 <p:sld xmlns:a="http://schemas.openxmlformats.org/drawingml/2006/main" xmlns:r="http://schemas.openxmlformats.org/officeDocument/2006/relationships" xmlns:p="http://schemas.openxmlformats.org/presentationml/2006/main">
   <p:cSld>
@@ -11300,7 +11959,7 @@
           <a:p>
             <a:r>
               <a:rPr lang="pl-PL" dirty="0" smtClean="0"/>
-              <a:t>EMF - metamodel</a:t>
+              <a:t>EMF – ecore &amp; genmodel</a:t>
             </a:r>
             <a:endParaRPr lang="pl-PL" dirty="0"/>
           </a:p>
@@ -11318,48 +11977,71 @@
         </p:nvSpPr>
         <p:spPr/>
         <p:txBody>
-          <a:bodyPr>
-            <a:normAutofit/>
-          </a:bodyPr>
+          <a:bodyPr/>
           <a:lstStyle/>
           <a:p>
             <a:r>
-              <a:rPr lang="pl-PL" sz="2200" dirty="0"/>
-              <a:t>EClass</a:t>
+              <a:rPr lang="pl-PL" sz="2200" dirty="0" smtClean="0"/>
+              <a:t>Two files:</a:t>
+            </a:r>
+          </a:p>
+          <a:p>
+            <a:pPr lvl="1"/>
+            <a:r>
+              <a:rPr lang="en-US" sz="2200" b="1" dirty="0" err="1" smtClean="0"/>
+              <a:t>ecore</a:t>
+            </a:r>
+            <a:r>
+              <a:rPr lang="en-US" sz="2200" dirty="0" smtClean="0"/>
+              <a:t> </a:t>
+            </a:r>
+            <a:r>
+              <a:rPr lang="pl-PL" sz="2200" dirty="0" smtClean="0"/>
+              <a:t>- </a:t>
+            </a:r>
+            <a:r>
+              <a:rPr lang="en-US" sz="2200" dirty="0" smtClean="0"/>
+              <a:t>contains </a:t>
+            </a:r>
+            <a:r>
+              <a:rPr lang="en-US" sz="2200" dirty="0"/>
+              <a:t>the information about the defined </a:t>
+            </a:r>
+            <a:r>
+              <a:rPr lang="en-US" sz="2200" dirty="0" smtClean="0"/>
+              <a:t>classes</a:t>
             </a:r>
             <a:endParaRPr lang="pl-PL" sz="2200" dirty="0" smtClean="0"/>
           </a:p>
           <a:p>
-            <a:r>
-              <a:rPr lang="pl-PL" sz="2200" dirty="0"/>
-              <a:t>EStructuralFeature</a:t>
-            </a:r>
-          </a:p>
-          <a:p>
             <a:pPr lvl="1"/>
             <a:r>
-              <a:rPr lang="pl-PL" sz="2000" dirty="0" smtClean="0"/>
-              <a:t>EAttribute</a:t>
-            </a:r>
-          </a:p>
-          <a:p>
-            <a:pPr lvl="1"/>
-            <a:r>
-              <a:rPr lang="pl-PL" sz="2000" dirty="0" smtClean="0"/>
-              <a:t>EReference</a:t>
-            </a:r>
-          </a:p>
-          <a:p>
+              <a:rPr lang="pl-PL" sz="2200" b="1" dirty="0" smtClean="0"/>
+              <a:t>genmodel</a:t>
+            </a:r>
             <a:r>
               <a:rPr lang="pl-PL" sz="2200" dirty="0" smtClean="0"/>
-              <a:t>EOperation</a:t>
-            </a:r>
-          </a:p>
-          <a:p>
-            <a:r>
-              <a:rPr lang="pl-PL" sz="2200" dirty="0" smtClean="0"/>
-              <a:t>EDataType</a:t>
-            </a:r>
+              <a:t> - </a:t>
+            </a:r>
+            <a:r>
+              <a:rPr lang="en-US" sz="2200" dirty="0"/>
+              <a:t>contains </a:t>
+            </a:r>
+            <a:r>
+              <a:rPr lang="en-US" sz="2200" dirty="0" smtClean="0"/>
+              <a:t>information </a:t>
+            </a:r>
+            <a:r>
+              <a:rPr lang="en-US" sz="2200" dirty="0"/>
+              <a:t>for the code generation</a:t>
+            </a:r>
+            <a:endParaRPr lang="pl-PL" sz="2200" dirty="0" smtClean="0"/>
+          </a:p>
+          <a:p>
+            <a:pPr marL="0" indent="0">
+              <a:buNone/>
+            </a:pPr>
+            <a:endParaRPr lang="pl-PL" dirty="0" smtClean="0"/>
           </a:p>
         </p:txBody>
       </p:sp>
@@ -11433,40 +12115,16 @@
             <a:fld id="{A1C14688-799C-45A6-846F-47D660935463}" type="datetime1">
               <a:rPr lang="pl-PL" smtClean="0"/>
               <a:pPr/>
-              <a:t>2015-09-16</a:t>
+              <a:t>2015-09-17</a:t>
             </a:fld>
             <a:endParaRPr lang="pl-PL" dirty="0"/>
           </a:p>
         </p:txBody>
       </p:sp>
-      <p:pic>
-        <p:nvPicPr>
-          <p:cNvPr id="7" name="Picture 6"/>
-          <p:cNvPicPr>
-            <a:picLocks noChangeAspect="1"/>
-          </p:cNvPicPr>
-          <p:nvPr/>
-        </p:nvPicPr>
-        <p:blipFill>
-          <a:blip r:embed="rId2"/>
-          <a:stretch>
-            <a:fillRect/>
-          </a:stretch>
-        </p:blipFill>
-        <p:spPr>
-          <a:xfrm>
-            <a:off x="3559442" y="1772955"/>
-            <a:ext cx="7096125" cy="2552700"/>
-          </a:xfrm>
-          <a:prstGeom prst="rect">
-            <a:avLst/>
-          </a:prstGeom>
-        </p:spPr>
-      </p:pic>
     </p:spTree>
     <p:extLst>
       <p:ext uri="{BB962C8B-B14F-4D97-AF65-F5344CB8AC3E}">
-        <p14:creationId xmlns:p14="http://schemas.microsoft.com/office/powerpoint/2010/main" val="4075416827"/>
+        <p14:creationId xmlns:p14="http://schemas.microsoft.com/office/powerpoint/2010/main" val="1695547840"/>
       </p:ext>
     </p:extLst>
   </p:cSld>
@@ -11476,279 +12134,7 @@
   <p:timing>
     <p:tnLst>
       <p:par>
-        <p:cTn id="1" dur="indefinite" restart="never" nodeType="tmRoot">
-          <p:childTnLst>
-            <p:seq concurrent="1" nextAc="seek">
-              <p:cTn id="2" dur="indefinite" nodeType="mainSeq">
-                <p:childTnLst>
-                  <p:par>
-                    <p:cTn id="3" fill="hold">
-                      <p:stCondLst>
-                        <p:cond delay="indefinite"/>
-                      </p:stCondLst>
-                      <p:childTnLst>
-                        <p:par>
-                          <p:cTn id="4" fill="hold">
-                            <p:stCondLst>
-                              <p:cond delay="0"/>
-                            </p:stCondLst>
-                            <p:childTnLst>
-                              <p:par>
-                                <p:cTn id="5" presetID="1" presetClass="entr" presetSubtype="0" fill="hold" nodeType="clickEffect">
-                                  <p:stCondLst>
-                                    <p:cond delay="0"/>
-                                  </p:stCondLst>
-                                  <p:childTnLst>
-                                    <p:set>
-                                      <p:cBhvr>
-                                        <p:cTn id="6" dur="1" fill="hold">
-                                          <p:stCondLst>
-                                            <p:cond delay="0"/>
-                                          </p:stCondLst>
-                                        </p:cTn>
-                                        <p:tgtEl>
-                                          <p:spTgt spid="3">
-                                            <p:txEl>
-                                              <p:pRg st="0" end="0"/>
-                                            </p:txEl>
-                                          </p:spTgt>
-                                        </p:tgtEl>
-                                        <p:attrNameLst>
-                                          <p:attrName>style.visibility</p:attrName>
-                                        </p:attrNameLst>
-                                      </p:cBhvr>
-                                      <p:to>
-                                        <p:strVal val="visible"/>
-                                      </p:to>
-                                    </p:set>
-                                  </p:childTnLst>
-                                </p:cTn>
-                              </p:par>
-                              <p:par>
-                                <p:cTn id="7" presetID="1" presetClass="entr" presetSubtype="0" fill="hold" nodeType="withEffect">
-                                  <p:stCondLst>
-                                    <p:cond delay="0"/>
-                                  </p:stCondLst>
-                                  <p:childTnLst>
-                                    <p:set>
-                                      <p:cBhvr>
-                                        <p:cTn id="8" dur="1" fill="hold">
-                                          <p:stCondLst>
-                                            <p:cond delay="0"/>
-                                          </p:stCondLst>
-                                        </p:cTn>
-                                        <p:tgtEl>
-                                          <p:spTgt spid="3">
-                                            <p:txEl>
-                                              <p:pRg st="1" end="1"/>
-                                            </p:txEl>
-                                          </p:spTgt>
-                                        </p:tgtEl>
-                                        <p:attrNameLst>
-                                          <p:attrName>style.visibility</p:attrName>
-                                        </p:attrNameLst>
-                                      </p:cBhvr>
-                                      <p:to>
-                                        <p:strVal val="visible"/>
-                                      </p:to>
-                                    </p:set>
-                                  </p:childTnLst>
-                                </p:cTn>
-                              </p:par>
-                              <p:par>
-                                <p:cTn id="9" presetID="1" presetClass="entr" presetSubtype="0" fill="hold" nodeType="withEffect">
-                                  <p:stCondLst>
-                                    <p:cond delay="0"/>
-                                  </p:stCondLst>
-                                  <p:childTnLst>
-                                    <p:set>
-                                      <p:cBhvr>
-                                        <p:cTn id="10" dur="1" fill="hold">
-                                          <p:stCondLst>
-                                            <p:cond delay="0"/>
-                                          </p:stCondLst>
-                                        </p:cTn>
-                                        <p:tgtEl>
-                                          <p:spTgt spid="3">
-                                            <p:txEl>
-                                              <p:pRg st="2" end="2"/>
-                                            </p:txEl>
-                                          </p:spTgt>
-                                        </p:tgtEl>
-                                        <p:attrNameLst>
-                                          <p:attrName>style.visibility</p:attrName>
-                                        </p:attrNameLst>
-                                      </p:cBhvr>
-                                      <p:to>
-                                        <p:strVal val="visible"/>
-                                      </p:to>
-                                    </p:set>
-                                  </p:childTnLst>
-                                </p:cTn>
-                              </p:par>
-                              <p:par>
-                                <p:cTn id="11" presetID="1" presetClass="entr" presetSubtype="0" fill="hold" nodeType="withEffect">
-                                  <p:stCondLst>
-                                    <p:cond delay="0"/>
-                                  </p:stCondLst>
-                                  <p:childTnLst>
-                                    <p:set>
-                                      <p:cBhvr>
-                                        <p:cTn id="12" dur="1" fill="hold">
-                                          <p:stCondLst>
-                                            <p:cond delay="0"/>
-                                          </p:stCondLst>
-                                        </p:cTn>
-                                        <p:tgtEl>
-                                          <p:spTgt spid="3">
-                                            <p:txEl>
-                                              <p:pRg st="3" end="3"/>
-                                            </p:txEl>
-                                          </p:spTgt>
-                                        </p:tgtEl>
-                                        <p:attrNameLst>
-                                          <p:attrName>style.visibility</p:attrName>
-                                        </p:attrNameLst>
-                                      </p:cBhvr>
-                                      <p:to>
-                                        <p:strVal val="visible"/>
-                                      </p:to>
-                                    </p:set>
-                                  </p:childTnLst>
-                                </p:cTn>
-                              </p:par>
-                              <p:par>
-                                <p:cTn id="13" presetID="1" presetClass="entr" presetSubtype="0" fill="hold" nodeType="withEffect">
-                                  <p:stCondLst>
-                                    <p:cond delay="0"/>
-                                  </p:stCondLst>
-                                  <p:childTnLst>
-                                    <p:set>
-                                      <p:cBhvr>
-                                        <p:cTn id="14" dur="1" fill="hold">
-                                          <p:stCondLst>
-                                            <p:cond delay="0"/>
-                                          </p:stCondLst>
-                                        </p:cTn>
-                                        <p:tgtEl>
-                                          <p:spTgt spid="3">
-                                            <p:txEl>
-                                              <p:pRg st="4" end="4"/>
-                                            </p:txEl>
-                                          </p:spTgt>
-                                        </p:tgtEl>
-                                        <p:attrNameLst>
-                                          <p:attrName>style.visibility</p:attrName>
-                                        </p:attrNameLst>
-                                      </p:cBhvr>
-                                      <p:to>
-                                        <p:strVal val="visible"/>
-                                      </p:to>
-                                    </p:set>
-                                  </p:childTnLst>
-                                </p:cTn>
-                              </p:par>
-                              <p:par>
-                                <p:cTn id="15" presetID="1" presetClass="entr" presetSubtype="0" fill="hold" nodeType="withEffect">
-                                  <p:stCondLst>
-                                    <p:cond delay="0"/>
-                                  </p:stCondLst>
-                                  <p:childTnLst>
-                                    <p:set>
-                                      <p:cBhvr>
-                                        <p:cTn id="16" dur="1" fill="hold">
-                                          <p:stCondLst>
-                                            <p:cond delay="0"/>
-                                          </p:stCondLst>
-                                        </p:cTn>
-                                        <p:tgtEl>
-                                          <p:spTgt spid="3">
-                                            <p:txEl>
-                                              <p:pRg st="5" end="5"/>
-                                            </p:txEl>
-                                          </p:spTgt>
-                                        </p:tgtEl>
-                                        <p:attrNameLst>
-                                          <p:attrName>style.visibility</p:attrName>
-                                        </p:attrNameLst>
-                                      </p:cBhvr>
-                                      <p:to>
-                                        <p:strVal val="visible"/>
-                                      </p:to>
-                                    </p:set>
-                                  </p:childTnLst>
-                                </p:cTn>
-                              </p:par>
-                            </p:childTnLst>
-                          </p:cTn>
-                        </p:par>
-                      </p:childTnLst>
-                    </p:cTn>
-                  </p:par>
-                  <p:par>
-                    <p:cTn id="17" fill="hold">
-                      <p:stCondLst>
-                        <p:cond delay="indefinite"/>
-                      </p:stCondLst>
-                      <p:childTnLst>
-                        <p:par>
-                          <p:cTn id="18" fill="hold">
-                            <p:stCondLst>
-                              <p:cond delay="0"/>
-                            </p:stCondLst>
-                            <p:childTnLst>
-                              <p:par>
-                                <p:cTn id="19" presetID="1" presetClass="entr" presetSubtype="0" fill="hold" nodeType="clickEffect">
-                                  <p:stCondLst>
-                                    <p:cond delay="0"/>
-                                  </p:stCondLst>
-                                  <p:childTnLst>
-                                    <p:set>
-                                      <p:cBhvr>
-                                        <p:cTn id="20" dur="1" fill="hold">
-                                          <p:stCondLst>
-                                            <p:cond delay="0"/>
-                                          </p:stCondLst>
-                                        </p:cTn>
-                                        <p:tgtEl>
-                                          <p:spTgt spid="7"/>
-                                        </p:tgtEl>
-                                        <p:attrNameLst>
-                                          <p:attrName>style.visibility</p:attrName>
-                                        </p:attrNameLst>
-                                      </p:cBhvr>
-                                      <p:to>
-                                        <p:strVal val="visible"/>
-                                      </p:to>
-                                    </p:set>
-                                  </p:childTnLst>
-                                </p:cTn>
-                              </p:par>
-                            </p:childTnLst>
-                          </p:cTn>
-                        </p:par>
-                      </p:childTnLst>
-                    </p:cTn>
-                  </p:par>
-                </p:childTnLst>
-              </p:cTn>
-              <p:prevCondLst>
-                <p:cond evt="onPrev" delay="0">
-                  <p:tgtEl>
-                    <p:sldTgt/>
-                  </p:tgtEl>
-                </p:cond>
-              </p:prevCondLst>
-              <p:nextCondLst>
-                <p:cond evt="onNext" delay="0">
-                  <p:tgtEl>
-                    <p:sldTgt/>
-                  </p:tgtEl>
-                </p:cond>
-              </p:nextCondLst>
-            </p:seq>
-          </p:childTnLst>
-        </p:cTn>
+        <p:cTn id="1" dur="indefinite" restart="never" nodeType="tmRoot"/>
       </p:par>
     </p:tnLst>
   </p:timing>
@@ -12626,12 +13012,6 @@
 </file>
 
 <file path=customXml/item2.xml><?xml version="1.0" encoding="utf-8"?>
-<p:properties xmlns:p="http://schemas.microsoft.com/office/2006/metadata/properties" xmlns:xsi="http://www.w3.org/2001/XMLSchema-instance" xmlns:pc="http://schemas.microsoft.com/office/infopath/2007/PartnerControls">
-  <documentManagement/>
-</p:properties>
-</file>
-
-<file path=customXml/item3.xml><?xml version="1.0" encoding="utf-8"?>
 <ct:contentTypeSchema xmlns:ct="http://schemas.microsoft.com/office/2006/metadata/contentType" xmlns:ma="http://schemas.microsoft.com/office/2006/metadata/properties/metaAttributes" ct:_="" ma:_="" ma:contentTypeName="Document" ma:contentTypeID="0x010100936691DD97235843B5E96CA882CD7A85" ma:contentTypeVersion="5" ma:contentTypeDescription="Create a new document." ma:contentTypeScope="" ma:versionID="6f08e88fdeac68ac664784283c60f55d">
   <xsd:schema xmlns:xsd="http://www.w3.org/2001/XMLSchema" xmlns:xs="http://www.w3.org/2001/XMLSchema" xmlns:p="http://schemas.microsoft.com/office/2006/metadata/properties" targetNamespace="http://schemas.microsoft.com/office/2006/metadata/properties" ma:root="true" ma:fieldsID="1b420e54b54d84c99c75ea622d6798e7">
     <xsd:element name="properties">
@@ -12745,6 +13125,12 @@
 </ct:contentTypeSchema>
 </file>
 
+<file path=customXml/item3.xml><?xml version="1.0" encoding="utf-8"?>
+<p:properties xmlns:p="http://schemas.microsoft.com/office/2006/metadata/properties" xmlns:xsi="http://www.w3.org/2001/XMLSchema-instance" xmlns:pc="http://schemas.microsoft.com/office/infopath/2007/PartnerControls">
+  <documentManagement/>
+</p:properties>
+</file>
+
 <file path=customXml/itemProps1.xml><?xml version="1.0" encoding="utf-8"?>
 <ds:datastoreItem xmlns:ds="http://schemas.openxmlformats.org/officeDocument/2006/customXml" ds:itemID="{6AA8B675-C754-493C-B718-CAC6BC23635B}">
   <ds:schemaRefs>
@@ -12754,21 +13140,6 @@
 </file>
 
 <file path=customXml/itemProps2.xml><?xml version="1.0" encoding="utf-8"?>
-<ds:datastoreItem xmlns:ds="http://schemas.openxmlformats.org/officeDocument/2006/customXml" ds:itemID="{BD743871-875D-472A-961D-1DCE1A0B5DE9}">
-  <ds:schemaRefs>
-    <ds:schemaRef ds:uri="http://www.w3.org/XML/1998/namespace"/>
-    <ds:schemaRef ds:uri="http://schemas.microsoft.com/office/2006/metadata/properties"/>
-    <ds:schemaRef ds:uri="http://schemas.microsoft.com/office/2006/documentManagement/types"/>
-    <ds:schemaRef ds:uri="http://purl.org/dc/dcmitype/"/>
-    <ds:schemaRef ds:uri="http://purl.org/dc/elements/1.1/"/>
-    <ds:schemaRef ds:uri="http://purl.org/dc/terms/"/>
-    <ds:schemaRef ds:uri="http://schemas.microsoft.com/office/infopath/2007/PartnerControls"/>
-    <ds:schemaRef ds:uri="http://schemas.openxmlformats.org/package/2006/metadata/core-properties"/>
-  </ds:schemaRefs>
-</ds:datastoreItem>
-</file>
-
-<file path=customXml/itemProps3.xml><?xml version="1.0" encoding="utf-8"?>
 <ds:datastoreItem xmlns:ds="http://schemas.openxmlformats.org/officeDocument/2006/customXml" ds:itemID="{89F2C655-CE6E-4709-BE63-9C397722D50F}">
   <ds:schemaRefs>
     <ds:schemaRef ds:uri="http://schemas.microsoft.com/office/2006/metadata/contentType"/>
@@ -12782,4 +13153,19 @@
     <ds:schemaRef ds:uri="http://schemas.microsoft.com/office/infopath/2007/PartnerControls"/>
   </ds:schemaRefs>
 </ds:datastoreItem>
+</file>
+
+<file path=customXml/itemProps3.xml><?xml version="1.0" encoding="utf-8"?>
+<ds:datastoreItem xmlns:ds="http://schemas.openxmlformats.org/officeDocument/2006/customXml" ds:itemID="{BD743871-875D-472A-961D-1DCE1A0B5DE9}">
+  <ds:schemaRefs>
+    <ds:schemaRef ds:uri="http://www.w3.org/XML/1998/namespace"/>
+    <ds:schemaRef ds:uri="http://schemas.microsoft.com/office/2006/metadata/properties"/>
+    <ds:schemaRef ds:uri="http://schemas.microsoft.com/office/2006/documentManagement/types"/>
+    <ds:schemaRef ds:uri="http://purl.org/dc/dcmitype/"/>
+    <ds:schemaRef ds:uri="http://purl.org/dc/elements/1.1/"/>
+    <ds:schemaRef ds:uri="http://purl.org/dc/terms/"/>
+    <ds:schemaRef ds:uri="http://schemas.microsoft.com/office/infopath/2007/PartnerControls"/>
+    <ds:schemaRef ds:uri="http://schemas.openxmlformats.org/package/2006/metadata/core-properties"/>
+  </ds:schemaRefs>
+</ds:datastoreItem>
 </file>
</xml_diff>

<commit_message>
added a new slide to the presentation.
</commit_message>
<xml_diff>
--- a/JUG - EMF.pptx
+++ b/JUG - EMF.pptx
@@ -5,10 +5,10 @@
     <p:sldMasterId id="2147483648" r:id="rId4"/>
   </p:sldMasterIdLst>
   <p:notesMasterIdLst>
-    <p:notesMasterId r:id="rId28"/>
+    <p:notesMasterId r:id="rId29"/>
   </p:notesMasterIdLst>
   <p:handoutMasterIdLst>
-    <p:handoutMasterId r:id="rId29"/>
+    <p:handoutMasterId r:id="rId30"/>
   </p:handoutMasterIdLst>
   <p:sldIdLst>
     <p:sldId id="280" r:id="rId5"/>
@@ -24,16 +24,17 @@
     <p:sldId id="286" r:id="rId15"/>
     <p:sldId id="284" r:id="rId16"/>
     <p:sldId id="301" r:id="rId17"/>
-    <p:sldId id="287" r:id="rId18"/>
-    <p:sldId id="285" r:id="rId19"/>
-    <p:sldId id="298" r:id="rId20"/>
-    <p:sldId id="288" r:id="rId21"/>
-    <p:sldId id="299" r:id="rId22"/>
-    <p:sldId id="289" r:id="rId23"/>
-    <p:sldId id="300" r:id="rId24"/>
-    <p:sldId id="290" r:id="rId25"/>
-    <p:sldId id="292" r:id="rId26"/>
-    <p:sldId id="291" r:id="rId27"/>
+    <p:sldId id="302" r:id="rId18"/>
+    <p:sldId id="287" r:id="rId19"/>
+    <p:sldId id="285" r:id="rId20"/>
+    <p:sldId id="298" r:id="rId21"/>
+    <p:sldId id="288" r:id="rId22"/>
+    <p:sldId id="299" r:id="rId23"/>
+    <p:sldId id="289" r:id="rId24"/>
+    <p:sldId id="300" r:id="rId25"/>
+    <p:sldId id="290" r:id="rId26"/>
+    <p:sldId id="292" r:id="rId27"/>
+    <p:sldId id="291" r:id="rId28"/>
   </p:sldIdLst>
   <p:sldSz cx="12192000" cy="6858000"/>
   <p:notesSz cx="6858000" cy="9144000"/>
@@ -248,7 +249,7 @@
             <a:fld id="{056D73CD-AD5E-416F-914D-693791469B20}" type="datetimeFigureOut">
               <a:rPr lang="pl-PL" smtClean="0"/>
               <a:pPr/>
-              <a:t>2015-11-16</a:t>
+              <a:t>2015-11-24</a:t>
             </a:fld>
             <a:endParaRPr lang="pl-PL"/>
           </a:p>
@@ -415,7 +416,7 @@
             <a:fld id="{42E25A34-81B0-4A1E-8A53-54C191A31FEF}" type="datetimeFigureOut">
               <a:rPr lang="pl-PL" smtClean="0"/>
               <a:pPr/>
-              <a:t>2015-11-16</a:t>
+              <a:t>2015-11-24</a:t>
             </a:fld>
             <a:endParaRPr lang="pl-PL"/>
           </a:p>
@@ -1365,7 +1366,7 @@
             <a:fld id="{A1C14688-799C-45A6-846F-47D660935463}" type="datetime1">
               <a:rPr lang="pl-PL" smtClean="0"/>
               <a:pPr/>
-              <a:t>2015-11-16</a:t>
+              <a:t>2015-11-24</a:t>
             </a:fld>
             <a:endParaRPr lang="pl-PL" dirty="0"/>
           </a:p>
@@ -2104,7 +2105,7 @@
             <a:fld id="{A1C14688-799C-45A6-846F-47D660935463}" type="datetime1">
               <a:rPr lang="pl-PL" smtClean="0"/>
               <a:pPr/>
-              <a:t>2015-11-16</a:t>
+              <a:t>2015-11-24</a:t>
             </a:fld>
             <a:endParaRPr lang="pl-PL" dirty="0"/>
           </a:p>
@@ -2411,7 +2412,7 @@
             <a:fld id="{CA444EF8-B926-415D-95F0-FB0651B7AA0D}" type="datetime1">
               <a:rPr lang="pl-PL" smtClean="0"/>
               <a:pPr/>
-              <a:t>2015-11-16</a:t>
+              <a:t>2015-11-24</a:t>
             </a:fld>
             <a:endParaRPr lang="pl-PL" dirty="0"/>
           </a:p>
@@ -2643,7 +2644,7 @@
             <a:fld id="{A1C14688-799C-45A6-846F-47D660935463}" type="datetime1">
               <a:rPr lang="pl-PL" smtClean="0"/>
               <a:pPr/>
-              <a:t>2015-11-16</a:t>
+              <a:t>2015-11-24</a:t>
             </a:fld>
             <a:endParaRPr lang="pl-PL" dirty="0"/>
           </a:p>
@@ -3093,7 +3094,7 @@
             <a:fld id="{A1C14688-799C-45A6-846F-47D660935463}" type="datetime1">
               <a:rPr lang="pl-PL" smtClean="0"/>
               <a:pPr/>
-              <a:t>2015-11-16</a:t>
+              <a:t>2015-11-24</a:t>
             </a:fld>
             <a:endParaRPr lang="pl-PL" dirty="0"/>
           </a:p>
@@ -3449,7 +3450,7 @@
             <a:fld id="{A1C14688-799C-45A6-846F-47D660935463}" type="datetime1">
               <a:rPr lang="pl-PL" smtClean="0"/>
               <a:pPr/>
-              <a:t>2015-11-16</a:t>
+              <a:t>2015-11-24</a:t>
             </a:fld>
             <a:endParaRPr lang="pl-PL" dirty="0"/>
           </a:p>
@@ -3732,7 +3733,7 @@
             <a:fld id="{A1C14688-799C-45A6-846F-47D660935463}" type="datetime1">
               <a:rPr lang="pl-PL" smtClean="0"/>
               <a:pPr/>
-              <a:t>2015-11-16</a:t>
+              <a:t>2015-11-24</a:t>
             </a:fld>
             <a:endParaRPr lang="pl-PL" dirty="0"/>
           </a:p>
@@ -4027,7 +4028,7 @@
             <a:fld id="{A1C14688-799C-45A6-846F-47D660935463}" type="datetime1">
               <a:rPr lang="pl-PL" smtClean="0"/>
               <a:pPr/>
-              <a:t>2015-11-16</a:t>
+              <a:t>2015-11-24</a:t>
             </a:fld>
             <a:endParaRPr lang="pl-PL" dirty="0"/>
           </a:p>
@@ -4398,7 +4399,7 @@
             <a:fld id="{A1C14688-799C-45A6-846F-47D660935463}" type="datetime1">
               <a:rPr lang="pl-PL" smtClean="0"/>
               <a:pPr/>
-              <a:t>2015-11-16</a:t>
+              <a:t>2015-11-24</a:t>
             </a:fld>
             <a:endParaRPr lang="pl-PL" dirty="0"/>
           </a:p>
@@ -4693,7 +4694,7 @@
             <a:fld id="{A1C14688-799C-45A6-846F-47D660935463}" type="datetime1">
               <a:rPr lang="pl-PL" smtClean="0"/>
               <a:pPr/>
-              <a:t>2015-11-16</a:t>
+              <a:t>2015-11-24</a:t>
             </a:fld>
             <a:endParaRPr lang="pl-PL" dirty="0"/>
           </a:p>
@@ -5373,7 +5374,7 @@
             <a:fld id="{A1C14688-799C-45A6-846F-47D660935463}" type="datetime1">
               <a:rPr lang="pl-PL" smtClean="0"/>
               <a:pPr/>
-              <a:t>2015-11-16</a:t>
+              <a:t>2015-11-24</a:t>
             </a:fld>
             <a:endParaRPr lang="pl-PL" dirty="0"/>
           </a:p>
@@ -5815,7 +5816,7 @@
             <a:fld id="{A1C14688-799C-45A6-846F-47D660935463}" type="datetime1">
               <a:rPr lang="pl-PL" smtClean="0"/>
               <a:pPr/>
-              <a:t>2015-11-16</a:t>
+              <a:t>2015-11-24</a:t>
             </a:fld>
             <a:endParaRPr lang="pl-PL" dirty="0"/>
           </a:p>
@@ -5997,7 +5998,7 @@
             <a:fld id="{767CAEAC-D843-4FF2-8657-8264B0202C16}" type="datetime1">
               <a:rPr lang="pl-PL" smtClean="0"/>
               <a:pPr/>
-              <a:t>2015-11-16</a:t>
+              <a:t>2015-11-24</a:t>
             </a:fld>
             <a:endParaRPr lang="pl-PL" dirty="0"/>
           </a:p>
@@ -6786,7 +6787,7 @@
             <a:fld id="{844BCD22-CA02-4C92-9F05-D5071550F6B3}" type="datetime1">
               <a:rPr lang="pl-PL" smtClean="0"/>
               <a:pPr/>
-              <a:t>2015-11-16</a:t>
+              <a:t>2015-11-24</a:t>
             </a:fld>
             <a:endParaRPr lang="pl-PL" dirty="0"/>
           </a:p>
@@ -7025,7 +7026,7 @@
             <a:fld id="{A1C14688-799C-45A6-846F-47D660935463}" type="datetime1">
               <a:rPr lang="pl-PL" smtClean="0"/>
               <a:pPr/>
-              <a:t>2015-11-16</a:t>
+              <a:t>2015-11-24</a:t>
             </a:fld>
             <a:endParaRPr lang="pl-PL" dirty="0"/>
           </a:p>
@@ -7648,7 +7649,7 @@
             <a:fld id="{A1C14688-799C-45A6-846F-47D660935463}" type="datetime1">
               <a:rPr lang="pl-PL" smtClean="0"/>
               <a:pPr/>
-              <a:t>2015-11-16</a:t>
+              <a:t>2015-11-24</a:t>
             </a:fld>
             <a:endParaRPr lang="pl-PL" dirty="0"/>
           </a:p>
@@ -7783,7 +7784,7 @@
             <a:fld id="{A1C14688-799C-45A6-846F-47D660935463}" type="datetime1">
               <a:rPr lang="pl-PL" smtClean="0"/>
               <a:pPr/>
-              <a:t>2015-11-16</a:t>
+              <a:t>2015-11-24</a:t>
             </a:fld>
             <a:endParaRPr lang="pl-PL" dirty="0"/>
           </a:p>
@@ -7862,58 +7863,90 @@
         </p:nvSpPr>
         <p:spPr/>
         <p:txBody>
+          <a:bodyPr>
+            <a:normAutofit fontScale="90000"/>
+          </a:bodyPr>
+          <a:lstStyle/>
+          <a:p>
+            <a:r>
+              <a:rPr lang="pl-PL" dirty="0" smtClean="0"/>
+              <a:t>http</a:t>
+            </a:r>
+            <a:r>
+              <a:rPr lang="pl-PL" dirty="0"/>
+              <a:t>://www.eclipse.org/emf/2002/GenModel</a:t>
+            </a:r>
+            <a:br>
+              <a:rPr lang="pl-PL" dirty="0"/>
+            </a:br>
+            <a:endParaRPr lang="pl-PL" dirty="0"/>
+          </a:p>
+        </p:txBody>
+      </p:sp>
+      <p:sp>
+        <p:nvSpPr>
+          <p:cNvPr id="3" name="Text Placeholder 2"/>
+          <p:cNvSpPr>
+            <a:spLocks noGrp="1"/>
+          </p:cNvSpPr>
+          <p:nvPr>
+            <p:ph type="body" sz="quarter" idx="13"/>
+          </p:nvPr>
+        </p:nvSpPr>
+        <p:spPr/>
+        <p:txBody>
           <a:bodyPr/>
           <a:lstStyle/>
           <a:p>
             <a:r>
+              <a:rPr lang="pl-PL" dirty="0"/>
+              <a:t>d</a:t>
+            </a:r>
+            <a:r>
               <a:rPr lang="pl-PL" dirty="0" smtClean="0"/>
-              <a:t>Object vs EObject</a:t>
-            </a:r>
-            <a:endParaRPr lang="pl-PL" dirty="0"/>
-          </a:p>
-        </p:txBody>
-      </p:sp>
-      <p:sp>
-        <p:nvSpPr>
-          <p:cNvPr id="3" name="Text Placeholder 2"/>
-          <p:cNvSpPr>
-            <a:spLocks noGrp="1"/>
-          </p:cNvSpPr>
-          <p:nvPr>
-            <p:ph type="body" sz="quarter" idx="13"/>
-          </p:nvPr>
-        </p:nvSpPr>
-        <p:spPr/>
-        <p:txBody>
-          <a:bodyPr/>
-          <a:lstStyle/>
-          <a:p>
-            <a:r>
-              <a:rPr lang="en-US" sz="2200" dirty="0" err="1"/>
-              <a:t>EObject</a:t>
-            </a:r>
-            <a:r>
-              <a:rPr lang="en-US" sz="2200" dirty="0"/>
-              <a:t> is the root of all modeled </a:t>
-            </a:r>
-            <a:r>
-              <a:rPr lang="en-US" sz="2200" dirty="0" smtClean="0"/>
-              <a:t>objects</a:t>
-            </a:r>
-            <a:endParaRPr lang="pl-PL" sz="2200" dirty="0" smtClean="0"/>
-          </a:p>
-          <a:p>
-            <a:r>
-              <a:rPr lang="en-US" sz="2200" dirty="0"/>
-              <a:t>It provides support for the behaviors and features common to all modeled objects: </a:t>
-            </a:r>
-            <a:endParaRPr lang="pl-PL" sz="2200" dirty="0" smtClean="0"/>
+              <a:t>ocumentation</a:t>
+            </a:r>
+          </a:p>
+          <a:p>
+            <a:r>
+              <a:rPr lang="pl-PL" dirty="0"/>
+              <a:t>copyright</a:t>
+            </a:r>
+            <a:endParaRPr lang="pl-PL" dirty="0" smtClean="0"/>
+          </a:p>
+          <a:p>
+            <a:r>
+              <a:rPr lang="pl-PL" dirty="0" smtClean="0">
+                <a:solidFill>
+                  <a:srgbClr val="FF0000"/>
+                </a:solidFill>
+              </a:rPr>
+              <a:t>body</a:t>
+            </a:r>
+          </a:p>
+          <a:p>
+            <a:r>
+              <a:rPr lang="pl-PL" dirty="0" smtClean="0"/>
+              <a:t>suppressedGetVisibility</a:t>
+            </a:r>
+          </a:p>
+          <a:p>
+            <a:r>
+              <a:rPr lang="pl-PL" dirty="0" smtClean="0"/>
+              <a:t>suppressedSetVisibility</a:t>
+            </a:r>
+          </a:p>
+          <a:p>
+            <a:r>
+              <a:rPr lang="pl-PL" dirty="0" smtClean="0"/>
+              <a:t>...</a:t>
+            </a:r>
           </a:p>
           <a:p>
             <a:pPr marL="0" indent="0">
               <a:buNone/>
             </a:pPr>
-            <a:endParaRPr lang="pl-PL" dirty="0" smtClean="0"/>
+            <a:endParaRPr lang="pl-PL" dirty="0"/>
           </a:p>
         </p:txBody>
       </p:sp>
@@ -7987,7 +8020,180 @@
             <a:fld id="{A1C14688-799C-45A6-846F-47D660935463}" type="datetime1">
               <a:rPr lang="pl-PL" smtClean="0"/>
               <a:pPr/>
-              <a:t>2015-11-16</a:t>
+              <a:t>2015-11-24</a:t>
+            </a:fld>
+            <a:endParaRPr lang="pl-PL" dirty="0"/>
+          </a:p>
+        </p:txBody>
+      </p:sp>
+    </p:spTree>
+    <p:extLst>
+      <p:ext uri="{BB962C8B-B14F-4D97-AF65-F5344CB8AC3E}">
+        <p14:creationId xmlns:p14="http://schemas.microsoft.com/office/powerpoint/2010/main" val="2783697242"/>
+      </p:ext>
+    </p:extLst>
+  </p:cSld>
+  <p:clrMapOvr>
+    <a:masterClrMapping/>
+  </p:clrMapOvr>
+</p:sld>
+</file>
+
+<file path=ppt/slides/slide15.xml><?xml version="1.0" encoding="utf-8"?>
+<p:sld xmlns:a="http://schemas.openxmlformats.org/drawingml/2006/main" xmlns:r="http://schemas.openxmlformats.org/officeDocument/2006/relationships" xmlns:p="http://schemas.openxmlformats.org/presentationml/2006/main">
+  <p:cSld>
+    <p:spTree>
+      <p:nvGrpSpPr>
+        <p:cNvPr id="1" name=""/>
+        <p:cNvGrpSpPr/>
+        <p:nvPr/>
+      </p:nvGrpSpPr>
+      <p:grpSpPr>
+        <a:xfrm>
+          <a:off x="0" y="0"/>
+          <a:ext cx="0" cy="0"/>
+          <a:chOff x="0" y="0"/>
+          <a:chExt cx="0" cy="0"/>
+        </a:xfrm>
+      </p:grpSpPr>
+      <p:sp>
+        <p:nvSpPr>
+          <p:cNvPr id="2" name="Title 1"/>
+          <p:cNvSpPr>
+            <a:spLocks noGrp="1"/>
+          </p:cNvSpPr>
+          <p:nvPr>
+            <p:ph type="title"/>
+          </p:nvPr>
+        </p:nvSpPr>
+        <p:spPr/>
+        <p:txBody>
+          <a:bodyPr/>
+          <a:lstStyle/>
+          <a:p>
+            <a:r>
+              <a:rPr lang="pl-PL" dirty="0" smtClean="0"/>
+              <a:t>Object vs EObject</a:t>
+            </a:r>
+            <a:endParaRPr lang="pl-PL" dirty="0"/>
+          </a:p>
+        </p:txBody>
+      </p:sp>
+      <p:sp>
+        <p:nvSpPr>
+          <p:cNvPr id="3" name="Text Placeholder 2"/>
+          <p:cNvSpPr>
+            <a:spLocks noGrp="1"/>
+          </p:cNvSpPr>
+          <p:nvPr>
+            <p:ph type="body" sz="quarter" idx="13"/>
+          </p:nvPr>
+        </p:nvSpPr>
+        <p:spPr/>
+        <p:txBody>
+          <a:bodyPr/>
+          <a:lstStyle/>
+          <a:p>
+            <a:r>
+              <a:rPr lang="en-US" sz="2200" dirty="0" err="1"/>
+              <a:t>EObject</a:t>
+            </a:r>
+            <a:r>
+              <a:rPr lang="en-US" sz="2200" dirty="0"/>
+              <a:t> is the root of all modeled </a:t>
+            </a:r>
+            <a:r>
+              <a:rPr lang="en-US" sz="2200" dirty="0" smtClean="0"/>
+              <a:t>objects</a:t>
+            </a:r>
+            <a:endParaRPr lang="pl-PL" sz="2200" dirty="0" smtClean="0"/>
+          </a:p>
+          <a:p>
+            <a:r>
+              <a:rPr lang="en-US" sz="2200" dirty="0"/>
+              <a:t>It provides support for the behaviors and features common to all modeled objects: </a:t>
+            </a:r>
+            <a:endParaRPr lang="pl-PL" sz="2200" dirty="0" smtClean="0"/>
+          </a:p>
+          <a:p>
+            <a:pPr marL="0" indent="0">
+              <a:buNone/>
+            </a:pPr>
+            <a:endParaRPr lang="pl-PL" dirty="0" smtClean="0"/>
+          </a:p>
+        </p:txBody>
+      </p:sp>
+      <p:sp>
+        <p:nvSpPr>
+          <p:cNvPr id="4" name="Footer Placeholder 3"/>
+          <p:cNvSpPr>
+            <a:spLocks noGrp="1"/>
+          </p:cNvSpPr>
+          <p:nvPr>
+            <p:ph type="ftr" sz="quarter" idx="11"/>
+          </p:nvPr>
+        </p:nvSpPr>
+        <p:spPr/>
+        <p:txBody>
+          <a:bodyPr/>
+          <a:lstStyle/>
+          <a:p>
+            <a:r>
+              <a:rPr lang="pl-PL" smtClean="0"/>
+              <a:t>www.rec-global.com</a:t>
+            </a:r>
+            <a:endParaRPr lang="pl-PL" dirty="0">
+              <a:solidFill>
+                <a:schemeClr val="tx1"/>
+              </a:solidFill>
+            </a:endParaRPr>
+          </a:p>
+        </p:txBody>
+      </p:sp>
+      <p:sp>
+        <p:nvSpPr>
+          <p:cNvPr id="5" name="Slide Number Placeholder 4"/>
+          <p:cNvSpPr>
+            <a:spLocks noGrp="1"/>
+          </p:cNvSpPr>
+          <p:nvPr>
+            <p:ph type="sldNum" sz="quarter" idx="12"/>
+          </p:nvPr>
+        </p:nvSpPr>
+        <p:spPr/>
+        <p:txBody>
+          <a:bodyPr/>
+          <a:lstStyle/>
+          <a:p>
+            <a:pPr algn="ctr"/>
+            <a:fld id="{49FFD7C8-786B-42CE-8D79-AFCFE16DD4F2}" type="slidenum">
+              <a:rPr lang="pl-PL" smtClean="0"/>
+              <a:pPr algn="ctr"/>
+              <a:t>15</a:t>
+            </a:fld>
+            <a:endParaRPr lang="pl-PL" dirty="0"/>
+          </a:p>
+        </p:txBody>
+      </p:sp>
+      <p:sp>
+        <p:nvSpPr>
+          <p:cNvPr id="6" name="Date Placeholder 5"/>
+          <p:cNvSpPr>
+            <a:spLocks noGrp="1"/>
+          </p:cNvSpPr>
+          <p:nvPr>
+            <p:ph type="dt" sz="half" idx="10"/>
+          </p:nvPr>
+        </p:nvSpPr>
+        <p:spPr/>
+        <p:txBody>
+          <a:bodyPr/>
+          <a:lstStyle/>
+          <a:p>
+            <a:fld id="{A1C14688-799C-45A6-846F-47D660935463}" type="datetime1">
+              <a:rPr lang="pl-PL" smtClean="0"/>
+              <a:pPr/>
+              <a:t>2015-11-24</a:t>
             </a:fld>
             <a:endParaRPr lang="pl-PL" dirty="0"/>
           </a:p>
@@ -8344,7 +8550,7 @@
 </p:sld>
 </file>
 
-<file path=ppt/slides/slide15.xml><?xml version="1.0" encoding="utf-8"?>
+<file path=ppt/slides/slide16.xml><?xml version="1.0" encoding="utf-8"?>
 <p:sld xmlns:a="http://schemas.openxmlformats.org/drawingml/2006/main" xmlns:r="http://schemas.openxmlformats.org/officeDocument/2006/relationships" xmlns:p="http://schemas.openxmlformats.org/presentationml/2006/main">
   <p:cSld>
     <p:spTree>
@@ -8511,7 +8717,7 @@
             <a:fld id="{49FFD7C8-786B-42CE-8D79-AFCFE16DD4F2}" type="slidenum">
               <a:rPr lang="pl-PL" smtClean="0"/>
               <a:pPr algn="ctr"/>
-              <a:t>15</a:t>
+              <a:t>16</a:t>
             </a:fld>
             <a:endParaRPr lang="pl-PL" dirty="0"/>
           </a:p>
@@ -8535,7 +8741,7 @@
             <a:fld id="{A1C14688-799C-45A6-846F-47D660935463}" type="datetime1">
               <a:rPr lang="pl-PL" smtClean="0"/>
               <a:pPr/>
-              <a:t>2015-11-16</a:t>
+              <a:t>2015-11-24</a:t>
             </a:fld>
             <a:endParaRPr lang="pl-PL" dirty="0"/>
           </a:p>
@@ -8906,7 +9112,7 @@
 </p:sld>
 </file>
 
-<file path=ppt/slides/slide16.xml><?xml version="1.0" encoding="utf-8"?>
+<file path=ppt/slides/slide17.xml><?xml version="1.0" encoding="utf-8"?>
 <p:sld xmlns:a="http://schemas.openxmlformats.org/drawingml/2006/main" xmlns:r="http://schemas.openxmlformats.org/officeDocument/2006/relationships" xmlns:p="http://schemas.openxmlformats.org/presentationml/2006/main">
   <p:cSld>
     <p:spTree>
@@ -9002,7 +9208,7 @@
             <a:fld id="{49FFD7C8-786B-42CE-8D79-AFCFE16DD4F2}" type="slidenum">
               <a:rPr lang="pl-PL" smtClean="0"/>
               <a:pPr algn="ctr"/>
-              <a:t>16</a:t>
+              <a:t>17</a:t>
             </a:fld>
             <a:endParaRPr lang="pl-PL" dirty="0"/>
           </a:p>
@@ -9201,7 +9407,7 @@
             <a:fld id="{844BCD22-CA02-4C92-9F05-D5071550F6B3}" type="datetime1">
               <a:rPr lang="pl-PL" smtClean="0"/>
               <a:pPr/>
-              <a:t>2015-11-16</a:t>
+              <a:t>2015-11-24</a:t>
             </a:fld>
             <a:endParaRPr lang="pl-PL" dirty="0"/>
           </a:p>
@@ -9227,7 +9433,7 @@
 </p:sld>
 </file>
 
-<file path=ppt/slides/slide17.xml><?xml version="1.0" encoding="utf-8"?>
+<file path=ppt/slides/slide18.xml><?xml version="1.0" encoding="utf-8"?>
 <p:sld xmlns:a="http://schemas.openxmlformats.org/drawingml/2006/main" xmlns:r="http://schemas.openxmlformats.org/officeDocument/2006/relationships" xmlns:p="http://schemas.openxmlformats.org/presentationml/2006/main">
   <p:cSld>
     <p:spTree>
@@ -9354,7 +9560,7 @@
             <a:fld id="{49FFD7C8-786B-42CE-8D79-AFCFE16DD4F2}" type="slidenum">
               <a:rPr lang="pl-PL" smtClean="0"/>
               <a:pPr algn="ctr"/>
-              <a:t>17</a:t>
+              <a:t>18</a:t>
             </a:fld>
             <a:endParaRPr lang="pl-PL" dirty="0"/>
           </a:p>
@@ -9378,7 +9584,7 @@
             <a:fld id="{A1C14688-799C-45A6-846F-47D660935463}" type="datetime1">
               <a:rPr lang="pl-PL" smtClean="0"/>
               <a:pPr/>
-              <a:t>2015-11-16</a:t>
+              <a:t>2015-11-24</a:t>
             </a:fld>
             <a:endParaRPr lang="pl-PL" dirty="0"/>
           </a:p>
@@ -9579,7 +9785,7 @@
 </p:sld>
 </file>
 
-<file path=ppt/slides/slide18.xml><?xml version="1.0" encoding="utf-8"?>
+<file path=ppt/slides/slide19.xml><?xml version="1.0" encoding="utf-8"?>
 <p:sld xmlns:a="http://schemas.openxmlformats.org/drawingml/2006/main" xmlns:r="http://schemas.openxmlformats.org/officeDocument/2006/relationships" xmlns:p="http://schemas.openxmlformats.org/presentationml/2006/main">
   <p:cSld>
     <p:spTree>
@@ -9675,7 +9881,7 @@
             <a:fld id="{49FFD7C8-786B-42CE-8D79-AFCFE16DD4F2}" type="slidenum">
               <a:rPr lang="pl-PL" smtClean="0"/>
               <a:pPr algn="ctr"/>
-              <a:t>18</a:t>
+              <a:t>19</a:t>
             </a:fld>
             <a:endParaRPr lang="pl-PL" dirty="0"/>
           </a:p>
@@ -9874,7 +10080,7 @@
             <a:fld id="{844BCD22-CA02-4C92-9F05-D5071550F6B3}" type="datetime1">
               <a:rPr lang="pl-PL" smtClean="0"/>
               <a:pPr/>
-              <a:t>2015-11-16</a:t>
+              <a:t>2015-11-24</a:t>
             </a:fld>
             <a:endParaRPr lang="pl-PL" dirty="0"/>
           </a:p>
@@ -9900,7 +10106,7 @@
 </p:sld>
 </file>
 
-<file path=ppt/slides/slide19.xml><?xml version="1.0" encoding="utf-8"?>
+<file path=ppt/slides/slide2.xml><?xml version="1.0" encoding="utf-8"?>
 <p:sld xmlns:a="http://schemas.openxmlformats.org/drawingml/2006/main" xmlns:r="http://schemas.openxmlformats.org/officeDocument/2006/relationships" xmlns:p="http://schemas.openxmlformats.org/presentationml/2006/main">
   <p:cSld>
     <p:spTree>
@@ -9919,7 +10125,7 @@
       </p:grpSpPr>
       <p:sp>
         <p:nvSpPr>
-          <p:cNvPr id="2" name="Title 1"/>
+          <p:cNvPr id="8" name="Title 7"/>
           <p:cNvSpPr>
             <a:spLocks noGrp="1"/>
           </p:cNvSpPr>
@@ -9933,12 +10139,8 @@
           <a:lstStyle/>
           <a:p>
             <a:r>
-              <a:rPr lang="pl-PL" dirty="0"/>
-              <a:t>EMF demo - </a:t>
-            </a:r>
-            <a:r>
               <a:rPr lang="pl-PL" dirty="0" smtClean="0"/>
-              <a:t>data binding &amp; validation</a:t>
+              <a:t>Agenda</a:t>
             </a:r>
             <a:endParaRPr lang="pl-PL" dirty="0"/>
           </a:p>
@@ -9946,83 +10148,7 @@
       </p:sp>
       <p:sp>
         <p:nvSpPr>
-          <p:cNvPr id="3" name="Text Placeholder 2"/>
-          <p:cNvSpPr>
-            <a:spLocks noGrp="1"/>
-          </p:cNvSpPr>
-          <p:nvPr>
-            <p:ph type="body" sz="quarter" idx="13"/>
-          </p:nvPr>
-        </p:nvSpPr>
-        <p:spPr/>
-        <p:txBody>
-          <a:bodyPr>
-            <a:normAutofit/>
-          </a:bodyPr>
-          <a:lstStyle/>
-          <a:p>
-            <a:r>
-              <a:rPr lang="pl-PL" sz="2200" dirty="0" smtClean="0"/>
-              <a:t>Binding a model to UI controls</a:t>
-            </a:r>
-          </a:p>
-          <a:p>
-            <a:pPr lvl="1"/>
-            <a:r>
-              <a:rPr lang="pl-PL" sz="2000" dirty="0"/>
-              <a:t>DataBindingContext</a:t>
-            </a:r>
-            <a:endParaRPr lang="pl-PL" sz="2000" dirty="0" smtClean="0"/>
-          </a:p>
-          <a:p>
-            <a:pPr lvl="1"/>
-            <a:r>
-              <a:rPr lang="pl-PL" sz="2000" dirty="0" smtClean="0"/>
-              <a:t>IObservableValue</a:t>
-            </a:r>
-          </a:p>
-          <a:p>
-            <a:pPr lvl="1"/>
-            <a:r>
-              <a:rPr lang="pl-PL" sz="2000" dirty="0" smtClean="0"/>
-              <a:t>UpdateValueStrategy</a:t>
-            </a:r>
-          </a:p>
-          <a:p>
-            <a:r>
-              <a:rPr lang="pl-PL" sz="2200" dirty="0" smtClean="0"/>
-              <a:t>Validating inputs</a:t>
-            </a:r>
-          </a:p>
-          <a:p>
-            <a:pPr lvl="1"/>
-            <a:r>
-              <a:rPr lang="pl-PL" sz="2000" dirty="0"/>
-              <a:t>Java</a:t>
-            </a:r>
-            <a:endParaRPr lang="pl-PL" sz="2000" dirty="0" smtClean="0"/>
-          </a:p>
-          <a:p>
-            <a:pPr lvl="1"/>
-            <a:r>
-              <a:rPr lang="pl-PL" sz="2000" dirty="0" smtClean="0"/>
-              <a:t>Object </a:t>
-            </a:r>
-            <a:r>
-              <a:rPr lang="pl-PL" sz="2000" dirty="0"/>
-              <a:t>Constraint Language (OCL)</a:t>
-            </a:r>
-            <a:endParaRPr lang="pl-PL" sz="2000" dirty="0" smtClean="0"/>
-          </a:p>
-          <a:p>
-            <a:pPr lvl="1"/>
-            <a:endParaRPr lang="pl-PL" sz="2000" dirty="0"/>
-          </a:p>
-        </p:txBody>
-      </p:sp>
-      <p:sp>
-        <p:nvSpPr>
-          <p:cNvPr id="4" name="Footer Placeholder 3"/>
+          <p:cNvPr id="3" name="Footer Placeholder 2"/>
           <p:cNvSpPr>
             <a:spLocks noGrp="1"/>
           </p:cNvSpPr>
@@ -10030,7 +10156,12 @@
             <p:ph type="ftr" sz="quarter" idx="11"/>
           </p:nvPr>
         </p:nvSpPr>
-        <p:spPr/>
+        <p:spPr>
+          <a:xfrm>
+            <a:off x="4038600" y="6356350"/>
+            <a:ext cx="4114800" cy="365125"/>
+          </a:xfrm>
+        </p:spPr>
         <p:txBody>
           <a:bodyPr/>
           <a:lstStyle/>
@@ -10049,7 +10180,7 @@
       </p:sp>
       <p:sp>
         <p:nvSpPr>
-          <p:cNvPr id="5" name="Slide Number Placeholder 4"/>
+          <p:cNvPr id="4" name="Slide Number Placeholder 3"/>
           <p:cNvSpPr>
             <a:spLocks noGrp="1"/>
           </p:cNvSpPr>
@@ -10057,7 +10188,12 @@
             <p:ph type="sldNum" sz="quarter" idx="12"/>
           </p:nvPr>
         </p:nvSpPr>
-        <p:spPr/>
+        <p:spPr>
+          <a:xfrm>
+            <a:off x="393700" y="6356350"/>
+            <a:ext cx="533400" cy="365125"/>
+          </a:xfrm>
+        </p:spPr>
         <p:txBody>
           <a:bodyPr/>
           <a:lstStyle/>
@@ -10066,7 +10202,333 @@
             <a:fld id="{49FFD7C8-786B-42CE-8D79-AFCFE16DD4F2}" type="slidenum">
               <a:rPr lang="pl-PL" smtClean="0"/>
               <a:pPr algn="ctr"/>
-              <a:t>19</a:t>
+              <a:t>2</a:t>
+            </a:fld>
+            <a:endParaRPr lang="pl-PL" dirty="0"/>
+          </a:p>
+        </p:txBody>
+      </p:sp>
+      <p:sp>
+        <p:nvSpPr>
+          <p:cNvPr id="9" name="Text Placeholder 8"/>
+          <p:cNvSpPr>
+            <a:spLocks noGrp="1"/>
+          </p:cNvSpPr>
+          <p:nvPr>
+            <p:ph type="body" sz="quarter" idx="13"/>
+          </p:nvPr>
+        </p:nvSpPr>
+        <p:spPr/>
+        <p:txBody>
+          <a:bodyPr/>
+          <a:lstStyle/>
+          <a:p>
+            <a:pPr lvl="0">
+              <a:lnSpc>
+                <a:spcPct val="150000"/>
+              </a:lnSpc>
+            </a:pPr>
+            <a:r>
+              <a:rPr lang="pl-PL" sz="2200" dirty="0" smtClean="0"/>
+              <a:t>Model-Driven Development</a:t>
+            </a:r>
+          </a:p>
+          <a:p>
+            <a:pPr lvl="0">
+              <a:lnSpc>
+                <a:spcPct val="150000"/>
+              </a:lnSpc>
+            </a:pPr>
+            <a:r>
+              <a:rPr lang="pl-PL" sz="2200" dirty="0" smtClean="0"/>
+              <a:t>What is EMF?</a:t>
+            </a:r>
+          </a:p>
+          <a:p>
+            <a:pPr lvl="0">
+              <a:lnSpc>
+                <a:spcPct val="150000"/>
+              </a:lnSpc>
+            </a:pPr>
+            <a:r>
+              <a:rPr lang="pl-PL" sz="2200" dirty="0" smtClean="0"/>
+              <a:t>EMF demo - </a:t>
+            </a:r>
+            <a:r>
+              <a:rPr lang="pl-PL" sz="2200" dirty="0"/>
+              <a:t>hello </a:t>
+            </a:r>
+            <a:r>
+              <a:rPr lang="pl-PL" sz="2200" dirty="0" smtClean="0"/>
+              <a:t>world</a:t>
+            </a:r>
+          </a:p>
+          <a:p>
+            <a:pPr lvl="0">
+              <a:lnSpc>
+                <a:spcPct val="150000"/>
+              </a:lnSpc>
+            </a:pPr>
+            <a:r>
+              <a:rPr lang="pl-PL" sz="2200" dirty="0"/>
+              <a:t>EMF demo - command stack &amp; </a:t>
+            </a:r>
+            <a:r>
+              <a:rPr lang="pl-PL" sz="2200" dirty="0" smtClean="0"/>
+              <a:t>adapters</a:t>
+            </a:r>
+          </a:p>
+          <a:p>
+            <a:pPr lvl="0">
+              <a:lnSpc>
+                <a:spcPct val="150000"/>
+              </a:lnSpc>
+            </a:pPr>
+            <a:r>
+              <a:rPr lang="pl-PL" sz="2200" dirty="0"/>
+              <a:t>EMF demo - data binding &amp; </a:t>
+            </a:r>
+            <a:r>
+              <a:rPr lang="pl-PL" sz="2200" dirty="0" smtClean="0"/>
+              <a:t>validation</a:t>
+            </a:r>
+          </a:p>
+          <a:p>
+            <a:pPr lvl="0">
+              <a:lnSpc>
+                <a:spcPct val="150000"/>
+              </a:lnSpc>
+            </a:pPr>
+            <a:r>
+              <a:rPr lang="pl-PL" sz="2200" dirty="0" smtClean="0"/>
+              <a:t>EMF </a:t>
+            </a:r>
+            <a:r>
+              <a:rPr lang="pl-PL" sz="2200" dirty="0"/>
+              <a:t>demo - </a:t>
+            </a:r>
+            <a:r>
+              <a:rPr lang="pl-PL" sz="2200" dirty="0" smtClean="0"/>
+              <a:t>generating UI editors</a:t>
+            </a:r>
+          </a:p>
+          <a:p>
+            <a:pPr lvl="2"/>
+            <a:endParaRPr lang="pl-PL" dirty="0"/>
+          </a:p>
+        </p:txBody>
+      </p:sp>
+      <p:sp>
+        <p:nvSpPr>
+          <p:cNvPr id="5" name="Date Placeholder 4"/>
+          <p:cNvSpPr>
+            <a:spLocks noGrp="1"/>
+          </p:cNvSpPr>
+          <p:nvPr>
+            <p:ph type="dt" sz="half" idx="10"/>
+          </p:nvPr>
+        </p:nvSpPr>
+        <p:spPr>
+          <a:xfrm>
+            <a:off x="927100" y="6356350"/>
+            <a:ext cx="1066800" cy="365125"/>
+          </a:xfrm>
+        </p:spPr>
+        <p:txBody>
+          <a:bodyPr/>
+          <a:lstStyle/>
+          <a:p>
+            <a:fld id="{844BCD22-CA02-4C92-9F05-D5071550F6B3}" type="datetime1">
+              <a:rPr lang="pl-PL" smtClean="0"/>
+              <a:pPr/>
+              <a:t>2015-11-24</a:t>
+            </a:fld>
+            <a:endParaRPr lang="pl-PL" dirty="0"/>
+          </a:p>
+        </p:txBody>
+      </p:sp>
+    </p:spTree>
+  </p:cSld>
+  <p:clrMapOvr>
+    <a:masterClrMapping/>
+  </p:clrMapOvr>
+  <p:timing>
+    <p:tnLst>
+      <p:par>
+        <p:cTn id="1" dur="indefinite" restart="never" nodeType="tmRoot"/>
+      </p:par>
+    </p:tnLst>
+  </p:timing>
+</p:sld>
+</file>
+
+<file path=ppt/slides/slide20.xml><?xml version="1.0" encoding="utf-8"?>
+<p:sld xmlns:a="http://schemas.openxmlformats.org/drawingml/2006/main" xmlns:r="http://schemas.openxmlformats.org/officeDocument/2006/relationships" xmlns:p="http://schemas.openxmlformats.org/presentationml/2006/main">
+  <p:cSld>
+    <p:spTree>
+      <p:nvGrpSpPr>
+        <p:cNvPr id="1" name=""/>
+        <p:cNvGrpSpPr/>
+        <p:nvPr/>
+      </p:nvGrpSpPr>
+      <p:grpSpPr>
+        <a:xfrm>
+          <a:off x="0" y="0"/>
+          <a:ext cx="0" cy="0"/>
+          <a:chOff x="0" y="0"/>
+          <a:chExt cx="0" cy="0"/>
+        </a:xfrm>
+      </p:grpSpPr>
+      <p:sp>
+        <p:nvSpPr>
+          <p:cNvPr id="2" name="Title 1"/>
+          <p:cNvSpPr>
+            <a:spLocks noGrp="1"/>
+          </p:cNvSpPr>
+          <p:nvPr>
+            <p:ph type="title"/>
+          </p:nvPr>
+        </p:nvSpPr>
+        <p:spPr/>
+        <p:txBody>
+          <a:bodyPr/>
+          <a:lstStyle/>
+          <a:p>
+            <a:r>
+              <a:rPr lang="pl-PL" dirty="0"/>
+              <a:t>EMF demo - </a:t>
+            </a:r>
+            <a:r>
+              <a:rPr lang="pl-PL" dirty="0" smtClean="0"/>
+              <a:t>data binding &amp; validation</a:t>
+            </a:r>
+            <a:endParaRPr lang="pl-PL" dirty="0"/>
+          </a:p>
+        </p:txBody>
+      </p:sp>
+      <p:sp>
+        <p:nvSpPr>
+          <p:cNvPr id="3" name="Text Placeholder 2"/>
+          <p:cNvSpPr>
+            <a:spLocks noGrp="1"/>
+          </p:cNvSpPr>
+          <p:nvPr>
+            <p:ph type="body" sz="quarter" idx="13"/>
+          </p:nvPr>
+        </p:nvSpPr>
+        <p:spPr/>
+        <p:txBody>
+          <a:bodyPr>
+            <a:normAutofit/>
+          </a:bodyPr>
+          <a:lstStyle/>
+          <a:p>
+            <a:r>
+              <a:rPr lang="pl-PL" sz="2200" dirty="0" smtClean="0"/>
+              <a:t>Binding a model to UI controls</a:t>
+            </a:r>
+          </a:p>
+          <a:p>
+            <a:pPr lvl="1"/>
+            <a:r>
+              <a:rPr lang="pl-PL" sz="2000" dirty="0"/>
+              <a:t>DataBindingContext</a:t>
+            </a:r>
+            <a:endParaRPr lang="pl-PL" sz="2000" dirty="0" smtClean="0"/>
+          </a:p>
+          <a:p>
+            <a:pPr lvl="1"/>
+            <a:r>
+              <a:rPr lang="pl-PL" sz="2000" dirty="0" smtClean="0"/>
+              <a:t>IObservableValue</a:t>
+            </a:r>
+          </a:p>
+          <a:p>
+            <a:pPr lvl="1"/>
+            <a:r>
+              <a:rPr lang="pl-PL" sz="2000" dirty="0" smtClean="0"/>
+              <a:t>UpdateValueStrategy</a:t>
+            </a:r>
+          </a:p>
+          <a:p>
+            <a:r>
+              <a:rPr lang="pl-PL" sz="2200" dirty="0" smtClean="0"/>
+              <a:t>Validating inputs</a:t>
+            </a:r>
+          </a:p>
+          <a:p>
+            <a:pPr lvl="1"/>
+            <a:r>
+              <a:rPr lang="pl-PL" sz="2000" dirty="0"/>
+              <a:t>Java</a:t>
+            </a:r>
+            <a:endParaRPr lang="pl-PL" sz="2000" dirty="0" smtClean="0"/>
+          </a:p>
+          <a:p>
+            <a:pPr lvl="1"/>
+            <a:r>
+              <a:rPr lang="pl-PL" sz="2000" dirty="0" smtClean="0"/>
+              <a:t>Object </a:t>
+            </a:r>
+            <a:r>
+              <a:rPr lang="pl-PL" sz="2000" dirty="0"/>
+              <a:t>Constraint Language (OCL)</a:t>
+            </a:r>
+            <a:endParaRPr lang="pl-PL" sz="2000" dirty="0" smtClean="0"/>
+          </a:p>
+          <a:p>
+            <a:pPr lvl="1"/>
+            <a:endParaRPr lang="pl-PL" sz="2000" dirty="0"/>
+          </a:p>
+        </p:txBody>
+      </p:sp>
+      <p:sp>
+        <p:nvSpPr>
+          <p:cNvPr id="4" name="Footer Placeholder 3"/>
+          <p:cNvSpPr>
+            <a:spLocks noGrp="1"/>
+          </p:cNvSpPr>
+          <p:nvPr>
+            <p:ph type="ftr" sz="quarter" idx="11"/>
+          </p:nvPr>
+        </p:nvSpPr>
+        <p:spPr/>
+        <p:txBody>
+          <a:bodyPr/>
+          <a:lstStyle/>
+          <a:p>
+            <a:r>
+              <a:rPr lang="pl-PL" smtClean="0"/>
+              <a:t>www.rec-global.com</a:t>
+            </a:r>
+            <a:endParaRPr lang="pl-PL" dirty="0">
+              <a:solidFill>
+                <a:schemeClr val="tx1"/>
+              </a:solidFill>
+            </a:endParaRPr>
+          </a:p>
+        </p:txBody>
+      </p:sp>
+      <p:sp>
+        <p:nvSpPr>
+          <p:cNvPr id="5" name="Slide Number Placeholder 4"/>
+          <p:cNvSpPr>
+            <a:spLocks noGrp="1"/>
+          </p:cNvSpPr>
+          <p:nvPr>
+            <p:ph type="sldNum" sz="quarter" idx="12"/>
+          </p:nvPr>
+        </p:nvSpPr>
+        <p:spPr/>
+        <p:txBody>
+          <a:bodyPr/>
+          <a:lstStyle/>
+          <a:p>
+            <a:pPr algn="ctr"/>
+            <a:fld id="{49FFD7C8-786B-42CE-8D79-AFCFE16DD4F2}" type="slidenum">
+              <a:rPr lang="pl-PL" smtClean="0"/>
+              <a:pPr algn="ctr"/>
+              <a:t>20</a:t>
             </a:fld>
             <a:endParaRPr lang="pl-PL" dirty="0"/>
           </a:p>
@@ -10090,7 +10552,7 @@
             <a:fld id="{A1C14688-799C-45A6-846F-47D660935463}" type="datetime1">
               <a:rPr lang="pl-PL" smtClean="0"/>
               <a:pPr/>
-              <a:t>2015-11-16</a:t>
+              <a:t>2015-11-24</a:t>
             </a:fld>
             <a:endParaRPr lang="pl-PL" dirty="0"/>
           </a:p>
@@ -10451,7 +10913,7 @@
 </p:sld>
 </file>
 
-<file path=ppt/slides/slide2.xml><?xml version="1.0" encoding="utf-8"?>
+<file path=ppt/slides/slide21.xml><?xml version="1.0" encoding="utf-8"?>
 <p:sld xmlns:a="http://schemas.openxmlformats.org/drawingml/2006/main" xmlns:r="http://schemas.openxmlformats.org/officeDocument/2006/relationships" xmlns:p="http://schemas.openxmlformats.org/presentationml/2006/main">
   <p:cSld>
     <p:spTree>
@@ -10547,263 +11009,7 @@
             <a:fld id="{49FFD7C8-786B-42CE-8D79-AFCFE16DD4F2}" type="slidenum">
               <a:rPr lang="pl-PL" smtClean="0"/>
               <a:pPr algn="ctr"/>
-              <a:t>2</a:t>
-            </a:fld>
-            <a:endParaRPr lang="pl-PL" dirty="0"/>
-          </a:p>
-        </p:txBody>
-      </p:sp>
-      <p:sp>
-        <p:nvSpPr>
-          <p:cNvPr id="9" name="Text Placeholder 8"/>
-          <p:cNvSpPr>
-            <a:spLocks noGrp="1"/>
-          </p:cNvSpPr>
-          <p:nvPr>
-            <p:ph type="body" sz="quarter" idx="13"/>
-          </p:nvPr>
-        </p:nvSpPr>
-        <p:spPr/>
-        <p:txBody>
-          <a:bodyPr/>
-          <a:lstStyle/>
-          <a:p>
-            <a:pPr lvl="0">
-              <a:lnSpc>
-                <a:spcPct val="150000"/>
-              </a:lnSpc>
-            </a:pPr>
-            <a:r>
-              <a:rPr lang="pl-PL" sz="2200" dirty="0" smtClean="0"/>
-              <a:t>Model-Driven Development</a:t>
-            </a:r>
-          </a:p>
-          <a:p>
-            <a:pPr lvl="0">
-              <a:lnSpc>
-                <a:spcPct val="150000"/>
-              </a:lnSpc>
-            </a:pPr>
-            <a:r>
-              <a:rPr lang="pl-PL" sz="2200" dirty="0" smtClean="0"/>
-              <a:t>What is EMF?</a:t>
-            </a:r>
-          </a:p>
-          <a:p>
-            <a:pPr lvl="0">
-              <a:lnSpc>
-                <a:spcPct val="150000"/>
-              </a:lnSpc>
-            </a:pPr>
-            <a:r>
-              <a:rPr lang="pl-PL" sz="2200" dirty="0" smtClean="0"/>
-              <a:t>EMF demo - </a:t>
-            </a:r>
-            <a:r>
-              <a:rPr lang="pl-PL" sz="2200" dirty="0"/>
-              <a:t>hello </a:t>
-            </a:r>
-            <a:r>
-              <a:rPr lang="pl-PL" sz="2200" dirty="0" smtClean="0"/>
-              <a:t>world</a:t>
-            </a:r>
-          </a:p>
-          <a:p>
-            <a:pPr lvl="0">
-              <a:lnSpc>
-                <a:spcPct val="150000"/>
-              </a:lnSpc>
-            </a:pPr>
-            <a:r>
-              <a:rPr lang="pl-PL" sz="2200" dirty="0"/>
-              <a:t>EMF demo - command stack &amp; </a:t>
-            </a:r>
-            <a:r>
-              <a:rPr lang="pl-PL" sz="2200" dirty="0" smtClean="0"/>
-              <a:t>adapters</a:t>
-            </a:r>
-          </a:p>
-          <a:p>
-            <a:pPr lvl="0">
-              <a:lnSpc>
-                <a:spcPct val="150000"/>
-              </a:lnSpc>
-            </a:pPr>
-            <a:r>
-              <a:rPr lang="pl-PL" sz="2200" dirty="0"/>
-              <a:t>EMF demo - data binding &amp; </a:t>
-            </a:r>
-            <a:r>
-              <a:rPr lang="pl-PL" sz="2200" dirty="0" smtClean="0"/>
-              <a:t>validation</a:t>
-            </a:r>
-          </a:p>
-          <a:p>
-            <a:pPr lvl="0">
-              <a:lnSpc>
-                <a:spcPct val="150000"/>
-              </a:lnSpc>
-            </a:pPr>
-            <a:r>
-              <a:rPr lang="pl-PL" sz="2200" dirty="0" smtClean="0"/>
-              <a:t>EMF </a:t>
-            </a:r>
-            <a:r>
-              <a:rPr lang="pl-PL" sz="2200" dirty="0"/>
-              <a:t>demo - </a:t>
-            </a:r>
-            <a:r>
-              <a:rPr lang="pl-PL" sz="2200" dirty="0" smtClean="0"/>
-              <a:t>generating UI editors</a:t>
-            </a:r>
-          </a:p>
-          <a:p>
-            <a:pPr lvl="2"/>
-            <a:endParaRPr lang="pl-PL" dirty="0"/>
-          </a:p>
-        </p:txBody>
-      </p:sp>
-      <p:sp>
-        <p:nvSpPr>
-          <p:cNvPr id="5" name="Date Placeholder 4"/>
-          <p:cNvSpPr>
-            <a:spLocks noGrp="1"/>
-          </p:cNvSpPr>
-          <p:nvPr>
-            <p:ph type="dt" sz="half" idx="10"/>
-          </p:nvPr>
-        </p:nvSpPr>
-        <p:spPr>
-          <a:xfrm>
-            <a:off x="927100" y="6356350"/>
-            <a:ext cx="1066800" cy="365125"/>
-          </a:xfrm>
-        </p:spPr>
-        <p:txBody>
-          <a:bodyPr/>
-          <a:lstStyle/>
-          <a:p>
-            <a:fld id="{844BCD22-CA02-4C92-9F05-D5071550F6B3}" type="datetime1">
-              <a:rPr lang="pl-PL" smtClean="0"/>
-              <a:pPr/>
-              <a:t>2015-11-16</a:t>
-            </a:fld>
-            <a:endParaRPr lang="pl-PL" dirty="0"/>
-          </a:p>
-        </p:txBody>
-      </p:sp>
-    </p:spTree>
-  </p:cSld>
-  <p:clrMapOvr>
-    <a:masterClrMapping/>
-  </p:clrMapOvr>
-  <p:timing>
-    <p:tnLst>
-      <p:par>
-        <p:cTn id="1" dur="indefinite" restart="never" nodeType="tmRoot"/>
-      </p:par>
-    </p:tnLst>
-  </p:timing>
-</p:sld>
-</file>
-
-<file path=ppt/slides/slide20.xml><?xml version="1.0" encoding="utf-8"?>
-<p:sld xmlns:a="http://schemas.openxmlformats.org/drawingml/2006/main" xmlns:r="http://schemas.openxmlformats.org/officeDocument/2006/relationships" xmlns:p="http://schemas.openxmlformats.org/presentationml/2006/main">
-  <p:cSld>
-    <p:spTree>
-      <p:nvGrpSpPr>
-        <p:cNvPr id="1" name=""/>
-        <p:cNvGrpSpPr/>
-        <p:nvPr/>
-      </p:nvGrpSpPr>
-      <p:grpSpPr>
-        <a:xfrm>
-          <a:off x="0" y="0"/>
-          <a:ext cx="0" cy="0"/>
-          <a:chOff x="0" y="0"/>
-          <a:chExt cx="0" cy="0"/>
-        </a:xfrm>
-      </p:grpSpPr>
-      <p:sp>
-        <p:nvSpPr>
-          <p:cNvPr id="8" name="Title 7"/>
-          <p:cNvSpPr>
-            <a:spLocks noGrp="1"/>
-          </p:cNvSpPr>
-          <p:nvPr>
-            <p:ph type="title"/>
-          </p:nvPr>
-        </p:nvSpPr>
-        <p:spPr/>
-        <p:txBody>
-          <a:bodyPr/>
-          <a:lstStyle/>
-          <a:p>
-            <a:r>
-              <a:rPr lang="pl-PL" dirty="0" smtClean="0"/>
-              <a:t>Agenda</a:t>
-            </a:r>
-            <a:endParaRPr lang="pl-PL" dirty="0"/>
-          </a:p>
-        </p:txBody>
-      </p:sp>
-      <p:sp>
-        <p:nvSpPr>
-          <p:cNvPr id="3" name="Footer Placeholder 2"/>
-          <p:cNvSpPr>
-            <a:spLocks noGrp="1"/>
-          </p:cNvSpPr>
-          <p:nvPr>
-            <p:ph type="ftr" sz="quarter" idx="11"/>
-          </p:nvPr>
-        </p:nvSpPr>
-        <p:spPr>
-          <a:xfrm>
-            <a:off x="4038600" y="6356350"/>
-            <a:ext cx="4114800" cy="365125"/>
-          </a:xfrm>
-        </p:spPr>
-        <p:txBody>
-          <a:bodyPr/>
-          <a:lstStyle/>
-          <a:p>
-            <a:r>
-              <a:rPr lang="pl-PL" smtClean="0"/>
-              <a:t>www.rec-global.com</a:t>
-            </a:r>
-            <a:endParaRPr lang="pl-PL" dirty="0">
-              <a:solidFill>
-                <a:schemeClr val="tx1"/>
-              </a:solidFill>
-            </a:endParaRPr>
-          </a:p>
-        </p:txBody>
-      </p:sp>
-      <p:sp>
-        <p:nvSpPr>
-          <p:cNvPr id="4" name="Slide Number Placeholder 3"/>
-          <p:cNvSpPr>
-            <a:spLocks noGrp="1"/>
-          </p:cNvSpPr>
-          <p:nvPr>
-            <p:ph type="sldNum" sz="quarter" idx="12"/>
-          </p:nvPr>
-        </p:nvSpPr>
-        <p:spPr>
-          <a:xfrm>
-            <a:off x="393700" y="6356350"/>
-            <a:ext cx="533400" cy="365125"/>
-          </a:xfrm>
-        </p:spPr>
-        <p:txBody>
-          <a:bodyPr/>
-          <a:lstStyle/>
-          <a:p>
-            <a:pPr algn="ctr"/>
-            <a:fld id="{49FFD7C8-786B-42CE-8D79-AFCFE16DD4F2}" type="slidenum">
-              <a:rPr lang="pl-PL" smtClean="0"/>
-              <a:pPr algn="ctr"/>
-              <a:t>20</a:t>
+              <a:t>21</a:t>
             </a:fld>
             <a:endParaRPr lang="pl-PL" dirty="0"/>
           </a:p>
@@ -10996,7 +11202,7 @@
             <a:fld id="{844BCD22-CA02-4C92-9F05-D5071550F6B3}" type="datetime1">
               <a:rPr lang="pl-PL" smtClean="0"/>
               <a:pPr/>
-              <a:t>2015-11-16</a:t>
+              <a:t>2015-11-24</a:t>
             </a:fld>
             <a:endParaRPr lang="pl-PL" dirty="0"/>
           </a:p>
@@ -11022,7 +11228,7 @@
 </p:sld>
 </file>
 
-<file path=ppt/slides/slide21.xml><?xml version="1.0" encoding="utf-8"?>
+<file path=ppt/slides/slide22.xml><?xml version="1.0" encoding="utf-8"?>
 <p:sld xmlns:a="http://schemas.openxmlformats.org/drawingml/2006/main" xmlns:r="http://schemas.openxmlformats.org/officeDocument/2006/relationships" xmlns:p="http://schemas.openxmlformats.org/presentationml/2006/main">
   <p:cSld>
     <p:spTree>
@@ -11193,7 +11399,7 @@
             <a:fld id="{49FFD7C8-786B-42CE-8D79-AFCFE16DD4F2}" type="slidenum">
               <a:rPr lang="pl-PL" smtClean="0"/>
               <a:pPr algn="ctr"/>
-              <a:t>21</a:t>
+              <a:t>22</a:t>
             </a:fld>
             <a:endParaRPr lang="pl-PL" dirty="0"/>
           </a:p>
@@ -11217,7 +11423,7 @@
             <a:fld id="{A1C14688-799C-45A6-846F-47D660935463}" type="datetime1">
               <a:rPr lang="pl-PL" smtClean="0"/>
               <a:pPr/>
-              <a:t>2015-11-16</a:t>
+              <a:t>2015-11-24</a:t>
             </a:fld>
             <a:endParaRPr lang="pl-PL" dirty="0"/>
           </a:p>
@@ -11284,7 +11490,7 @@
 </p:sld>
 </file>
 
-<file path=ppt/slides/slide22.xml><?xml version="1.0" encoding="utf-8"?>
+<file path=ppt/slides/slide23.xml><?xml version="1.0" encoding="utf-8"?>
 <p:sld xmlns:a="http://schemas.openxmlformats.org/drawingml/2006/main" xmlns:r="http://schemas.openxmlformats.org/officeDocument/2006/relationships" xmlns:p="http://schemas.openxmlformats.org/presentationml/2006/main">
   <p:cSld>
     <p:spTree>
@@ -11494,7 +11700,7 @@
             <a:fld id="{49FFD7C8-786B-42CE-8D79-AFCFE16DD4F2}" type="slidenum">
               <a:rPr lang="pl-PL" smtClean="0"/>
               <a:pPr algn="ctr"/>
-              <a:t>22</a:t>
+              <a:t>23</a:t>
             </a:fld>
             <a:endParaRPr lang="pl-PL" dirty="0"/>
           </a:p>
@@ -11518,7 +11724,7 @@
             <a:fld id="{A1C14688-799C-45A6-846F-47D660935463}" type="datetime1">
               <a:rPr lang="pl-PL" smtClean="0"/>
               <a:pPr/>
-              <a:t>2015-11-16</a:t>
+              <a:t>2015-11-24</a:t>
             </a:fld>
             <a:endParaRPr lang="pl-PL" dirty="0"/>
           </a:p>
@@ -11585,7 +11791,7 @@
 </p:sld>
 </file>
 
-<file path=ppt/slides/slide23.xml><?xml version="1.0" encoding="utf-8"?>
+<file path=ppt/slides/slide24.xml><?xml version="1.0" encoding="utf-8"?>
 <p:sld xmlns:a="http://schemas.openxmlformats.org/drawingml/2006/main" xmlns:r="http://schemas.openxmlformats.org/officeDocument/2006/relationships" xmlns:p="http://schemas.openxmlformats.org/presentationml/2006/main">
   <p:cSld>
     <p:spTree>
@@ -11781,7 +11987,7 @@
             <a:fld id="{49FFD7C8-786B-42CE-8D79-AFCFE16DD4F2}" type="slidenum">
               <a:rPr lang="pl-PL" smtClean="0"/>
               <a:pPr algn="ctr"/>
-              <a:t>23</a:t>
+              <a:t>24</a:t>
             </a:fld>
             <a:endParaRPr lang="pl-PL" dirty="0"/>
           </a:p>
@@ -11805,7 +12011,7 @@
             <a:fld id="{A1C14688-799C-45A6-846F-47D660935463}" type="datetime1">
               <a:rPr lang="pl-PL" smtClean="0"/>
               <a:pPr/>
-              <a:t>2015-11-16</a:t>
+              <a:t>2015-11-24</a:t>
             </a:fld>
             <a:endParaRPr lang="pl-PL" dirty="0"/>
           </a:p>
@@ -12132,7 +12338,7 @@
             <a:fld id="{844BCD22-CA02-4C92-9F05-D5071550F6B3}" type="datetime1">
               <a:rPr lang="pl-PL" smtClean="0"/>
               <a:pPr/>
-              <a:t>2015-11-16</a:t>
+              <a:t>2015-11-24</a:t>
             </a:fld>
             <a:endParaRPr lang="pl-PL" dirty="0"/>
           </a:p>
@@ -12267,7 +12473,7 @@
             <a:fld id="{A1C14688-799C-45A6-846F-47D660935463}" type="datetime1">
               <a:rPr lang="pl-PL" smtClean="0"/>
               <a:pPr/>
-              <a:t>2015-11-16</a:t>
+              <a:t>2015-11-24</a:t>
             </a:fld>
             <a:endParaRPr lang="pl-PL" dirty="0"/>
           </a:p>
@@ -12494,7 +12700,7 @@
             <a:fld id="{A1C14688-799C-45A6-846F-47D660935463}" type="datetime1">
               <a:rPr lang="pl-PL" smtClean="0"/>
               <a:pPr/>
-              <a:t>2015-11-16</a:t>
+              <a:t>2015-11-24</a:t>
             </a:fld>
             <a:endParaRPr lang="pl-PL" dirty="0"/>
           </a:p>
@@ -12752,7 +12958,7 @@
             <a:fld id="{A1C14688-799C-45A6-846F-47D660935463}" type="datetime1">
               <a:rPr lang="pl-PL" smtClean="0"/>
               <a:pPr/>
-              <a:t>2015-11-16</a:t>
+              <a:t>2015-11-24</a:t>
             </a:fld>
             <a:endParaRPr lang="pl-PL" dirty="0"/>
           </a:p>
@@ -13399,7 +13605,7 @@
             <a:fld id="{844BCD22-CA02-4C92-9F05-D5071550F6B3}" type="datetime1">
               <a:rPr lang="pl-PL" smtClean="0"/>
               <a:pPr/>
-              <a:t>2015-11-16</a:t>
+              <a:t>2015-11-24</a:t>
             </a:fld>
             <a:endParaRPr lang="pl-PL" dirty="0"/>
           </a:p>
@@ -13615,7 +13821,7 @@
             <a:fld id="{A1C14688-799C-45A6-846F-47D660935463}" type="datetime1">
               <a:rPr lang="pl-PL" smtClean="0"/>
               <a:pPr/>
-              <a:t>2015-11-16</a:t>
+              <a:t>2015-11-24</a:t>
             </a:fld>
             <a:endParaRPr lang="pl-PL" dirty="0"/>
           </a:p>
@@ -14157,7 +14363,7 @@
             <a:fld id="{A1C14688-799C-45A6-846F-47D660935463}" type="datetime1">
               <a:rPr lang="pl-PL" smtClean="0"/>
               <a:pPr/>
-              <a:t>2015-11-16</a:t>
+              <a:t>2015-11-24</a:t>
             </a:fld>
             <a:endParaRPr lang="pl-PL" dirty="0"/>
           </a:p>
@@ -15468,6 +15674,15 @@
 </file>
 
 <file path=customXml/item1.xml><?xml version="1.0" encoding="utf-8"?>
+<?mso-contentType ?>
+<FormTemplates xmlns="http://schemas.microsoft.com/sharepoint/v3/contenttype/forms">
+  <Display>DocumentLibraryForm</Display>
+  <Edit>DocumentLibraryForm</Edit>
+  <New>DocumentLibraryForm</New>
+</FormTemplates>
+</file>
+
+<file path=customXml/item2.xml><?xml version="1.0" encoding="utf-8"?>
 <ct:contentTypeSchema xmlns:ct="http://schemas.microsoft.com/office/2006/metadata/contentType" xmlns:ma="http://schemas.microsoft.com/office/2006/metadata/properties/metaAttributes" ct:_="" ma:_="" ma:contentTypeName="Document" ma:contentTypeID="0x010100936691DD97235843B5E96CA882CD7A85" ma:contentTypeVersion="5" ma:contentTypeDescription="Create a new document." ma:contentTypeScope="" ma:versionID="6f08e88fdeac68ac664784283c60f55d">
   <xsd:schema xmlns:xsd="http://www.w3.org/2001/XMLSchema" xmlns:xs="http://www.w3.org/2001/XMLSchema" xmlns:p="http://schemas.microsoft.com/office/2006/metadata/properties" targetNamespace="http://schemas.microsoft.com/office/2006/metadata/properties" ma:root="true" ma:fieldsID="1b420e54b54d84c99c75ea622d6798e7">
     <xsd:element name="properties">
@@ -15581,15 +15796,6 @@
 </ct:contentTypeSchema>
 </file>
 
-<file path=customXml/item2.xml><?xml version="1.0" encoding="utf-8"?>
-<?mso-contentType ?>
-<FormTemplates xmlns="http://schemas.microsoft.com/sharepoint/v3/contenttype/forms">
-  <Display>DocumentLibraryForm</Display>
-  <Edit>DocumentLibraryForm</Edit>
-  <New>DocumentLibraryForm</New>
-</FormTemplates>
-</file>
-
 <file path=customXml/item3.xml><?xml version="1.0" encoding="utf-8"?>
 <p:properties xmlns:p="http://schemas.microsoft.com/office/2006/metadata/properties" xmlns:xsi="http://www.w3.org/2001/XMLSchema-instance" xmlns:pc="http://schemas.microsoft.com/office/infopath/2007/PartnerControls">
   <documentManagement/>
@@ -15597,6 +15803,14 @@
 </file>
 
 <file path=customXml/itemProps1.xml><?xml version="1.0" encoding="utf-8"?>
+<ds:datastoreItem xmlns:ds="http://schemas.openxmlformats.org/officeDocument/2006/customXml" ds:itemID="{6AA8B675-C754-493C-B718-CAC6BC23635B}">
+  <ds:schemaRefs>
+    <ds:schemaRef ds:uri="http://schemas.microsoft.com/sharepoint/v3/contenttype/forms"/>
+  </ds:schemaRefs>
+</ds:datastoreItem>
+</file>
+
+<file path=customXml/itemProps2.xml><?xml version="1.0" encoding="utf-8"?>
 <ds:datastoreItem xmlns:ds="http://schemas.openxmlformats.org/officeDocument/2006/customXml" ds:itemID="{89F2C655-CE6E-4709-BE63-9C397722D50F}">
   <ds:schemaRefs>
     <ds:schemaRef ds:uri="http://schemas.microsoft.com/office/2006/metadata/contentType"/>
@@ -15608,14 +15822,6 @@
     <ds:schemaRef ds:uri="http://purl.org/dc/terms/"/>
     <ds:schemaRef ds:uri="http://schemas.microsoft.com/internal/obd"/>
     <ds:schemaRef ds:uri="http://schemas.microsoft.com/office/infopath/2007/PartnerControls"/>
-  </ds:schemaRefs>
-</ds:datastoreItem>
-</file>
-
-<file path=customXml/itemProps2.xml><?xml version="1.0" encoding="utf-8"?>
-<ds:datastoreItem xmlns:ds="http://schemas.openxmlformats.org/officeDocument/2006/customXml" ds:itemID="{6AA8B675-C754-493C-B718-CAC6BC23635B}">
-  <ds:schemaRefs>
-    <ds:schemaRef ds:uri="http://schemas.microsoft.com/sharepoint/v3/contenttype/forms"/>
   </ds:schemaRefs>
 </ds:datastoreItem>
 </file>

</xml_diff>